<commit_message>
Added information to dataset slide and to the droughts and flood slides for our presentation.
</commit_message>
<xml_diff>
--- a/TeamDocs/Examining the Hydrologic Properties of the Missouri River.pptx
+++ b/TeamDocs/Examining the Hydrologic Properties of the Missouri River.pptx
@@ -5,7 +5,7 @@
     <p:sldMasterId id="2147483648" r:id="rId1"/>
   </p:sldMasterIdLst>
   <p:notesMasterIdLst>
-    <p:notesMasterId r:id="rId13"/>
+    <p:notesMasterId r:id="rId14"/>
   </p:notesMasterIdLst>
   <p:sldIdLst>
     <p:sldId id="256" r:id="rId2"/>
@@ -16,9 +16,10 @@
     <p:sldId id="261" r:id="rId7"/>
     <p:sldId id="262" r:id="rId8"/>
     <p:sldId id="263" r:id="rId9"/>
-    <p:sldId id="264" r:id="rId10"/>
-    <p:sldId id="265" r:id="rId11"/>
-    <p:sldId id="266" r:id="rId12"/>
+    <p:sldId id="267" r:id="rId10"/>
+    <p:sldId id="264" r:id="rId11"/>
+    <p:sldId id="265" r:id="rId12"/>
+    <p:sldId id="266" r:id="rId13"/>
   </p:sldIdLst>
   <p:sldSz cx="12192000" cy="6858000"/>
   <p:notesSz cx="6858000" cy="9144000"/>
@@ -117,6 +118,11 @@
       </a:defRPr>
     </a:lvl9pPr>
   </p:defaultTextStyle>
+  <p:extLst>
+    <p:ext uri="{EFAFB233-063F-42B5-8137-9DF3F51BA10A}">
+      <p15:sldGuideLst xmlns:p15="http://schemas.microsoft.com/office/powerpoint/2012/main"/>
+    </p:ext>
+  </p:extLst>
 </p:presentation>
 </file>
 
@@ -202,7 +208,7 @@
           <a:p>
             <a:fld id="{B56C8744-E6BD-4290-891C-CE220D660B8A}" type="datetimeFigureOut">
               <a:rPr lang="en-US" smtClean="0"/>
-              <a:t>11/20/2019</a:t>
+              <a:t>11/20/19</a:t>
             </a:fld>
             <a:endParaRPr lang="en-US"/>
           </a:p>
@@ -469,6 +475,180 @@
 </p:notesMaster>
 </file>
 
+<file path=ppt/notesSlides/notesSlide1.xml><?xml version="1.0" encoding="utf-8"?>
+<p:notes xmlns:a="http://schemas.openxmlformats.org/drawingml/2006/main" xmlns:r="http://schemas.openxmlformats.org/officeDocument/2006/relationships" xmlns:p="http://schemas.openxmlformats.org/presentationml/2006/main">
+  <p:cSld>
+    <p:spTree>
+      <p:nvGrpSpPr>
+        <p:cNvPr id="1" name=""/>
+        <p:cNvGrpSpPr/>
+        <p:nvPr/>
+      </p:nvGrpSpPr>
+      <p:grpSpPr>
+        <a:xfrm>
+          <a:off x="0" y="0"/>
+          <a:ext cx="0" cy="0"/>
+          <a:chOff x="0" y="0"/>
+          <a:chExt cx="0" cy="0"/>
+        </a:xfrm>
+      </p:grpSpPr>
+      <p:sp>
+        <p:nvSpPr>
+          <p:cNvPr id="2" name="Slide Image Placeholder 1"/>
+          <p:cNvSpPr>
+            <a:spLocks noGrp="1" noRot="1" noChangeAspect="1"/>
+          </p:cNvSpPr>
+          <p:nvPr>
+            <p:ph type="sldImg"/>
+          </p:nvPr>
+        </p:nvSpPr>
+        <p:spPr/>
+      </p:sp>
+      <p:sp>
+        <p:nvSpPr>
+          <p:cNvPr id="3" name="Notes Placeholder 2"/>
+          <p:cNvSpPr>
+            <a:spLocks noGrp="1"/>
+          </p:cNvSpPr>
+          <p:nvPr>
+            <p:ph type="body" idx="1"/>
+          </p:nvPr>
+        </p:nvSpPr>
+        <p:spPr/>
+        <p:txBody>
+          <a:bodyPr/>
+          <a:lstStyle/>
+          <a:p>
+            <a:r>
+              <a:rPr lang="en-US" dirty="0"/>
+              <a:t>Floods</a:t>
+            </a:r>
+          </a:p>
+        </p:txBody>
+      </p:sp>
+      <p:sp>
+        <p:nvSpPr>
+          <p:cNvPr id="4" name="Slide Number Placeholder 3"/>
+          <p:cNvSpPr>
+            <a:spLocks noGrp="1"/>
+          </p:cNvSpPr>
+          <p:nvPr>
+            <p:ph type="sldNum" sz="quarter" idx="5"/>
+          </p:nvPr>
+        </p:nvSpPr>
+        <p:spPr/>
+        <p:txBody>
+          <a:bodyPr/>
+          <a:lstStyle/>
+          <a:p>
+            <a:fld id="{B78AC56A-6061-4999-A98E-F9A34B7E1C35}" type="slidenum">
+              <a:rPr lang="en-US" smtClean="0"/>
+              <a:t>8</a:t>
+            </a:fld>
+            <a:endParaRPr lang="en-US"/>
+          </a:p>
+        </p:txBody>
+      </p:sp>
+    </p:spTree>
+    <p:extLst>
+      <p:ext uri="{BB962C8B-B14F-4D97-AF65-F5344CB8AC3E}">
+        <p14:creationId xmlns:p14="http://schemas.microsoft.com/office/powerpoint/2010/main" val="28418022"/>
+      </p:ext>
+    </p:extLst>
+  </p:cSld>
+  <p:clrMapOvr>
+    <a:masterClrMapping/>
+  </p:clrMapOvr>
+</p:notes>
+</file>
+
+<file path=ppt/notesSlides/notesSlide2.xml><?xml version="1.0" encoding="utf-8"?>
+<p:notes xmlns:a="http://schemas.openxmlformats.org/drawingml/2006/main" xmlns:r="http://schemas.openxmlformats.org/officeDocument/2006/relationships" xmlns:p="http://schemas.openxmlformats.org/presentationml/2006/main">
+  <p:cSld>
+    <p:spTree>
+      <p:nvGrpSpPr>
+        <p:cNvPr id="1" name=""/>
+        <p:cNvGrpSpPr/>
+        <p:nvPr/>
+      </p:nvGrpSpPr>
+      <p:grpSpPr>
+        <a:xfrm>
+          <a:off x="0" y="0"/>
+          <a:ext cx="0" cy="0"/>
+          <a:chOff x="0" y="0"/>
+          <a:chExt cx="0" cy="0"/>
+        </a:xfrm>
+      </p:grpSpPr>
+      <p:sp>
+        <p:nvSpPr>
+          <p:cNvPr id="2" name="Slide Image Placeholder 1"/>
+          <p:cNvSpPr>
+            <a:spLocks noGrp="1" noRot="1" noChangeAspect="1"/>
+          </p:cNvSpPr>
+          <p:nvPr>
+            <p:ph type="sldImg"/>
+          </p:nvPr>
+        </p:nvSpPr>
+        <p:spPr/>
+      </p:sp>
+      <p:sp>
+        <p:nvSpPr>
+          <p:cNvPr id="3" name="Notes Placeholder 2"/>
+          <p:cNvSpPr>
+            <a:spLocks noGrp="1"/>
+          </p:cNvSpPr>
+          <p:nvPr>
+            <p:ph type="body" idx="1"/>
+          </p:nvPr>
+        </p:nvSpPr>
+        <p:spPr/>
+        <p:txBody>
+          <a:bodyPr/>
+          <a:lstStyle/>
+          <a:p>
+            <a:r>
+              <a:rPr lang="en-US" dirty="0"/>
+              <a:t>Droughts</a:t>
+            </a:r>
+          </a:p>
+        </p:txBody>
+      </p:sp>
+      <p:sp>
+        <p:nvSpPr>
+          <p:cNvPr id="4" name="Slide Number Placeholder 3"/>
+          <p:cNvSpPr>
+            <a:spLocks noGrp="1"/>
+          </p:cNvSpPr>
+          <p:nvPr>
+            <p:ph type="sldNum" sz="quarter" idx="5"/>
+          </p:nvPr>
+        </p:nvSpPr>
+        <p:spPr/>
+        <p:txBody>
+          <a:bodyPr/>
+          <a:lstStyle/>
+          <a:p>
+            <a:fld id="{B78AC56A-6061-4999-A98E-F9A34B7E1C35}" type="slidenum">
+              <a:rPr lang="en-US" smtClean="0"/>
+              <a:t>9</a:t>
+            </a:fld>
+            <a:endParaRPr lang="en-US"/>
+          </a:p>
+        </p:txBody>
+      </p:sp>
+    </p:spTree>
+    <p:extLst>
+      <p:ext uri="{BB962C8B-B14F-4D97-AF65-F5344CB8AC3E}">
+        <p14:creationId xmlns:p14="http://schemas.microsoft.com/office/powerpoint/2010/main" val="1855001790"/>
+      </p:ext>
+    </p:extLst>
+  </p:cSld>
+  <p:clrMapOvr>
+    <a:masterClrMapping/>
+  </p:clrMapOvr>
+</p:notes>
+</file>
+
 <file path=ppt/slideLayouts/slideLayout1.xml><?xml version="1.0" encoding="utf-8"?>
 <p:sldLayout xmlns:a="http://schemas.openxmlformats.org/drawingml/2006/main" xmlns:r="http://schemas.openxmlformats.org/officeDocument/2006/relationships" xmlns:p="http://schemas.openxmlformats.org/presentationml/2006/main" type="title" preserve="1">
   <p:cSld name="Title Slide">
@@ -658,7 +838,7 @@
             <a:fld id="{B61BEF0D-F0BB-DE4B-95CE-6DB70DBA9567}" type="datetimeFigureOut">
               <a:rPr lang="en-US" dirty="0"/>
               <a:pPr/>
-              <a:t>11/20/2019</a:t>
+              <a:t>11/20/19</a:t>
             </a:fld>
             <a:endParaRPr lang="en-US" dirty="0"/>
           </a:p>
@@ -993,7 +1173,7 @@
             <a:fld id="{B61BEF0D-F0BB-DE4B-95CE-6DB70DBA9567}" type="datetimeFigureOut">
               <a:rPr lang="en-US" dirty="0"/>
               <a:pPr/>
-              <a:t>11/20/2019</a:t>
+              <a:t>11/20/19</a:t>
             </a:fld>
             <a:endParaRPr lang="en-US" dirty="0"/>
           </a:p>
@@ -1391,7 +1571,7 @@
             <a:fld id="{B61BEF0D-F0BB-DE4B-95CE-6DB70DBA9567}" type="datetimeFigureOut">
               <a:rPr lang="en-US" dirty="0"/>
               <a:pPr/>
-              <a:t>11/20/2019</a:t>
+              <a:t>11/20/19</a:t>
             </a:fld>
             <a:endParaRPr lang="en-US" dirty="0"/>
           </a:p>
@@ -1723,7 +1903,7 @@
             <a:fld id="{B61BEF0D-F0BB-DE4B-95CE-6DB70DBA9567}" type="datetimeFigureOut">
               <a:rPr lang="en-US" dirty="0"/>
               <a:pPr/>
-              <a:t>11/20/2019</a:t>
+              <a:t>11/20/19</a:t>
             </a:fld>
             <a:endParaRPr lang="en-US" dirty="0"/>
           </a:p>
@@ -2040,7 +2220,7 @@
             <a:fld id="{B61BEF0D-F0BB-DE4B-95CE-6DB70DBA9567}" type="datetimeFigureOut">
               <a:rPr lang="en-US" dirty="0"/>
               <a:pPr/>
-              <a:t>11/20/2019</a:t>
+              <a:t>11/20/19</a:t>
             </a:fld>
             <a:endParaRPr lang="en-US" dirty="0"/>
           </a:p>
@@ -2433,7 +2613,7 @@
             <a:fld id="{B61BEF0D-F0BB-DE4B-95CE-6DB70DBA9567}" type="datetimeFigureOut">
               <a:rPr lang="en-US" dirty="0"/>
               <a:pPr/>
-              <a:t>11/20/2019</a:t>
+              <a:t>11/20/19</a:t>
             </a:fld>
             <a:endParaRPr lang="en-US" dirty="0"/>
           </a:p>
@@ -2687,7 +2867,7 @@
             <a:fld id="{B61BEF0D-F0BB-DE4B-95CE-6DB70DBA9567}" type="datetimeFigureOut">
               <a:rPr lang="en-US" dirty="0"/>
               <a:pPr/>
-              <a:t>11/20/2019</a:t>
+              <a:t>11/20/19</a:t>
             </a:fld>
             <a:endParaRPr lang="en-US" dirty="0"/>
           </a:p>
@@ -2946,7 +3126,7 @@
             <a:fld id="{B61BEF0D-F0BB-DE4B-95CE-6DB70DBA9567}" type="datetimeFigureOut">
               <a:rPr lang="en-US" dirty="0"/>
               <a:pPr/>
-              <a:t>11/20/2019</a:t>
+              <a:t>11/20/19</a:t>
             </a:fld>
             <a:endParaRPr lang="en-US" dirty="0"/>
           </a:p>
@@ -3205,7 +3385,7 @@
             <a:fld id="{B61BEF0D-F0BB-DE4B-95CE-6DB70DBA9567}" type="datetimeFigureOut">
               <a:rPr lang="en-US" dirty="0"/>
               <a:pPr/>
-              <a:t>11/20/2019</a:t>
+              <a:t>11/20/19</a:t>
             </a:fld>
             <a:endParaRPr lang="en-US" dirty="0"/>
           </a:p>
@@ -3531,7 +3711,7 @@
             <a:fld id="{B61BEF0D-F0BB-DE4B-95CE-6DB70DBA9567}" type="datetimeFigureOut">
               <a:rPr lang="en-US" dirty="0"/>
               <a:pPr/>
-              <a:t>11/20/2019</a:t>
+              <a:t>11/20/19</a:t>
             </a:fld>
             <a:endParaRPr lang="en-US" dirty="0"/>
           </a:p>
@@ -3851,7 +4031,7 @@
             <a:fld id="{B61BEF0D-F0BB-DE4B-95CE-6DB70DBA9567}" type="datetimeFigureOut">
               <a:rPr lang="en-US" dirty="0"/>
               <a:pPr/>
-              <a:t>11/20/2019</a:t>
+              <a:t>11/20/19</a:t>
             </a:fld>
             <a:endParaRPr lang="en-US" dirty="0"/>
           </a:p>
@@ -4305,7 +4485,7 @@
             <a:fld id="{B61BEF0D-F0BB-DE4B-95CE-6DB70DBA9567}" type="datetimeFigureOut">
               <a:rPr lang="en-US" dirty="0"/>
               <a:pPr/>
-              <a:t>11/20/2019</a:t>
+              <a:t>11/20/19</a:t>
             </a:fld>
             <a:endParaRPr lang="en-US" dirty="0"/>
           </a:p>
@@ -4507,7 +4687,7 @@
             <a:fld id="{B61BEF0D-F0BB-DE4B-95CE-6DB70DBA9567}" type="datetimeFigureOut">
               <a:rPr lang="en-US" dirty="0"/>
               <a:pPr/>
-              <a:t>11/20/2019</a:t>
+              <a:t>11/20/19</a:t>
             </a:fld>
             <a:endParaRPr lang="en-US" dirty="0"/>
           </a:p>
@@ -4681,7 +4861,7 @@
             <a:fld id="{B61BEF0D-F0BB-DE4B-95CE-6DB70DBA9567}" type="datetimeFigureOut">
               <a:rPr lang="en-US" dirty="0"/>
               <a:pPr/>
-              <a:t>11/20/2019</a:t>
+              <a:t>11/20/19</a:t>
             </a:fld>
             <a:endParaRPr lang="en-US" dirty="0"/>
           </a:p>
@@ -5011,7 +5191,7 @@
             <a:fld id="{B61BEF0D-F0BB-DE4B-95CE-6DB70DBA9567}" type="datetimeFigureOut">
               <a:rPr lang="en-US" dirty="0"/>
               <a:pPr/>
-              <a:t>11/20/2019</a:t>
+              <a:t>11/20/19</a:t>
             </a:fld>
             <a:endParaRPr lang="en-US" dirty="0"/>
           </a:p>
@@ -5353,7 +5533,7 @@
             <a:fld id="{B61BEF0D-F0BB-DE4B-95CE-6DB70DBA9567}" type="datetimeFigureOut">
               <a:rPr lang="en-US" dirty="0"/>
               <a:pPr/>
-              <a:t>11/20/2019</a:t>
+              <a:t>11/20/19</a:t>
             </a:fld>
             <a:endParaRPr lang="en-US" dirty="0"/>
           </a:p>
@@ -7467,7 +7647,7 @@
             <a:fld id="{B61BEF0D-F0BB-DE4B-95CE-6DB70DBA9567}" type="datetimeFigureOut">
               <a:rPr lang="en-US" dirty="0"/>
               <a:pPr/>
-              <a:t>11/20/2019</a:t>
+              <a:t>11/20/19</a:t>
             </a:fld>
             <a:endParaRPr lang="en-US" dirty="0"/>
           </a:p>
@@ -8090,6 +8270,99 @@
           <p:cNvPr id="2" name="Title 1">
             <a:extLst>
               <a:ext uri="{FF2B5EF4-FFF2-40B4-BE49-F238E27FC236}">
+                <a16:creationId xmlns:a16="http://schemas.microsoft.com/office/drawing/2014/main" id="{88704A68-DE53-4994-88F4-4AA3F9100DCC}"/>
+              </a:ext>
+            </a:extLst>
+          </p:cNvPr>
+          <p:cNvSpPr>
+            <a:spLocks noGrp="1"/>
+          </p:cNvSpPr>
+          <p:nvPr>
+            <p:ph type="title"/>
+          </p:nvPr>
+        </p:nvSpPr>
+        <p:spPr/>
+        <p:txBody>
+          <a:bodyPr>
+            <a:normAutofit fontScale="90000"/>
+          </a:bodyPr>
+          <a:lstStyle/>
+          <a:p>
+            <a:r>
+              <a:rPr lang="en-US" dirty="0"/>
+              <a:t>Q3: </a:t>
+            </a:r>
+            <a:r>
+              <a:rPr lang="en-US" sz="2200" dirty="0"/>
+              <a:t>What factors contribute to the variability of total nitrogen in the rivers?</a:t>
+            </a:r>
+            <a:br>
+              <a:rPr lang="en-US" sz="2200" dirty="0"/>
+            </a:br>
+            <a:endParaRPr lang="en-US" sz="2200" dirty="0"/>
+          </a:p>
+        </p:txBody>
+      </p:sp>
+      <p:sp>
+        <p:nvSpPr>
+          <p:cNvPr id="3" name="Content Placeholder 2">
+            <a:extLst>
+              <a:ext uri="{FF2B5EF4-FFF2-40B4-BE49-F238E27FC236}">
+                <a16:creationId xmlns:a16="http://schemas.microsoft.com/office/drawing/2014/main" id="{22E6B2CA-7F79-4773-A26F-8C80AB414B33}"/>
+              </a:ext>
+            </a:extLst>
+          </p:cNvPr>
+          <p:cNvSpPr>
+            <a:spLocks noGrp="1"/>
+          </p:cNvSpPr>
+          <p:nvPr>
+            <p:ph idx="1"/>
+          </p:nvPr>
+        </p:nvSpPr>
+        <p:spPr/>
+        <p:txBody>
+          <a:bodyPr/>
+          <a:lstStyle/>
+          <a:p>
+            <a:endParaRPr lang="en-US"/>
+          </a:p>
+        </p:txBody>
+      </p:sp>
+    </p:spTree>
+    <p:extLst>
+      <p:ext uri="{BB962C8B-B14F-4D97-AF65-F5344CB8AC3E}">
+        <p14:creationId xmlns:p14="http://schemas.microsoft.com/office/powerpoint/2010/main" val="1434108667"/>
+      </p:ext>
+    </p:extLst>
+  </p:cSld>
+  <p:clrMapOvr>
+    <a:masterClrMapping/>
+  </p:clrMapOvr>
+</p:sld>
+</file>
+
+<file path=ppt/slides/slide11.xml><?xml version="1.0" encoding="utf-8"?>
+<p:sld xmlns:a="http://schemas.openxmlformats.org/drawingml/2006/main" xmlns:r="http://schemas.openxmlformats.org/officeDocument/2006/relationships" xmlns:p="http://schemas.openxmlformats.org/presentationml/2006/main">
+  <p:cSld>
+    <p:spTree>
+      <p:nvGrpSpPr>
+        <p:cNvPr id="1" name=""/>
+        <p:cNvGrpSpPr/>
+        <p:nvPr/>
+      </p:nvGrpSpPr>
+      <p:grpSpPr>
+        <a:xfrm>
+          <a:off x="0" y="0"/>
+          <a:ext cx="0" cy="0"/>
+          <a:chOff x="0" y="0"/>
+          <a:chExt cx="0" cy="0"/>
+        </a:xfrm>
+      </p:grpSpPr>
+      <p:sp>
+        <p:nvSpPr>
+          <p:cNvPr id="2" name="Title 1">
+            <a:extLst>
+              <a:ext uri="{FF2B5EF4-FFF2-40B4-BE49-F238E27FC236}">
                 <a16:creationId xmlns:a16="http://schemas.microsoft.com/office/drawing/2014/main" id="{324FD6F7-C459-4786-AB0E-6CCFA599422D}"/>
               </a:ext>
             </a:extLst>
@@ -8161,7 +8434,7 @@
 </p:sld>
 </file>
 
-<file path=ppt/slides/slide11.xml><?xml version="1.0" encoding="utf-8"?>
+<file path=ppt/slides/slide12.xml><?xml version="1.0" encoding="utf-8"?>
 <p:sld xmlns:a="http://schemas.openxmlformats.org/drawingml/2006/main" xmlns:r="http://schemas.openxmlformats.org/officeDocument/2006/relationships" xmlns:p="http://schemas.openxmlformats.org/presentationml/2006/main">
   <p:cSld>
     <p:spTree>
@@ -9215,6 +9488,23 @@
             </a:r>
           </a:p>
           <a:p>
+            <a:r>
+              <a:rPr lang="en-US" dirty="0"/>
+              <a:t>Sites chosen based on HUC4 </a:t>
+            </a:r>
+            <a:r>
+              <a:rPr lang="en-US" dirty="0" err="1"/>
+              <a:t>subbasin</a:t>
+            </a:r>
+            <a:r>
+              <a:rPr lang="en-US" dirty="0"/>
+              <a:t> from 1020 to 1030</a:t>
+            </a:r>
+          </a:p>
+          <a:p>
+            <a:endParaRPr lang="en-US" dirty="0"/>
+          </a:p>
+          <a:p>
             <a:endParaRPr lang="en-US" dirty="0"/>
           </a:p>
         </p:txBody>
@@ -9540,15 +9830,343 @@
             <p:ph idx="1"/>
           </p:nvPr>
         </p:nvSpPr>
-        <p:spPr/>
+        <p:spPr>
+          <a:xfrm>
+            <a:off x="2589212" y="1905000"/>
+            <a:ext cx="7258981" cy="4006222"/>
+          </a:xfrm>
+        </p:spPr>
         <p:txBody>
           <a:bodyPr/>
           <a:lstStyle/>
           <a:p>
-            <a:endParaRPr lang="en-US"/>
-          </a:p>
-        </p:txBody>
-      </p:sp>
+            <a:r>
+              <a:rPr lang="en-US" dirty="0"/>
+              <a:t>Used United States Geological Survey (USGS) database called the National Water Information System interface, or NWIS</a:t>
+            </a:r>
+          </a:p>
+          <a:p>
+            <a:r>
+              <a:rPr lang="en-US" dirty="0"/>
+              <a:t>Downloaded data using ‘</a:t>
+            </a:r>
+            <a:r>
+              <a:rPr lang="en-US" dirty="0" err="1"/>
+              <a:t>dataRetrieval</a:t>
+            </a:r>
+            <a:r>
+              <a:rPr lang="en-US" dirty="0"/>
+              <a:t>’ package</a:t>
+            </a:r>
+          </a:p>
+        </p:txBody>
+      </p:sp>
+      <p:graphicFrame>
+        <p:nvGraphicFramePr>
+          <p:cNvPr id="4" name="Table 3">
+            <a:extLst>
+              <a:ext uri="{FF2B5EF4-FFF2-40B4-BE49-F238E27FC236}">
+                <a16:creationId xmlns:a16="http://schemas.microsoft.com/office/drawing/2014/main" id="{4D17452A-E034-B947-A85C-0B5386136FF1}"/>
+              </a:ext>
+            </a:extLst>
+          </p:cNvPr>
+          <p:cNvGraphicFramePr>
+            <a:graphicFrameLocks noGrp="1"/>
+          </p:cNvGraphicFramePr>
+          <p:nvPr>
+            <p:extLst>
+              <p:ext uri="{D42A27DB-BD31-4B8C-83A1-F6EECF244321}">
+                <p14:modId xmlns:p14="http://schemas.microsoft.com/office/powerpoint/2010/main" val="3033381155"/>
+              </p:ext>
+            </p:extLst>
+          </p:nvPr>
+        </p:nvGraphicFramePr>
+        <p:xfrm>
+          <a:off x="1839390" y="3429000"/>
+          <a:ext cx="8597382" cy="2887717"/>
+        </p:xfrm>
+        <a:graphic>
+          <a:graphicData uri="http://schemas.openxmlformats.org/drawingml/2006/table">
+            <a:tbl>
+              <a:tblPr firstRow="1" bandRow="1">
+                <a:tableStyleId>{5C22544A-7EE6-4342-B048-85BDC9FD1C3A}</a:tableStyleId>
+              </a:tblPr>
+              <a:tblGrid>
+                <a:gridCol w="2865794">
+                  <a:extLst>
+                    <a:ext uri="{9D8B030D-6E8A-4147-A177-3AD203B41FA5}">
+                      <a16:colId xmlns:a16="http://schemas.microsoft.com/office/drawing/2014/main" val="3436237536"/>
+                    </a:ext>
+                  </a:extLst>
+                </a:gridCol>
+                <a:gridCol w="2865794">
+                  <a:extLst>
+                    <a:ext uri="{9D8B030D-6E8A-4147-A177-3AD203B41FA5}">
+                      <a16:colId xmlns:a16="http://schemas.microsoft.com/office/drawing/2014/main" val="3224802415"/>
+                    </a:ext>
+                  </a:extLst>
+                </a:gridCol>
+                <a:gridCol w="2865794">
+                  <a:extLst>
+                    <a:ext uri="{9D8B030D-6E8A-4147-A177-3AD203B41FA5}">
+                      <a16:colId xmlns:a16="http://schemas.microsoft.com/office/drawing/2014/main" val="2964509735"/>
+                    </a:ext>
+                  </a:extLst>
+                </a:gridCol>
+              </a:tblGrid>
+              <a:tr h="504314">
+                <a:tc>
+                  <a:txBody>
+                    <a:bodyPr/>
+                    <a:lstStyle/>
+                    <a:p>
+                      <a:r>
+                        <a:rPr lang="en-US" dirty="0"/>
+                        <a:t>Variable</a:t>
+                      </a:r>
+                    </a:p>
+                  </a:txBody>
+                  <a:tcPr/>
+                </a:tc>
+                <a:tc>
+                  <a:txBody>
+                    <a:bodyPr/>
+                    <a:lstStyle/>
+                    <a:p>
+                      <a:r>
+                        <a:rPr lang="en-US" dirty="0"/>
+                        <a:t>Units</a:t>
+                      </a:r>
+                    </a:p>
+                  </a:txBody>
+                  <a:tcPr/>
+                </a:tc>
+                <a:tc>
+                  <a:txBody>
+                    <a:bodyPr/>
+                    <a:lstStyle/>
+                    <a:p>
+                      <a:r>
+                        <a:rPr lang="en-US" dirty="0"/>
+                        <a:t>Number of Sites</a:t>
+                      </a:r>
+                    </a:p>
+                  </a:txBody>
+                  <a:tcPr/>
+                </a:tc>
+                <a:extLst>
+                  <a:ext uri="{0D108BD9-81ED-4DB2-BD59-A6C34878D82A}">
+                    <a16:rowId xmlns:a16="http://schemas.microsoft.com/office/drawing/2014/main" val="3470954729"/>
+                  </a:ext>
+                </a:extLst>
+              </a:tr>
+              <a:tr h="504314">
+                <a:tc>
+                  <a:txBody>
+                    <a:bodyPr/>
+                    <a:lstStyle/>
+                    <a:p>
+                      <a:r>
+                        <a:rPr lang="en-US" dirty="0"/>
+                        <a:t>Discharge</a:t>
+                      </a:r>
+                    </a:p>
+                  </a:txBody>
+                  <a:tcPr/>
+                </a:tc>
+                <a:tc>
+                  <a:txBody>
+                    <a:bodyPr/>
+                    <a:lstStyle/>
+                    <a:p>
+                      <a:r>
+                        <a:rPr lang="en-US" dirty="0" err="1"/>
+                        <a:t>Cfs</a:t>
+                      </a:r>
+                      <a:r>
+                        <a:rPr lang="en-US" dirty="0"/>
+                        <a:t> or m</a:t>
+                      </a:r>
+                      <a:r>
+                        <a:rPr lang="en-US" baseline="30000" dirty="0"/>
+                        <a:t>3</a:t>
+                      </a:r>
+                      <a:r>
+                        <a:rPr lang="en-US" baseline="0" dirty="0"/>
+                        <a:t>/s</a:t>
+                      </a:r>
+                      <a:endParaRPr lang="en-US" dirty="0"/>
+                    </a:p>
+                  </a:txBody>
+                  <a:tcPr/>
+                </a:tc>
+                <a:tc>
+                  <a:txBody>
+                    <a:bodyPr/>
+                    <a:lstStyle/>
+                    <a:p>
+                      <a:r>
+                        <a:rPr lang="en-US" dirty="0"/>
+                        <a:t>22</a:t>
+                      </a:r>
+                    </a:p>
+                  </a:txBody>
+                  <a:tcPr/>
+                </a:tc>
+                <a:extLst>
+                  <a:ext uri="{0D108BD9-81ED-4DB2-BD59-A6C34878D82A}">
+                    <a16:rowId xmlns:a16="http://schemas.microsoft.com/office/drawing/2014/main" val="1254563326"/>
+                  </a:ext>
+                </a:extLst>
+              </a:tr>
+              <a:tr h="504314">
+                <a:tc>
+                  <a:txBody>
+                    <a:bodyPr/>
+                    <a:lstStyle/>
+                    <a:p>
+                      <a:r>
+                        <a:rPr lang="en-US" dirty="0"/>
+                        <a:t>Time</a:t>
+                      </a:r>
+                    </a:p>
+                  </a:txBody>
+                  <a:tcPr/>
+                </a:tc>
+                <a:tc>
+                  <a:txBody>
+                    <a:bodyPr/>
+                    <a:lstStyle/>
+                    <a:p>
+                      <a:r>
+                        <a:rPr lang="en-US" dirty="0"/>
+                        <a:t>UTC</a:t>
+                      </a:r>
+                    </a:p>
+                  </a:txBody>
+                  <a:tcPr/>
+                </a:tc>
+                <a:tc>
+                  <a:txBody>
+                    <a:bodyPr/>
+                    <a:lstStyle/>
+                    <a:p>
+                      <a:r>
+                        <a:rPr lang="en-US" dirty="0"/>
+                        <a:t>22</a:t>
+                      </a:r>
+                    </a:p>
+                  </a:txBody>
+                  <a:tcPr/>
+                </a:tc>
+                <a:extLst>
+                  <a:ext uri="{0D108BD9-81ED-4DB2-BD59-A6C34878D82A}">
+                    <a16:rowId xmlns:a16="http://schemas.microsoft.com/office/drawing/2014/main" val="165366183"/>
+                  </a:ext>
+                </a:extLst>
+              </a:tr>
+              <a:tr h="870461">
+                <a:tc>
+                  <a:txBody>
+                    <a:bodyPr/>
+                    <a:lstStyle/>
+                    <a:p>
+                      <a:r>
+                        <a:rPr lang="en-US" dirty="0"/>
+                        <a:t>Nitrogen</a:t>
+                      </a:r>
+                    </a:p>
+                  </a:txBody>
+                  <a:tcPr/>
+                </a:tc>
+                <a:tc>
+                  <a:txBody>
+                    <a:bodyPr/>
+                    <a:lstStyle/>
+                    <a:p>
+                      <a:r>
+                        <a:rPr lang="en-US" dirty="0"/>
+                        <a:t>mg/L</a:t>
+                      </a:r>
+                    </a:p>
+                  </a:txBody>
+                  <a:tcPr/>
+                </a:tc>
+                <a:tc>
+                  <a:txBody>
+                    <a:bodyPr/>
+                    <a:lstStyle/>
+                    <a:p>
+                      <a:r>
+                        <a:rPr lang="en-US" dirty="0"/>
+                        <a:t>22 with daily values</a:t>
+                      </a:r>
+                    </a:p>
+                    <a:p>
+                      <a:r>
+                        <a:rPr lang="en-US" dirty="0"/>
+                        <a:t>6 with high frequency</a:t>
+                      </a:r>
+                    </a:p>
+                  </a:txBody>
+                  <a:tcPr/>
+                </a:tc>
+                <a:extLst>
+                  <a:ext uri="{0D108BD9-81ED-4DB2-BD59-A6C34878D82A}">
+                    <a16:rowId xmlns:a16="http://schemas.microsoft.com/office/drawing/2014/main" val="3594056562"/>
+                  </a:ext>
+                </a:extLst>
+              </a:tr>
+              <a:tr h="504314">
+                <a:tc>
+                  <a:txBody>
+                    <a:bodyPr/>
+                    <a:lstStyle/>
+                    <a:p>
+                      <a:r>
+                        <a:rPr lang="en-US" dirty="0"/>
+                        <a:t>Phosphorus</a:t>
+                      </a:r>
+                    </a:p>
+                  </a:txBody>
+                  <a:tcPr/>
+                </a:tc>
+                <a:tc>
+                  <a:txBody>
+                    <a:bodyPr/>
+                    <a:lstStyle/>
+                    <a:p>
+                      <a:r>
+                        <a:rPr lang="en-US" dirty="0"/>
+                        <a:t>mg/L</a:t>
+                      </a:r>
+                    </a:p>
+                  </a:txBody>
+                  <a:tcPr/>
+                </a:tc>
+                <a:tc>
+                  <a:txBody>
+                    <a:bodyPr/>
+                    <a:lstStyle/>
+                    <a:p>
+                      <a:r>
+                        <a:rPr lang="en-US" dirty="0"/>
+                        <a:t>22 with daily values</a:t>
+                      </a:r>
+                    </a:p>
+                  </a:txBody>
+                  <a:tcPr/>
+                </a:tc>
+                <a:extLst>
+                  <a:ext uri="{0D108BD9-81ED-4DB2-BD59-A6C34878D82A}">
+                    <a16:rowId xmlns:a16="http://schemas.microsoft.com/office/drawing/2014/main" val="2746717732"/>
+                  </a:ext>
+                </a:extLst>
+              </a:tr>
+            </a:tbl>
+          </a:graphicData>
+        </a:graphic>
+      </p:graphicFrame>
     </p:spTree>
     <p:extLst>
       <p:ext uri="{BB962C8B-B14F-4D97-AF65-F5344CB8AC3E}">
@@ -9839,7 +10457,10 @@
           <a:bodyPr/>
           <a:lstStyle/>
           <a:p>
-            <a:endParaRPr lang="en-US"/>
+            <a:r>
+              <a:rPr lang="en-US" dirty="0"/>
+              <a:t>Floods</a:t>
+            </a:r>
           </a:p>
         </p:txBody>
       </p:sp>
@@ -9878,7 +10499,7 @@
           <p:cNvPr id="2" name="Title 1">
             <a:extLst>
               <a:ext uri="{FF2B5EF4-FFF2-40B4-BE49-F238E27FC236}">
-                <a16:creationId xmlns:a16="http://schemas.microsoft.com/office/drawing/2014/main" id="{88704A68-DE53-4994-88F4-4AA3F9100DCC}"/>
+                <a16:creationId xmlns:a16="http://schemas.microsoft.com/office/drawing/2014/main" id="{64356B4B-247F-9D42-A061-ABE3D1792DF2}"/>
               </a:ext>
             </a:extLst>
           </p:cNvPr>
@@ -9892,22 +10513,18 @@
         <p:spPr/>
         <p:txBody>
           <a:bodyPr>
-            <a:normAutofit fontScale="90000"/>
+            <a:normAutofit/>
           </a:bodyPr>
           <a:lstStyle/>
           <a:p>
             <a:r>
-              <a:rPr lang="en-US" dirty="0"/>
-              <a:t>Q3: </a:t>
-            </a:r>
-            <a:r>
-              <a:rPr lang="en-US" sz="2200" dirty="0"/>
-              <a:t>What factors contribute to the variability of total nitrogen in the rivers?</a:t>
-            </a:r>
-            <a:br>
-              <a:rPr lang="en-US" sz="2200" dirty="0"/>
-            </a:br>
-            <a:endParaRPr lang="en-US" sz="2200" dirty="0"/>
+              <a:rPr lang="en-US" sz="3200" dirty="0"/>
+              <a:t>Q2: </a:t>
+            </a:r>
+            <a:r>
+              <a:rPr lang="en-US" sz="2000" dirty="0"/>
+              <a:t>What effects do specific flood and drought events have on the water quality and quantity of rivers in the Missouri River Basin areas of interest?</a:t>
+            </a:r>
           </a:p>
         </p:txBody>
       </p:sp>
@@ -9916,7 +10533,7 @@
           <p:cNvPr id="3" name="Content Placeholder 2">
             <a:extLst>
               <a:ext uri="{FF2B5EF4-FFF2-40B4-BE49-F238E27FC236}">
-                <a16:creationId xmlns:a16="http://schemas.microsoft.com/office/drawing/2014/main" id="{22E6B2CA-7F79-4773-A26F-8C80AB414B33}"/>
+                <a16:creationId xmlns:a16="http://schemas.microsoft.com/office/drawing/2014/main" id="{2D851701-2C20-D14F-9CF9-118FD6EE3710}"/>
               </a:ext>
             </a:extLst>
           </p:cNvPr>
@@ -9932,14 +10549,36 @@
           <a:bodyPr/>
           <a:lstStyle/>
           <a:p>
-            <a:endParaRPr lang="en-US"/>
+            <a:r>
+              <a:rPr lang="en-US" dirty="0"/>
+              <a:t>Droughts</a:t>
+            </a:r>
+          </a:p>
+          <a:p>
+            <a:r>
+              <a:rPr lang="en-US" dirty="0"/>
+              <a:t>7Q10 analysis was performed on 6 sites</a:t>
+            </a:r>
+          </a:p>
+          <a:p>
+            <a:r>
+              <a:rPr lang="en-US" dirty="0"/>
+              <a:t>Include graph with discharge information</a:t>
+            </a:r>
+          </a:p>
+          <a:p>
+            <a:pPr lvl="1"/>
+            <a:endParaRPr lang="en-US" dirty="0"/>
+          </a:p>
+          <a:p>
+            <a:endParaRPr lang="en-US" dirty="0"/>
           </a:p>
         </p:txBody>
       </p:sp>
     </p:spTree>
     <p:extLst>
       <p:ext uri="{BB962C8B-B14F-4D97-AF65-F5344CB8AC3E}">
-        <p14:creationId xmlns:p14="http://schemas.microsoft.com/office/powerpoint/2010/main" val="1434108667"/>
+        <p14:creationId xmlns:p14="http://schemas.microsoft.com/office/powerpoint/2010/main" val="1076986795"/>
       </p:ext>
     </p:extLst>
   </p:cSld>

</xml_diff>

<commit_message>
fixing small typos in autoref
</commit_message>
<xml_diff>
--- a/TeamDocs/Examining the Hydrologic Properties of the Missouri River.pptx
+++ b/TeamDocs/Examining the Hydrologic Properties of the Missouri River.pptx
@@ -117,6 +117,11 @@
       </a:defRPr>
     </a:lvl9pPr>
   </p:defaultTextStyle>
+  <p:extLst>
+    <p:ext uri="{EFAFB233-063F-42B5-8137-9DF3F51BA10A}">
+      <p15:sldGuideLst xmlns:p15="http://schemas.microsoft.com/office/powerpoint/2012/main"/>
+    </p:ext>
+  </p:extLst>
 </p:presentation>
 </file>
 
@@ -467,6 +472,796 @@
     </a:lvl9pPr>
   </p:notesStyle>
 </p:notesMaster>
+</file>
+
+<file path=ppt/notesSlides/notesSlide1.xml><?xml version="1.0" encoding="utf-8"?>
+<p:notes xmlns:a="http://schemas.openxmlformats.org/drawingml/2006/main" xmlns:r="http://schemas.openxmlformats.org/officeDocument/2006/relationships" xmlns:p="http://schemas.openxmlformats.org/presentationml/2006/main">
+  <p:cSld>
+    <p:spTree>
+      <p:nvGrpSpPr>
+        <p:cNvPr id="1" name=""/>
+        <p:cNvGrpSpPr/>
+        <p:nvPr/>
+      </p:nvGrpSpPr>
+      <p:grpSpPr>
+        <a:xfrm>
+          <a:off x="0" y="0"/>
+          <a:ext cx="0" cy="0"/>
+          <a:chOff x="0" y="0"/>
+          <a:chExt cx="0" cy="0"/>
+        </a:xfrm>
+      </p:grpSpPr>
+      <p:sp>
+        <p:nvSpPr>
+          <p:cNvPr id="2" name="Slide Image Placeholder 1"/>
+          <p:cNvSpPr>
+            <a:spLocks noGrp="1" noRot="1" noChangeAspect="1"/>
+          </p:cNvSpPr>
+          <p:nvPr>
+            <p:ph type="sldImg"/>
+          </p:nvPr>
+        </p:nvSpPr>
+        <p:spPr/>
+      </p:sp>
+      <p:sp>
+        <p:nvSpPr>
+          <p:cNvPr id="3" name="Notes Placeholder 2"/>
+          <p:cNvSpPr>
+            <a:spLocks noGrp="1"/>
+          </p:cNvSpPr>
+          <p:nvPr>
+            <p:ph type="body" idx="1"/>
+          </p:nvPr>
+        </p:nvSpPr>
+        <p:spPr/>
+        <p:txBody>
+          <a:bodyPr/>
+          <a:lstStyle/>
+          <a:p>
+            <a:r>
+              <a:rPr lang="en-US" dirty="0"/>
+              <a:t>Hubert</a:t>
+            </a:r>
+          </a:p>
+        </p:txBody>
+      </p:sp>
+      <p:sp>
+        <p:nvSpPr>
+          <p:cNvPr id="4" name="Slide Number Placeholder 3"/>
+          <p:cNvSpPr>
+            <a:spLocks noGrp="1"/>
+          </p:cNvSpPr>
+          <p:nvPr>
+            <p:ph type="sldNum" sz="quarter" idx="5"/>
+          </p:nvPr>
+        </p:nvSpPr>
+        <p:spPr/>
+        <p:txBody>
+          <a:bodyPr/>
+          <a:lstStyle/>
+          <a:p>
+            <a:fld id="{B78AC56A-6061-4999-A98E-F9A34B7E1C35}" type="slidenum">
+              <a:rPr lang="en-US" smtClean="0"/>
+              <a:t>2</a:t>
+            </a:fld>
+            <a:endParaRPr lang="en-US"/>
+          </a:p>
+        </p:txBody>
+      </p:sp>
+    </p:spTree>
+    <p:extLst>
+      <p:ext uri="{BB962C8B-B14F-4D97-AF65-F5344CB8AC3E}">
+        <p14:creationId xmlns:p14="http://schemas.microsoft.com/office/powerpoint/2010/main" val="2737847670"/>
+      </p:ext>
+    </p:extLst>
+  </p:cSld>
+  <p:clrMapOvr>
+    <a:masterClrMapping/>
+  </p:clrMapOvr>
+</p:notes>
+</file>
+
+<file path=ppt/notesSlides/notesSlide2.xml><?xml version="1.0" encoding="utf-8"?>
+<p:notes xmlns:a="http://schemas.openxmlformats.org/drawingml/2006/main" xmlns:r="http://schemas.openxmlformats.org/officeDocument/2006/relationships" xmlns:p="http://schemas.openxmlformats.org/presentationml/2006/main">
+  <p:cSld>
+    <p:spTree>
+      <p:nvGrpSpPr>
+        <p:cNvPr id="1" name=""/>
+        <p:cNvGrpSpPr/>
+        <p:nvPr/>
+      </p:nvGrpSpPr>
+      <p:grpSpPr>
+        <a:xfrm>
+          <a:off x="0" y="0"/>
+          <a:ext cx="0" cy="0"/>
+          <a:chOff x="0" y="0"/>
+          <a:chExt cx="0" cy="0"/>
+        </a:xfrm>
+      </p:grpSpPr>
+      <p:sp>
+        <p:nvSpPr>
+          <p:cNvPr id="2" name="Slide Image Placeholder 1"/>
+          <p:cNvSpPr>
+            <a:spLocks noGrp="1" noRot="1" noChangeAspect="1"/>
+          </p:cNvSpPr>
+          <p:nvPr>
+            <p:ph type="sldImg"/>
+          </p:nvPr>
+        </p:nvSpPr>
+        <p:spPr/>
+      </p:sp>
+      <p:sp>
+        <p:nvSpPr>
+          <p:cNvPr id="3" name="Notes Placeholder 2"/>
+          <p:cNvSpPr>
+            <a:spLocks noGrp="1"/>
+          </p:cNvSpPr>
+          <p:nvPr>
+            <p:ph type="body" idx="1"/>
+          </p:nvPr>
+        </p:nvSpPr>
+        <p:spPr/>
+        <p:txBody>
+          <a:bodyPr/>
+          <a:lstStyle/>
+          <a:p>
+            <a:r>
+              <a:rPr lang="en-US" dirty="0" err="1"/>
+              <a:t>caroline</a:t>
+            </a:r>
+            <a:endParaRPr lang="en-US" dirty="0"/>
+          </a:p>
+        </p:txBody>
+      </p:sp>
+      <p:sp>
+        <p:nvSpPr>
+          <p:cNvPr id="4" name="Slide Number Placeholder 3"/>
+          <p:cNvSpPr>
+            <a:spLocks noGrp="1"/>
+          </p:cNvSpPr>
+          <p:nvPr>
+            <p:ph type="sldNum" sz="quarter" idx="5"/>
+          </p:nvPr>
+        </p:nvSpPr>
+        <p:spPr/>
+        <p:txBody>
+          <a:bodyPr/>
+          <a:lstStyle/>
+          <a:p>
+            <a:fld id="{B78AC56A-6061-4999-A98E-F9A34B7E1C35}" type="slidenum">
+              <a:rPr lang="en-US" smtClean="0"/>
+              <a:t>3</a:t>
+            </a:fld>
+            <a:endParaRPr lang="en-US"/>
+          </a:p>
+        </p:txBody>
+      </p:sp>
+    </p:spTree>
+    <p:extLst>
+      <p:ext uri="{BB962C8B-B14F-4D97-AF65-F5344CB8AC3E}">
+        <p14:creationId xmlns:p14="http://schemas.microsoft.com/office/powerpoint/2010/main" val="2321390170"/>
+      </p:ext>
+    </p:extLst>
+  </p:cSld>
+  <p:clrMapOvr>
+    <a:masterClrMapping/>
+  </p:clrMapOvr>
+</p:notes>
+</file>
+
+<file path=ppt/notesSlides/notesSlide3.xml><?xml version="1.0" encoding="utf-8"?>
+<p:notes xmlns:a="http://schemas.openxmlformats.org/drawingml/2006/main" xmlns:r="http://schemas.openxmlformats.org/officeDocument/2006/relationships" xmlns:p="http://schemas.openxmlformats.org/presentationml/2006/main">
+  <p:cSld>
+    <p:spTree>
+      <p:nvGrpSpPr>
+        <p:cNvPr id="1" name=""/>
+        <p:cNvGrpSpPr/>
+        <p:nvPr/>
+      </p:nvGrpSpPr>
+      <p:grpSpPr>
+        <a:xfrm>
+          <a:off x="0" y="0"/>
+          <a:ext cx="0" cy="0"/>
+          <a:chOff x="0" y="0"/>
+          <a:chExt cx="0" cy="0"/>
+        </a:xfrm>
+      </p:grpSpPr>
+      <p:sp>
+        <p:nvSpPr>
+          <p:cNvPr id="2" name="Slide Image Placeholder 1"/>
+          <p:cNvSpPr>
+            <a:spLocks noGrp="1" noRot="1" noChangeAspect="1"/>
+          </p:cNvSpPr>
+          <p:nvPr>
+            <p:ph type="sldImg"/>
+          </p:nvPr>
+        </p:nvSpPr>
+        <p:spPr/>
+      </p:sp>
+      <p:sp>
+        <p:nvSpPr>
+          <p:cNvPr id="3" name="Notes Placeholder 2"/>
+          <p:cNvSpPr>
+            <a:spLocks noGrp="1"/>
+          </p:cNvSpPr>
+          <p:nvPr>
+            <p:ph type="body" idx="1"/>
+          </p:nvPr>
+        </p:nvSpPr>
+        <p:spPr/>
+        <p:txBody>
+          <a:bodyPr/>
+          <a:lstStyle/>
+          <a:p>
+            <a:r>
+              <a:rPr lang="en-US" dirty="0"/>
+              <a:t>Caroline</a:t>
+            </a:r>
+          </a:p>
+          <a:p>
+            <a:endParaRPr lang="en-US" dirty="0"/>
+          </a:p>
+        </p:txBody>
+      </p:sp>
+      <p:sp>
+        <p:nvSpPr>
+          <p:cNvPr id="4" name="Slide Number Placeholder 3"/>
+          <p:cNvSpPr>
+            <a:spLocks noGrp="1"/>
+          </p:cNvSpPr>
+          <p:nvPr>
+            <p:ph type="sldNum" sz="quarter" idx="5"/>
+          </p:nvPr>
+        </p:nvSpPr>
+        <p:spPr/>
+        <p:txBody>
+          <a:bodyPr/>
+          <a:lstStyle/>
+          <a:p>
+            <a:fld id="{B78AC56A-6061-4999-A98E-F9A34B7E1C35}" type="slidenum">
+              <a:rPr lang="en-US" smtClean="0"/>
+              <a:t>4</a:t>
+            </a:fld>
+            <a:endParaRPr lang="en-US"/>
+          </a:p>
+        </p:txBody>
+      </p:sp>
+    </p:spTree>
+    <p:extLst>
+      <p:ext uri="{BB962C8B-B14F-4D97-AF65-F5344CB8AC3E}">
+        <p14:creationId xmlns:p14="http://schemas.microsoft.com/office/powerpoint/2010/main" val="2198439809"/>
+      </p:ext>
+    </p:extLst>
+  </p:cSld>
+  <p:clrMapOvr>
+    <a:masterClrMapping/>
+  </p:clrMapOvr>
+</p:notes>
+</file>
+
+<file path=ppt/notesSlides/notesSlide4.xml><?xml version="1.0" encoding="utf-8"?>
+<p:notes xmlns:a="http://schemas.openxmlformats.org/drawingml/2006/main" xmlns:r="http://schemas.openxmlformats.org/officeDocument/2006/relationships" xmlns:p="http://schemas.openxmlformats.org/presentationml/2006/main">
+  <p:cSld>
+    <p:spTree>
+      <p:nvGrpSpPr>
+        <p:cNvPr id="1" name=""/>
+        <p:cNvGrpSpPr/>
+        <p:nvPr/>
+      </p:nvGrpSpPr>
+      <p:grpSpPr>
+        <a:xfrm>
+          <a:off x="0" y="0"/>
+          <a:ext cx="0" cy="0"/>
+          <a:chOff x="0" y="0"/>
+          <a:chExt cx="0" cy="0"/>
+        </a:xfrm>
+      </p:grpSpPr>
+      <p:sp>
+        <p:nvSpPr>
+          <p:cNvPr id="2" name="Slide Image Placeholder 1"/>
+          <p:cNvSpPr>
+            <a:spLocks noGrp="1" noRot="1" noChangeAspect="1"/>
+          </p:cNvSpPr>
+          <p:nvPr>
+            <p:ph type="sldImg"/>
+          </p:nvPr>
+        </p:nvSpPr>
+        <p:spPr/>
+      </p:sp>
+      <p:sp>
+        <p:nvSpPr>
+          <p:cNvPr id="3" name="Notes Placeholder 2"/>
+          <p:cNvSpPr>
+            <a:spLocks noGrp="1"/>
+          </p:cNvSpPr>
+          <p:nvPr>
+            <p:ph type="body" idx="1"/>
+          </p:nvPr>
+        </p:nvSpPr>
+        <p:spPr/>
+        <p:txBody>
+          <a:bodyPr/>
+          <a:lstStyle/>
+          <a:p>
+            <a:r>
+              <a:rPr lang="en-US" dirty="0" err="1"/>
+              <a:t>keqi</a:t>
+            </a:r>
+            <a:endParaRPr lang="en-US" dirty="0"/>
+          </a:p>
+        </p:txBody>
+      </p:sp>
+      <p:sp>
+        <p:nvSpPr>
+          <p:cNvPr id="4" name="Slide Number Placeholder 3"/>
+          <p:cNvSpPr>
+            <a:spLocks noGrp="1"/>
+          </p:cNvSpPr>
+          <p:nvPr>
+            <p:ph type="sldNum" sz="quarter" idx="5"/>
+          </p:nvPr>
+        </p:nvSpPr>
+        <p:spPr/>
+        <p:txBody>
+          <a:bodyPr/>
+          <a:lstStyle/>
+          <a:p>
+            <a:fld id="{B78AC56A-6061-4999-A98E-F9A34B7E1C35}" type="slidenum">
+              <a:rPr lang="en-US" smtClean="0"/>
+              <a:t>5</a:t>
+            </a:fld>
+            <a:endParaRPr lang="en-US"/>
+          </a:p>
+        </p:txBody>
+      </p:sp>
+    </p:spTree>
+    <p:extLst>
+      <p:ext uri="{BB962C8B-B14F-4D97-AF65-F5344CB8AC3E}">
+        <p14:creationId xmlns:p14="http://schemas.microsoft.com/office/powerpoint/2010/main" val="457785700"/>
+      </p:ext>
+    </p:extLst>
+  </p:cSld>
+  <p:clrMapOvr>
+    <a:masterClrMapping/>
+  </p:clrMapOvr>
+</p:notes>
+</file>
+
+<file path=ppt/notesSlides/notesSlide5.xml><?xml version="1.0" encoding="utf-8"?>
+<p:notes xmlns:a="http://schemas.openxmlformats.org/drawingml/2006/main" xmlns:r="http://schemas.openxmlformats.org/officeDocument/2006/relationships" xmlns:p="http://schemas.openxmlformats.org/presentationml/2006/main">
+  <p:cSld>
+    <p:spTree>
+      <p:nvGrpSpPr>
+        <p:cNvPr id="1" name=""/>
+        <p:cNvGrpSpPr/>
+        <p:nvPr/>
+      </p:nvGrpSpPr>
+      <p:grpSpPr>
+        <a:xfrm>
+          <a:off x="0" y="0"/>
+          <a:ext cx="0" cy="0"/>
+          <a:chOff x="0" y="0"/>
+          <a:chExt cx="0" cy="0"/>
+        </a:xfrm>
+      </p:grpSpPr>
+      <p:sp>
+        <p:nvSpPr>
+          <p:cNvPr id="2" name="Slide Image Placeholder 1"/>
+          <p:cNvSpPr>
+            <a:spLocks noGrp="1" noRot="1" noChangeAspect="1"/>
+          </p:cNvSpPr>
+          <p:nvPr>
+            <p:ph type="sldImg"/>
+          </p:nvPr>
+        </p:nvSpPr>
+        <p:spPr/>
+      </p:sp>
+      <p:sp>
+        <p:nvSpPr>
+          <p:cNvPr id="3" name="Notes Placeholder 2"/>
+          <p:cNvSpPr>
+            <a:spLocks noGrp="1"/>
+          </p:cNvSpPr>
+          <p:nvPr>
+            <p:ph type="body" idx="1"/>
+          </p:nvPr>
+        </p:nvSpPr>
+        <p:spPr/>
+        <p:txBody>
+          <a:bodyPr/>
+          <a:lstStyle/>
+          <a:p>
+            <a:r>
+              <a:rPr lang="en-US" dirty="0" err="1"/>
+              <a:t>rachel</a:t>
+            </a:r>
+            <a:endParaRPr lang="en-US" dirty="0"/>
+          </a:p>
+        </p:txBody>
+      </p:sp>
+      <p:sp>
+        <p:nvSpPr>
+          <p:cNvPr id="4" name="Slide Number Placeholder 3"/>
+          <p:cNvSpPr>
+            <a:spLocks noGrp="1"/>
+          </p:cNvSpPr>
+          <p:nvPr>
+            <p:ph type="sldNum" sz="quarter" idx="5"/>
+          </p:nvPr>
+        </p:nvSpPr>
+        <p:spPr/>
+        <p:txBody>
+          <a:bodyPr/>
+          <a:lstStyle/>
+          <a:p>
+            <a:fld id="{B78AC56A-6061-4999-A98E-F9A34B7E1C35}" type="slidenum">
+              <a:rPr lang="en-US" smtClean="0"/>
+              <a:t>6</a:t>
+            </a:fld>
+            <a:endParaRPr lang="en-US"/>
+          </a:p>
+        </p:txBody>
+      </p:sp>
+    </p:spTree>
+    <p:extLst>
+      <p:ext uri="{BB962C8B-B14F-4D97-AF65-F5344CB8AC3E}">
+        <p14:creationId xmlns:p14="http://schemas.microsoft.com/office/powerpoint/2010/main" val="1940982666"/>
+      </p:ext>
+    </p:extLst>
+  </p:cSld>
+  <p:clrMapOvr>
+    <a:masterClrMapping/>
+  </p:clrMapOvr>
+</p:notes>
+</file>
+
+<file path=ppt/notesSlides/notesSlide6.xml><?xml version="1.0" encoding="utf-8"?>
+<p:notes xmlns:a="http://schemas.openxmlformats.org/drawingml/2006/main" xmlns:r="http://schemas.openxmlformats.org/officeDocument/2006/relationships" xmlns:p="http://schemas.openxmlformats.org/presentationml/2006/main">
+  <p:cSld>
+    <p:spTree>
+      <p:nvGrpSpPr>
+        <p:cNvPr id="1" name=""/>
+        <p:cNvGrpSpPr/>
+        <p:nvPr/>
+      </p:nvGrpSpPr>
+      <p:grpSpPr>
+        <a:xfrm>
+          <a:off x="0" y="0"/>
+          <a:ext cx="0" cy="0"/>
+          <a:chOff x="0" y="0"/>
+          <a:chExt cx="0" cy="0"/>
+        </a:xfrm>
+      </p:grpSpPr>
+      <p:sp>
+        <p:nvSpPr>
+          <p:cNvPr id="2" name="Slide Image Placeholder 1"/>
+          <p:cNvSpPr>
+            <a:spLocks noGrp="1" noRot="1" noChangeAspect="1"/>
+          </p:cNvSpPr>
+          <p:nvPr>
+            <p:ph type="sldImg"/>
+          </p:nvPr>
+        </p:nvSpPr>
+        <p:spPr/>
+      </p:sp>
+      <p:sp>
+        <p:nvSpPr>
+          <p:cNvPr id="3" name="Notes Placeholder 2"/>
+          <p:cNvSpPr>
+            <a:spLocks noGrp="1"/>
+          </p:cNvSpPr>
+          <p:nvPr>
+            <p:ph type="body" idx="1"/>
+          </p:nvPr>
+        </p:nvSpPr>
+        <p:spPr/>
+        <p:txBody>
+          <a:bodyPr/>
+          <a:lstStyle/>
+          <a:p>
+            <a:r>
+              <a:rPr lang="en-US" dirty="0"/>
+              <a:t>Hubert</a:t>
+            </a:r>
+          </a:p>
+        </p:txBody>
+      </p:sp>
+      <p:sp>
+        <p:nvSpPr>
+          <p:cNvPr id="4" name="Slide Number Placeholder 3"/>
+          <p:cNvSpPr>
+            <a:spLocks noGrp="1"/>
+          </p:cNvSpPr>
+          <p:nvPr>
+            <p:ph type="sldNum" sz="quarter" idx="5"/>
+          </p:nvPr>
+        </p:nvSpPr>
+        <p:spPr/>
+        <p:txBody>
+          <a:bodyPr/>
+          <a:lstStyle/>
+          <a:p>
+            <a:fld id="{B78AC56A-6061-4999-A98E-F9A34B7E1C35}" type="slidenum">
+              <a:rPr lang="en-US" smtClean="0"/>
+              <a:t>7</a:t>
+            </a:fld>
+            <a:endParaRPr lang="en-US"/>
+          </a:p>
+        </p:txBody>
+      </p:sp>
+    </p:spTree>
+    <p:extLst>
+      <p:ext uri="{BB962C8B-B14F-4D97-AF65-F5344CB8AC3E}">
+        <p14:creationId xmlns:p14="http://schemas.microsoft.com/office/powerpoint/2010/main" val="3857117621"/>
+      </p:ext>
+    </p:extLst>
+  </p:cSld>
+  <p:clrMapOvr>
+    <a:masterClrMapping/>
+  </p:clrMapOvr>
+</p:notes>
+</file>
+
+<file path=ppt/notesSlides/notesSlide7.xml><?xml version="1.0" encoding="utf-8"?>
+<p:notes xmlns:a="http://schemas.openxmlformats.org/drawingml/2006/main" xmlns:r="http://schemas.openxmlformats.org/officeDocument/2006/relationships" xmlns:p="http://schemas.openxmlformats.org/presentationml/2006/main">
+  <p:cSld>
+    <p:spTree>
+      <p:nvGrpSpPr>
+        <p:cNvPr id="1" name=""/>
+        <p:cNvGrpSpPr/>
+        <p:nvPr/>
+      </p:nvGrpSpPr>
+      <p:grpSpPr>
+        <a:xfrm>
+          <a:off x="0" y="0"/>
+          <a:ext cx="0" cy="0"/>
+          <a:chOff x="0" y="0"/>
+          <a:chExt cx="0" cy="0"/>
+        </a:xfrm>
+      </p:grpSpPr>
+      <p:sp>
+        <p:nvSpPr>
+          <p:cNvPr id="2" name="Slide Image Placeholder 1"/>
+          <p:cNvSpPr>
+            <a:spLocks noGrp="1" noRot="1" noChangeAspect="1"/>
+          </p:cNvSpPr>
+          <p:nvPr>
+            <p:ph type="sldImg"/>
+          </p:nvPr>
+        </p:nvSpPr>
+        <p:spPr/>
+      </p:sp>
+      <p:sp>
+        <p:nvSpPr>
+          <p:cNvPr id="3" name="Notes Placeholder 2"/>
+          <p:cNvSpPr>
+            <a:spLocks noGrp="1"/>
+          </p:cNvSpPr>
+          <p:nvPr>
+            <p:ph type="body" idx="1"/>
+          </p:nvPr>
+        </p:nvSpPr>
+        <p:spPr/>
+        <p:txBody>
+          <a:bodyPr/>
+          <a:lstStyle/>
+          <a:p>
+            <a:r>
+              <a:rPr lang="en-US" dirty="0"/>
+              <a:t>Caroline</a:t>
+            </a:r>
+          </a:p>
+        </p:txBody>
+      </p:sp>
+      <p:sp>
+        <p:nvSpPr>
+          <p:cNvPr id="4" name="Slide Number Placeholder 3"/>
+          <p:cNvSpPr>
+            <a:spLocks noGrp="1"/>
+          </p:cNvSpPr>
+          <p:nvPr>
+            <p:ph type="sldNum" sz="quarter" idx="5"/>
+          </p:nvPr>
+        </p:nvSpPr>
+        <p:spPr/>
+        <p:txBody>
+          <a:bodyPr/>
+          <a:lstStyle/>
+          <a:p>
+            <a:fld id="{B78AC56A-6061-4999-A98E-F9A34B7E1C35}" type="slidenum">
+              <a:rPr lang="en-US" smtClean="0"/>
+              <a:t>8</a:t>
+            </a:fld>
+            <a:endParaRPr lang="en-US"/>
+          </a:p>
+        </p:txBody>
+      </p:sp>
+    </p:spTree>
+    <p:extLst>
+      <p:ext uri="{BB962C8B-B14F-4D97-AF65-F5344CB8AC3E}">
+        <p14:creationId xmlns:p14="http://schemas.microsoft.com/office/powerpoint/2010/main" val="51119041"/>
+      </p:ext>
+    </p:extLst>
+  </p:cSld>
+  <p:clrMapOvr>
+    <a:masterClrMapping/>
+  </p:clrMapOvr>
+</p:notes>
+</file>
+
+<file path=ppt/notesSlides/notesSlide8.xml><?xml version="1.0" encoding="utf-8"?>
+<p:notes xmlns:a="http://schemas.openxmlformats.org/drawingml/2006/main" xmlns:r="http://schemas.openxmlformats.org/officeDocument/2006/relationships" xmlns:p="http://schemas.openxmlformats.org/presentationml/2006/main">
+  <p:cSld>
+    <p:spTree>
+      <p:nvGrpSpPr>
+        <p:cNvPr id="1" name=""/>
+        <p:cNvGrpSpPr/>
+        <p:nvPr/>
+      </p:nvGrpSpPr>
+      <p:grpSpPr>
+        <a:xfrm>
+          <a:off x="0" y="0"/>
+          <a:ext cx="0" cy="0"/>
+          <a:chOff x="0" y="0"/>
+          <a:chExt cx="0" cy="0"/>
+        </a:xfrm>
+      </p:grpSpPr>
+      <p:sp>
+        <p:nvSpPr>
+          <p:cNvPr id="2" name="Slide Image Placeholder 1"/>
+          <p:cNvSpPr>
+            <a:spLocks noGrp="1" noRot="1" noChangeAspect="1"/>
+          </p:cNvSpPr>
+          <p:nvPr>
+            <p:ph type="sldImg"/>
+          </p:nvPr>
+        </p:nvSpPr>
+        <p:spPr/>
+      </p:sp>
+      <p:sp>
+        <p:nvSpPr>
+          <p:cNvPr id="3" name="Notes Placeholder 2"/>
+          <p:cNvSpPr>
+            <a:spLocks noGrp="1"/>
+          </p:cNvSpPr>
+          <p:nvPr>
+            <p:ph type="body" idx="1"/>
+          </p:nvPr>
+        </p:nvSpPr>
+        <p:spPr/>
+        <p:txBody>
+          <a:bodyPr/>
+          <a:lstStyle/>
+          <a:p>
+            <a:r>
+              <a:rPr lang="en-US" dirty="0"/>
+              <a:t>Rachel</a:t>
+            </a:r>
+          </a:p>
+        </p:txBody>
+      </p:sp>
+      <p:sp>
+        <p:nvSpPr>
+          <p:cNvPr id="4" name="Slide Number Placeholder 3"/>
+          <p:cNvSpPr>
+            <a:spLocks noGrp="1"/>
+          </p:cNvSpPr>
+          <p:nvPr>
+            <p:ph type="sldNum" sz="quarter" idx="5"/>
+          </p:nvPr>
+        </p:nvSpPr>
+        <p:spPr/>
+        <p:txBody>
+          <a:bodyPr/>
+          <a:lstStyle/>
+          <a:p>
+            <a:fld id="{B78AC56A-6061-4999-A98E-F9A34B7E1C35}" type="slidenum">
+              <a:rPr lang="en-US" smtClean="0"/>
+              <a:t>9</a:t>
+            </a:fld>
+            <a:endParaRPr lang="en-US"/>
+          </a:p>
+        </p:txBody>
+      </p:sp>
+    </p:spTree>
+    <p:extLst>
+      <p:ext uri="{BB962C8B-B14F-4D97-AF65-F5344CB8AC3E}">
+        <p14:creationId xmlns:p14="http://schemas.microsoft.com/office/powerpoint/2010/main" val="752203016"/>
+      </p:ext>
+    </p:extLst>
+  </p:cSld>
+  <p:clrMapOvr>
+    <a:masterClrMapping/>
+  </p:clrMapOvr>
+</p:notes>
+</file>
+
+<file path=ppt/notesSlides/notesSlide9.xml><?xml version="1.0" encoding="utf-8"?>
+<p:notes xmlns:a="http://schemas.openxmlformats.org/drawingml/2006/main" xmlns:r="http://schemas.openxmlformats.org/officeDocument/2006/relationships" xmlns:p="http://schemas.openxmlformats.org/presentationml/2006/main">
+  <p:cSld>
+    <p:spTree>
+      <p:nvGrpSpPr>
+        <p:cNvPr id="1" name=""/>
+        <p:cNvGrpSpPr/>
+        <p:nvPr/>
+      </p:nvGrpSpPr>
+      <p:grpSpPr>
+        <a:xfrm>
+          <a:off x="0" y="0"/>
+          <a:ext cx="0" cy="0"/>
+          <a:chOff x="0" y="0"/>
+          <a:chExt cx="0" cy="0"/>
+        </a:xfrm>
+      </p:grpSpPr>
+      <p:sp>
+        <p:nvSpPr>
+          <p:cNvPr id="2" name="Slide Image Placeholder 1"/>
+          <p:cNvSpPr>
+            <a:spLocks noGrp="1" noRot="1" noChangeAspect="1"/>
+          </p:cNvSpPr>
+          <p:nvPr>
+            <p:ph type="sldImg"/>
+          </p:nvPr>
+        </p:nvSpPr>
+        <p:spPr/>
+      </p:sp>
+      <p:sp>
+        <p:nvSpPr>
+          <p:cNvPr id="3" name="Notes Placeholder 2"/>
+          <p:cNvSpPr>
+            <a:spLocks noGrp="1"/>
+          </p:cNvSpPr>
+          <p:nvPr>
+            <p:ph type="body" idx="1"/>
+          </p:nvPr>
+        </p:nvSpPr>
+        <p:spPr/>
+        <p:txBody>
+          <a:bodyPr/>
+          <a:lstStyle/>
+          <a:p>
+            <a:r>
+              <a:rPr lang="en-US" dirty="0" err="1"/>
+              <a:t>Keqi</a:t>
+            </a:r>
+            <a:endParaRPr lang="en-US" dirty="0"/>
+          </a:p>
+        </p:txBody>
+      </p:sp>
+      <p:sp>
+        <p:nvSpPr>
+          <p:cNvPr id="4" name="Slide Number Placeholder 3"/>
+          <p:cNvSpPr>
+            <a:spLocks noGrp="1"/>
+          </p:cNvSpPr>
+          <p:nvPr>
+            <p:ph type="sldNum" sz="quarter" idx="5"/>
+          </p:nvPr>
+        </p:nvSpPr>
+        <p:spPr/>
+        <p:txBody>
+          <a:bodyPr/>
+          <a:lstStyle/>
+          <a:p>
+            <a:fld id="{B78AC56A-6061-4999-A98E-F9A34B7E1C35}" type="slidenum">
+              <a:rPr lang="en-US" smtClean="0"/>
+              <a:t>10</a:t>
+            </a:fld>
+            <a:endParaRPr lang="en-US"/>
+          </a:p>
+        </p:txBody>
+      </p:sp>
+    </p:spTree>
+    <p:extLst>
+      <p:ext uri="{BB962C8B-B14F-4D97-AF65-F5344CB8AC3E}">
+        <p14:creationId xmlns:p14="http://schemas.microsoft.com/office/powerpoint/2010/main" val="1015683925"/>
+      </p:ext>
+    </p:extLst>
+  </p:cSld>
+  <p:clrMapOvr>
+    <a:masterClrMapping/>
+  </p:clrMapOvr>
+</p:notes>
 </file>
 
 <file path=ppt/slideLayouts/slideLayout1.xml><?xml version="1.0" encoding="utf-8"?>
@@ -8483,7 +9278,7 @@
           <p:nvPr/>
         </p:nvPicPr>
         <p:blipFill>
-          <a:blip r:embed="rId2"/>
+          <a:blip r:embed="rId3"/>
           <a:stretch>
             <a:fillRect/>
           </a:stretch>
@@ -8729,7 +9524,7 @@
         </p:nvSpPr>
         <p:spPr>
           <a:xfrm>
-            <a:off x="7521388" y="5728447"/>
+            <a:off x="9677084" y="6382834"/>
             <a:ext cx="3792071" cy="369332"/>
           </a:xfrm>
           <a:prstGeom prst="rect">
@@ -8826,8 +9621,8 @@
         </p:nvSpPr>
         <p:spPr>
           <a:xfrm>
-            <a:off x="2348753" y="1479176"/>
-            <a:ext cx="9448799" cy="5047130"/>
+            <a:off x="1443319" y="1353671"/>
+            <a:ext cx="10354234" cy="5172635"/>
           </a:xfrm>
         </p:spPr>
         <p:txBody>
@@ -8841,7 +9636,7 @@
               <a:buAutoNum type="arabicPeriod"/>
             </a:pPr>
             <a:r>
-              <a:rPr lang="en-US" sz="1200" dirty="0"/>
+              <a:rPr lang="en-US" sz="1300" dirty="0"/>
               <a:t>How have changes in discharge (i.e. water quantity) interacted with nutrient enrichment (i.e. water quality) in the Missouri River Basin?</a:t>
             </a:r>
           </a:p>
@@ -8850,7 +9645,7 @@
               <a:buNone/>
             </a:pPr>
             <a:r>
-              <a:rPr lang="en-US" sz="1200" dirty="0"/>
+              <a:rPr lang="en-US" sz="1300" dirty="0"/>
               <a:t>	a) Nutrient levels have increased over time </a:t>
             </a:r>
           </a:p>
@@ -8859,7 +9654,7 @@
               <a:buNone/>
             </a:pPr>
             <a:r>
-              <a:rPr lang="en-US" sz="1200" dirty="0"/>
+              <a:rPr lang="en-US" sz="1300" dirty="0"/>
               <a:t>	 b) Discharge has become more variable over time </a:t>
             </a:r>
           </a:p>
@@ -8868,7 +9663,7 @@
               <a:buNone/>
             </a:pPr>
             <a:r>
-              <a:rPr lang="en-US" sz="1200" dirty="0"/>
+              <a:rPr lang="en-US" sz="1300" dirty="0"/>
               <a:t>	 c) Nutrient levels increase with discharge </a:t>
             </a:r>
           </a:p>
@@ -8877,7 +9672,7 @@
               <a:buFont typeface="+mj-lt"/>
               <a:buAutoNum type="arabicPeriod"/>
             </a:pPr>
-            <a:endParaRPr lang="en-US" sz="1200" dirty="0"/>
+            <a:endParaRPr lang="en-US" sz="1300" dirty="0"/>
           </a:p>
           <a:p>
             <a:pPr>
@@ -8885,7 +9680,7 @@
               <a:buAutoNum type="arabicPeriod" startAt="2"/>
             </a:pPr>
             <a:r>
-              <a:rPr lang="en-US" sz="1200" dirty="0"/>
+              <a:rPr lang="en-US" sz="1300" dirty="0"/>
               <a:t>What effects do specific flood and drought events have on the water quality and quantity of rivers in the Missouri River Basin areas of interest?</a:t>
             </a:r>
           </a:p>
@@ -8894,7 +9689,7 @@
               <a:buNone/>
             </a:pPr>
             <a:r>
-              <a:rPr lang="en-US" sz="1200" dirty="0"/>
+              <a:rPr lang="en-US" sz="1300" dirty="0"/>
               <a:t>	 a) Rivers will exhibit a flushing behavior due to the land use and type of flow during storms </a:t>
             </a:r>
           </a:p>
@@ -8903,7 +9698,7 @@
               <a:buNone/>
             </a:pPr>
             <a:r>
-              <a:rPr lang="en-US" sz="1200" dirty="0"/>
+              <a:rPr lang="en-US" sz="1300" dirty="0"/>
               <a:t>	  b) Discharge will decrease during drought due to decreased overland flow. </a:t>
             </a:r>
           </a:p>
@@ -8912,7 +9707,7 @@
               <a:buFont typeface="+mj-lt"/>
               <a:buAutoNum type="arabicPeriod"/>
             </a:pPr>
-            <a:endParaRPr lang="en-US" sz="1200" dirty="0"/>
+            <a:endParaRPr lang="en-US" sz="1300" dirty="0"/>
           </a:p>
           <a:p>
             <a:pPr>
@@ -8920,7 +9715,7 @@
               <a:buAutoNum type="arabicPeriod" startAt="3"/>
             </a:pPr>
             <a:r>
-              <a:rPr lang="en-US" sz="1200" dirty="0"/>
+              <a:rPr lang="en-US" sz="1300" dirty="0"/>
               <a:t>What factors contribute to the variability of total nitrogen in the rivers?</a:t>
             </a:r>
           </a:p>
@@ -8929,7 +9724,7 @@
               <a:buNone/>
             </a:pPr>
             <a:r>
-              <a:rPr lang="en-US" sz="1200" dirty="0"/>
+              <a:rPr lang="en-US" sz="1300" dirty="0"/>
               <a:t>	a) Land use, year, discharge, phosphorus, and HUC region will contribute to the variability of total nitrogen across sites </a:t>
             </a:r>
           </a:p>
@@ -8938,7 +9733,7 @@
               <a:buFont typeface="+mj-lt"/>
               <a:buAutoNum type="arabicPeriod"/>
             </a:pPr>
-            <a:endParaRPr lang="en-US" sz="1200" dirty="0"/>
+            <a:endParaRPr lang="en-US" sz="1300" dirty="0"/>
           </a:p>
           <a:p>
             <a:pPr>
@@ -8946,7 +9741,7 @@
               <a:buAutoNum type="arabicPeriod" startAt="4"/>
             </a:pPr>
             <a:r>
-              <a:rPr lang="en-US" sz="1200" dirty="0"/>
+              <a:rPr lang="en-US" sz="1300" dirty="0"/>
               <a:t>Given past and current data, what can we predict about the future state of water in the Missouri River Basin?</a:t>
             </a:r>
           </a:p>
@@ -8955,7 +9750,7 @@
               <a:buNone/>
             </a:pPr>
             <a:r>
-              <a:rPr lang="en-US" sz="1200" dirty="0"/>
+              <a:rPr lang="en-US" sz="1300" dirty="0"/>
               <a:t>	a) Total flow in the Missouri River Basin is decreasing (non-stationary) over time </a:t>
             </a:r>
           </a:p>
@@ -8964,7 +9759,7 @@
               <a:buNone/>
             </a:pPr>
             <a:r>
-              <a:rPr lang="en-US" sz="1200" dirty="0"/>
+              <a:rPr lang="en-US" sz="1300" dirty="0"/>
               <a:t>	b) The future situation of the river basin will see the continuation of current trends of decreasing overall volume of flow. </a:t>
             </a:r>
           </a:p>
@@ -9234,7 +10029,7 @@
           <p:nvPr/>
         </p:nvPicPr>
         <p:blipFill>
-          <a:blip r:embed="rId2"/>
+          <a:blip r:embed="rId3"/>
           <a:stretch>
             <a:fillRect/>
           </a:stretch>

</xml_diff>

<commit_message>
Finish my part in PPT
</commit_message>
<xml_diff>
--- a/TeamDocs/Examining the Hydrologic Properties of the Missouri River.pptx
+++ b/TeamDocs/Examining the Hydrologic Properties of the Missouri River.pptx
@@ -12,12 +12,12 @@
     <p:sldId id="257" r:id="rId3"/>
     <p:sldId id="258" r:id="rId4"/>
     <p:sldId id="259" r:id="rId5"/>
-    <p:sldId id="260" r:id="rId6"/>
+    <p:sldId id="267" r:id="rId6"/>
     <p:sldId id="261" r:id="rId7"/>
     <p:sldId id="262" r:id="rId8"/>
     <p:sldId id="263" r:id="rId9"/>
     <p:sldId id="264" r:id="rId10"/>
-    <p:sldId id="265" r:id="rId11"/>
+    <p:sldId id="268" r:id="rId11"/>
     <p:sldId id="266" r:id="rId12"/>
   </p:sldIdLst>
   <p:sldSz cx="12192000" cy="6858000"/>
@@ -8934,19 +8934,472 @@
             <p:ph idx="1"/>
           </p:nvPr>
         </p:nvSpPr>
-        <p:spPr/>
+        <p:spPr>
+          <a:xfrm>
+            <a:off x="687388" y="1446164"/>
+            <a:ext cx="3056839" cy="725905"/>
+          </a:xfrm>
+        </p:spPr>
         <p:txBody>
-          <a:bodyPr/>
+          <a:bodyPr>
+            <a:normAutofit/>
+          </a:bodyPr>
           <a:lstStyle/>
           <a:p>
-            <a:endParaRPr lang="en-US"/>
+            <a:r>
+              <a:rPr lang="en-US" dirty="0">
+                <a:solidFill>
+                  <a:srgbClr val="000000"/>
+                </a:solidFill>
+                <a:latin typeface="LMRoman12-Regular"/>
+              </a:rPr>
+              <a:t>Mann-</a:t>
+            </a:r>
+            <a:r>
+              <a:rPr lang="en-US" dirty="0" err="1">
+                <a:solidFill>
+                  <a:srgbClr val="000000"/>
+                </a:solidFill>
+                <a:latin typeface="LMRoman12-Regular"/>
+              </a:rPr>
+              <a:t>Kandall</a:t>
+            </a:r>
+            <a:r>
+              <a:rPr lang="en-US" dirty="0">
+                <a:solidFill>
+                  <a:srgbClr val="000000"/>
+                </a:solidFill>
+                <a:latin typeface="LMRoman12-Regular"/>
+              </a:rPr>
+              <a:t> Trend Test</a:t>
+            </a:r>
+            <a:br>
+              <a:rPr lang="en-US" dirty="0"/>
+            </a:br>
+            <a:endParaRPr lang="en-US" dirty="0">
+              <a:solidFill>
+                <a:srgbClr val="000000"/>
+              </a:solidFill>
+              <a:latin typeface="LMRoman12-Regular"/>
+            </a:endParaRPr>
           </a:p>
         </p:txBody>
       </p:sp>
+      <p:sp>
+        <p:nvSpPr>
+          <p:cNvPr id="6" name="Content Placeholder 2">
+            <a:extLst>
+              <a:ext uri="{FF2B5EF4-FFF2-40B4-BE49-F238E27FC236}">
+                <a16:creationId xmlns:a16="http://schemas.microsoft.com/office/drawing/2014/main" id="{D3BEF952-CFDF-4D3E-9504-3F47EED29506}"/>
+              </a:ext>
+            </a:extLst>
+          </p:cNvPr>
+          <p:cNvSpPr txBox="1">
+            <a:spLocks/>
+          </p:cNvSpPr>
+          <p:nvPr/>
+        </p:nvSpPr>
+        <p:spPr>
+          <a:xfrm>
+            <a:off x="4600073" y="1446164"/>
+            <a:ext cx="7601146" cy="2301732"/>
+          </a:xfrm>
+          <a:prstGeom prst="rect">
+            <a:avLst/>
+          </a:prstGeom>
+        </p:spPr>
+        <p:txBody>
+          <a:bodyPr vert="horz" lIns="91440" tIns="45720" rIns="91440" bIns="45720" rtlCol="0">
+            <a:normAutofit/>
+          </a:bodyPr>
+          <a:lstStyle>
+            <a:lvl1pPr marL="342900" indent="-342900" algn="l" defTabSz="457200" rtl="0" eaLnBrk="1" latinLnBrk="0" hangingPunct="1">
+              <a:spcBef>
+                <a:spcPts val="1000"/>
+              </a:spcBef>
+              <a:spcAft>
+                <a:spcPts val="0"/>
+              </a:spcAft>
+              <a:buClr>
+                <a:schemeClr val="accent1"/>
+              </a:buClr>
+              <a:buFont typeface="Wingdings 3" charset="2"/>
+              <a:buChar char=""/>
+              <a:defRPr sz="1800" kern="1200">
+                <a:solidFill>
+                  <a:schemeClr val="tx1">
+                    <a:lumMod val="75000"/>
+                    <a:lumOff val="25000"/>
+                  </a:schemeClr>
+                </a:solidFill>
+                <a:latin typeface="+mn-lt"/>
+                <a:ea typeface="+mn-ea"/>
+                <a:cs typeface="+mn-cs"/>
+              </a:defRPr>
+            </a:lvl1pPr>
+            <a:lvl2pPr marL="742950" indent="-285750" algn="l" defTabSz="457200" rtl="0" eaLnBrk="1" latinLnBrk="0" hangingPunct="1">
+              <a:spcBef>
+                <a:spcPts val="1000"/>
+              </a:spcBef>
+              <a:spcAft>
+                <a:spcPts val="0"/>
+              </a:spcAft>
+              <a:buClr>
+                <a:schemeClr val="accent1"/>
+              </a:buClr>
+              <a:buFont typeface="Wingdings 3" charset="2"/>
+              <a:buChar char=""/>
+              <a:defRPr sz="1600" kern="1200">
+                <a:solidFill>
+                  <a:schemeClr val="tx1">
+                    <a:lumMod val="75000"/>
+                    <a:lumOff val="25000"/>
+                  </a:schemeClr>
+                </a:solidFill>
+                <a:latin typeface="+mn-lt"/>
+                <a:ea typeface="+mn-ea"/>
+                <a:cs typeface="+mn-cs"/>
+              </a:defRPr>
+            </a:lvl2pPr>
+            <a:lvl3pPr marL="1143000" indent="-228600" algn="l" defTabSz="457200" rtl="0" eaLnBrk="1" latinLnBrk="0" hangingPunct="1">
+              <a:spcBef>
+                <a:spcPts val="1000"/>
+              </a:spcBef>
+              <a:spcAft>
+                <a:spcPts val="0"/>
+              </a:spcAft>
+              <a:buClr>
+                <a:schemeClr val="accent1"/>
+              </a:buClr>
+              <a:buFont typeface="Wingdings 3" charset="2"/>
+              <a:buChar char=""/>
+              <a:defRPr sz="1400" kern="1200">
+                <a:solidFill>
+                  <a:schemeClr val="tx1">
+                    <a:lumMod val="75000"/>
+                    <a:lumOff val="25000"/>
+                  </a:schemeClr>
+                </a:solidFill>
+                <a:latin typeface="+mn-lt"/>
+                <a:ea typeface="+mn-ea"/>
+                <a:cs typeface="+mn-cs"/>
+              </a:defRPr>
+            </a:lvl3pPr>
+            <a:lvl4pPr marL="1600200" indent="-228600" algn="l" defTabSz="457200" rtl="0" eaLnBrk="1" latinLnBrk="0" hangingPunct="1">
+              <a:spcBef>
+                <a:spcPts val="1000"/>
+              </a:spcBef>
+              <a:spcAft>
+                <a:spcPts val="0"/>
+              </a:spcAft>
+              <a:buClr>
+                <a:schemeClr val="accent1"/>
+              </a:buClr>
+              <a:buFont typeface="Wingdings 3" charset="2"/>
+              <a:buChar char=""/>
+              <a:defRPr sz="1200" kern="1200">
+                <a:solidFill>
+                  <a:schemeClr val="tx1">
+                    <a:lumMod val="75000"/>
+                    <a:lumOff val="25000"/>
+                  </a:schemeClr>
+                </a:solidFill>
+                <a:latin typeface="+mn-lt"/>
+                <a:ea typeface="+mn-ea"/>
+                <a:cs typeface="+mn-cs"/>
+              </a:defRPr>
+            </a:lvl4pPr>
+            <a:lvl5pPr marL="2057400" indent="-228600" algn="l" defTabSz="457200" rtl="0" eaLnBrk="1" latinLnBrk="0" hangingPunct="1">
+              <a:spcBef>
+                <a:spcPts val="1000"/>
+              </a:spcBef>
+              <a:spcAft>
+                <a:spcPts val="0"/>
+              </a:spcAft>
+              <a:buClr>
+                <a:schemeClr val="accent1"/>
+              </a:buClr>
+              <a:buFont typeface="Wingdings 3" charset="2"/>
+              <a:buChar char=""/>
+              <a:defRPr sz="1200" kern="1200">
+                <a:solidFill>
+                  <a:schemeClr val="tx1">
+                    <a:lumMod val="75000"/>
+                    <a:lumOff val="25000"/>
+                  </a:schemeClr>
+                </a:solidFill>
+                <a:latin typeface="+mn-lt"/>
+                <a:ea typeface="+mn-ea"/>
+                <a:cs typeface="+mn-cs"/>
+              </a:defRPr>
+            </a:lvl5pPr>
+            <a:lvl6pPr marL="2514600" indent="-228600" algn="l" defTabSz="457200" rtl="0" eaLnBrk="1" latinLnBrk="0" hangingPunct="1">
+              <a:spcBef>
+                <a:spcPts val="1000"/>
+              </a:spcBef>
+              <a:spcAft>
+                <a:spcPts val="0"/>
+              </a:spcAft>
+              <a:buClr>
+                <a:schemeClr val="accent1"/>
+              </a:buClr>
+              <a:buFont typeface="Wingdings 3" charset="2"/>
+              <a:buChar char=""/>
+              <a:defRPr sz="1200" kern="1200">
+                <a:solidFill>
+                  <a:schemeClr val="tx1">
+                    <a:lumMod val="75000"/>
+                    <a:lumOff val="25000"/>
+                  </a:schemeClr>
+                </a:solidFill>
+                <a:latin typeface="+mn-lt"/>
+                <a:ea typeface="+mn-ea"/>
+                <a:cs typeface="+mn-cs"/>
+              </a:defRPr>
+            </a:lvl6pPr>
+            <a:lvl7pPr marL="2971800" indent="-228600" algn="l" defTabSz="457200" rtl="0" eaLnBrk="1" latinLnBrk="0" hangingPunct="1">
+              <a:spcBef>
+                <a:spcPts val="1000"/>
+              </a:spcBef>
+              <a:spcAft>
+                <a:spcPts val="0"/>
+              </a:spcAft>
+              <a:buClr>
+                <a:schemeClr val="accent1"/>
+              </a:buClr>
+              <a:buFont typeface="Wingdings 3" charset="2"/>
+              <a:buChar char=""/>
+              <a:defRPr sz="1200" kern="1200">
+                <a:solidFill>
+                  <a:schemeClr val="tx1">
+                    <a:lumMod val="75000"/>
+                    <a:lumOff val="25000"/>
+                  </a:schemeClr>
+                </a:solidFill>
+                <a:latin typeface="+mn-lt"/>
+                <a:ea typeface="+mn-ea"/>
+                <a:cs typeface="+mn-cs"/>
+              </a:defRPr>
+            </a:lvl7pPr>
+            <a:lvl8pPr marL="3429000" indent="-228600" algn="l" defTabSz="457200" rtl="0" eaLnBrk="1" latinLnBrk="0" hangingPunct="1">
+              <a:spcBef>
+                <a:spcPts val="1000"/>
+              </a:spcBef>
+              <a:spcAft>
+                <a:spcPts val="0"/>
+              </a:spcAft>
+              <a:buClr>
+                <a:schemeClr val="accent1"/>
+              </a:buClr>
+              <a:buFont typeface="Wingdings 3" charset="2"/>
+              <a:buChar char=""/>
+              <a:defRPr sz="1200" kern="1200">
+                <a:solidFill>
+                  <a:schemeClr val="tx1">
+                    <a:lumMod val="75000"/>
+                    <a:lumOff val="25000"/>
+                  </a:schemeClr>
+                </a:solidFill>
+                <a:latin typeface="+mn-lt"/>
+                <a:ea typeface="+mn-ea"/>
+                <a:cs typeface="+mn-cs"/>
+              </a:defRPr>
+            </a:lvl8pPr>
+            <a:lvl9pPr marL="3886200" indent="-228600" algn="l" defTabSz="457200" rtl="0" eaLnBrk="1" latinLnBrk="0" hangingPunct="1">
+              <a:spcBef>
+                <a:spcPts val="1000"/>
+              </a:spcBef>
+              <a:spcAft>
+                <a:spcPts val="0"/>
+              </a:spcAft>
+              <a:buClr>
+                <a:schemeClr val="accent1"/>
+              </a:buClr>
+              <a:buFont typeface="Wingdings 3" charset="2"/>
+              <a:buChar char=""/>
+              <a:defRPr sz="1200" kern="1200">
+                <a:solidFill>
+                  <a:schemeClr val="tx1">
+                    <a:lumMod val="75000"/>
+                    <a:lumOff val="25000"/>
+                  </a:schemeClr>
+                </a:solidFill>
+                <a:latin typeface="+mn-lt"/>
+                <a:ea typeface="+mn-ea"/>
+                <a:cs typeface="+mn-cs"/>
+              </a:defRPr>
+            </a:lvl9pPr>
+          </a:lstStyle>
+          <a:p>
+            <a:r>
+              <a:rPr lang="en-US" dirty="0">
+                <a:solidFill>
+                  <a:srgbClr val="000000"/>
+                </a:solidFill>
+                <a:latin typeface="LMRoman12-Regular"/>
+              </a:rPr>
+              <a:t>Autoregressive and Moving Average Models (ARMA)</a:t>
+            </a:r>
+          </a:p>
+          <a:p>
+            <a:pPr marL="0" indent="0">
+              <a:buNone/>
+            </a:pPr>
+            <a:r>
+              <a:rPr lang="en-US" sz="1400" dirty="0">
+                <a:solidFill>
+                  <a:srgbClr val="000000"/>
+                </a:solidFill>
+                <a:latin typeface="LMRoman12-Regular"/>
+              </a:rPr>
+              <a:t>	</a:t>
+            </a:r>
+            <a:r>
+              <a:rPr lang="en-US" sz="1400" dirty="0"/>
+              <a:t>AR part: involves regressing the variable on its own lagged (i.e., past) values</a:t>
+            </a:r>
+          </a:p>
+          <a:p>
+            <a:pPr marL="0" indent="0">
+              <a:buNone/>
+            </a:pPr>
+            <a:r>
+              <a:rPr lang="en-US" sz="1400" dirty="0"/>
+              <a:t>	MA part: involves modeling the error term as a linear combination of error terms occurring contemporaneously and at various times in the past</a:t>
+            </a:r>
+            <a:endParaRPr lang="en-US" sz="1400" dirty="0">
+              <a:solidFill>
+                <a:srgbClr val="000000"/>
+              </a:solidFill>
+              <a:latin typeface="LMRoman12-Regular"/>
+            </a:endParaRPr>
+          </a:p>
+        </p:txBody>
+      </p:sp>
+      <p:pic>
+        <p:nvPicPr>
+          <p:cNvPr id="12" name="Picture 11">
+            <a:extLst>
+              <a:ext uri="{FF2B5EF4-FFF2-40B4-BE49-F238E27FC236}">
+                <a16:creationId xmlns:a16="http://schemas.microsoft.com/office/drawing/2014/main" id="{9A1132A2-7949-477E-AB70-30657F6DC9AF}"/>
+              </a:ext>
+            </a:extLst>
+          </p:cNvPr>
+          <p:cNvPicPr>
+            <a:picLocks noChangeAspect="1"/>
+          </p:cNvPicPr>
+          <p:nvPr/>
+        </p:nvPicPr>
+        <p:blipFill>
+          <a:blip r:embed="rId3"/>
+          <a:stretch>
+            <a:fillRect/>
+          </a:stretch>
+        </p:blipFill>
+        <p:spPr>
+          <a:xfrm>
+            <a:off x="5703215" y="2767639"/>
+            <a:ext cx="6435576" cy="1321651"/>
+          </a:xfrm>
+          <a:prstGeom prst="rect">
+            <a:avLst/>
+          </a:prstGeom>
+        </p:spPr>
+      </p:pic>
+      <p:pic>
+        <p:nvPicPr>
+          <p:cNvPr id="14" name="Picture 13">
+            <a:extLst>
+              <a:ext uri="{FF2B5EF4-FFF2-40B4-BE49-F238E27FC236}">
+                <a16:creationId xmlns:a16="http://schemas.microsoft.com/office/drawing/2014/main" id="{EF7E5630-C135-4376-9B86-46FA354D061B}"/>
+              </a:ext>
+            </a:extLst>
+          </p:cNvPr>
+          <p:cNvPicPr>
+            <a:picLocks noChangeAspect="1"/>
+          </p:cNvPicPr>
+          <p:nvPr/>
+        </p:nvPicPr>
+        <p:blipFill>
+          <a:blip r:embed="rId4"/>
+          <a:stretch>
+            <a:fillRect/>
+          </a:stretch>
+        </p:blipFill>
+        <p:spPr>
+          <a:xfrm>
+            <a:off x="5703215" y="4370089"/>
+            <a:ext cx="6435575" cy="1358183"/>
+          </a:xfrm>
+          <a:prstGeom prst="rect">
+            <a:avLst/>
+          </a:prstGeom>
+        </p:spPr>
+      </p:pic>
+      <p:pic>
+        <p:nvPicPr>
+          <p:cNvPr id="16" name="Picture 15">
+            <a:extLst>
+              <a:ext uri="{FF2B5EF4-FFF2-40B4-BE49-F238E27FC236}">
+                <a16:creationId xmlns:a16="http://schemas.microsoft.com/office/drawing/2014/main" id="{14AAC89B-1769-464C-A7D5-0982214DFDED}"/>
+              </a:ext>
+            </a:extLst>
+          </p:cNvPr>
+          <p:cNvPicPr>
+            <a:picLocks noChangeAspect="1"/>
+          </p:cNvPicPr>
+          <p:nvPr/>
+        </p:nvPicPr>
+        <p:blipFill>
+          <a:blip r:embed="rId5"/>
+          <a:stretch>
+            <a:fillRect/>
+          </a:stretch>
+        </p:blipFill>
+        <p:spPr>
+          <a:xfrm>
+            <a:off x="328580" y="1938381"/>
+            <a:ext cx="4271493" cy="4172811"/>
+          </a:xfrm>
+          <a:prstGeom prst="rect">
+            <a:avLst/>
+          </a:prstGeom>
+        </p:spPr>
+      </p:pic>
+      <p:pic>
+        <p:nvPicPr>
+          <p:cNvPr id="18" name="Picture 17">
+            <a:extLst>
+              <a:ext uri="{FF2B5EF4-FFF2-40B4-BE49-F238E27FC236}">
+                <a16:creationId xmlns:a16="http://schemas.microsoft.com/office/drawing/2014/main" id="{216C7D38-2AFA-4C74-B67A-4A7EE6306BBE}"/>
+              </a:ext>
+            </a:extLst>
+          </p:cNvPr>
+          <p:cNvPicPr>
+            <a:picLocks noChangeAspect="1"/>
+          </p:cNvPicPr>
+          <p:nvPr/>
+        </p:nvPicPr>
+        <p:blipFill>
+          <a:blip r:embed="rId6"/>
+          <a:stretch>
+            <a:fillRect/>
+          </a:stretch>
+        </p:blipFill>
+        <p:spPr>
+          <a:xfrm>
+            <a:off x="3869653" y="5239816"/>
+            <a:ext cx="1924991" cy="1523668"/>
+          </a:xfrm>
+          <a:prstGeom prst="rect">
+            <a:avLst/>
+          </a:prstGeom>
+        </p:spPr>
+      </p:pic>
     </p:spTree>
     <p:extLst>
       <p:ext uri="{BB962C8B-B14F-4D97-AF65-F5344CB8AC3E}">
-        <p14:creationId xmlns:p14="http://schemas.microsoft.com/office/powerpoint/2010/main" val="2266532941"/>
+        <p14:creationId xmlns:p14="http://schemas.microsoft.com/office/powerpoint/2010/main" val="2575706305"/>
       </p:ext>
     </p:extLst>
   </p:cSld>
@@ -10323,21 +10776,15 @@
             <p:ph type="title"/>
           </p:nvPr>
         </p:nvSpPr>
-        <p:spPr>
-          <a:xfrm>
-            <a:off x="2592925" y="624110"/>
-            <a:ext cx="8911687" cy="1280890"/>
-          </a:xfrm>
-        </p:spPr>
+        <p:spPr/>
         <p:txBody>
           <a:bodyPr/>
           <a:lstStyle/>
           <a:p>
             <a:r>
-              <a:rPr lang="en-US"/>
+              <a:rPr lang="en-US" dirty="0"/>
               <a:t>Dataset Information</a:t>
             </a:r>
-            <a:endParaRPr lang="en-US" dirty="0"/>
           </a:p>
         </p:txBody>
       </p:sp>
@@ -10359,22 +10806,123 @@
         </p:nvSpPr>
         <p:spPr>
           <a:xfrm>
-            <a:off x="2589212" y="2133600"/>
+            <a:off x="2325262" y="1367483"/>
             <a:ext cx="8915400" cy="3777622"/>
           </a:xfrm>
         </p:spPr>
         <p:txBody>
-          <a:bodyPr/>
+          <a:bodyPr>
+            <a:normAutofit/>
+          </a:bodyPr>
           <a:lstStyle/>
           <a:p>
-            <a:endParaRPr lang="en-US"/>
+            <a:r>
+              <a:rPr lang="en-US" dirty="0"/>
+              <a:t>S</a:t>
+            </a:r>
+            <a:r>
+              <a:rPr lang="en-US" altLang="zh-CN" dirty="0"/>
+              <a:t>ource: The United States Geological Survey (USGS) database </a:t>
+            </a:r>
+          </a:p>
+          <a:p>
+            <a:pPr marL="0" indent="0">
+              <a:buNone/>
+            </a:pPr>
+            <a:r>
+              <a:rPr lang="en-US" altLang="zh-CN" dirty="0"/>
+              <a:t>	</a:t>
+            </a:r>
+            <a:r>
+              <a:rPr lang="en-US" altLang="zh-CN" sz="1600" dirty="0"/>
+              <a:t>National Water Information System (NWIS) </a:t>
+            </a:r>
+            <a:r>
+              <a:rPr lang="en-US" dirty="0">
+                <a:hlinkClick r:id="rId3"/>
+              </a:rPr>
+              <a:t>https://waterdata.usgs.gov/nwis</a:t>
+            </a:r>
+            <a:endParaRPr lang="en-US" altLang="zh-CN" dirty="0"/>
+          </a:p>
+          <a:p>
+            <a:r>
+              <a:rPr lang="en-US" dirty="0"/>
+              <a:t>Steps:</a:t>
+            </a:r>
+          </a:p>
+          <a:p>
+            <a:pPr marL="800100" lvl="1" indent="-342900">
+              <a:buAutoNum type="arabicParenR"/>
+            </a:pPr>
+            <a:r>
+              <a:rPr lang="en-US" dirty="0"/>
+              <a:t>Filter sites in HUC 1020 - 1030 to only show us sites that contained discharge, nitrogen, and phosphorus data. </a:t>
+            </a:r>
+          </a:p>
+          <a:p>
+            <a:pPr marL="800100" lvl="1" indent="-342900">
+              <a:buAutoNum type="arabicParenR"/>
+            </a:pPr>
+            <a:r>
+              <a:rPr lang="en-US" dirty="0"/>
+              <a:t>Choose 2 sites from each HUC sub basin for a total of 22 </a:t>
+            </a:r>
+          </a:p>
+          <a:p>
+            <a:pPr marL="457200" lvl="1" indent="0">
+              <a:buNone/>
+            </a:pPr>
+            <a:r>
+              <a:rPr lang="en-US" dirty="0"/>
+              <a:t>	By comparing the periods of records for each chosen variables and finding the sites with the longest periods of records. </a:t>
+            </a:r>
+          </a:p>
+          <a:p>
+            <a:pPr marL="457200" lvl="1" indent="0">
+              <a:buNone/>
+            </a:pPr>
+            <a:r>
+              <a:rPr lang="en-US" dirty="0"/>
+              <a:t>	Two sites per HUC region: maintain a digestible scope.</a:t>
+            </a:r>
           </a:p>
         </p:txBody>
       </p:sp>
+      <p:pic>
+        <p:nvPicPr>
+          <p:cNvPr id="5" name="Picture 4">
+            <a:extLst>
+              <a:ext uri="{FF2B5EF4-FFF2-40B4-BE49-F238E27FC236}">
+                <a16:creationId xmlns:a16="http://schemas.microsoft.com/office/drawing/2014/main" id="{B4CF3F96-671D-4FF9-8AAC-9DB0305E4E86}"/>
+              </a:ext>
+            </a:extLst>
+          </p:cNvPr>
+          <p:cNvPicPr>
+            <a:picLocks noChangeAspect="1"/>
+          </p:cNvPicPr>
+          <p:nvPr/>
+        </p:nvPicPr>
+        <p:blipFill>
+          <a:blip r:embed="rId4"/>
+          <a:stretch>
+            <a:fillRect/>
+          </a:stretch>
+        </p:blipFill>
+        <p:spPr>
+          <a:xfrm>
+            <a:off x="2592925" y="4787160"/>
+            <a:ext cx="8162880" cy="1878054"/>
+          </a:xfrm>
+          <a:prstGeom prst="rect">
+            <a:avLst/>
+          </a:prstGeom>
+        </p:spPr>
+      </p:pic>
     </p:spTree>
     <p:extLst>
       <p:ext uri="{BB962C8B-B14F-4D97-AF65-F5344CB8AC3E}">
-        <p14:creationId xmlns:p14="http://schemas.microsoft.com/office/powerpoint/2010/main" val="585316436"/>
+        <p14:creationId xmlns:p14="http://schemas.microsoft.com/office/powerpoint/2010/main" val="1836959453"/>
       </p:ext>
     </p:extLst>
   </p:cSld>
@@ -15164,7 +15712,7 @@
         </p:blipFill>
         <p:spPr>
           <a:xfrm>
-            <a:off x="2783124" y="912188"/>
+            <a:off x="2783124" y="921615"/>
             <a:ext cx="4031436" cy="3126870"/>
           </a:xfrm>
           <a:prstGeom prst="rect">
@@ -15654,8 +16202,8 @@
           </a:p>
         </p:txBody>
       </p:sp>
-      <mc:AlternateContent xmlns:mc="http://schemas.openxmlformats.org/markup-compatibility/2006">
-        <mc:Choice xmlns:a14="http://schemas.microsoft.com/office/drawing/2010/main" Requires="a14">
+      <mc:AlternateContent xmlns:mc="http://schemas.openxmlformats.org/markup-compatibility/2006" xmlns:a14="http://schemas.microsoft.com/office/drawing/2010/main">
+        <mc:Choice Requires="a14">
           <p:sp>
             <p:nvSpPr>
               <p:cNvPr id="4" name="TextBox 3">
@@ -15684,6 +16232,7 @@
               </a:bodyPr>
               <a:lstStyle/>
               <a:p>
+                <a:pPr/>
                 <a14:m>
                   <m:oMathPara xmlns:m="http://schemas.openxmlformats.org/officeDocument/2006/math">
                     <m:oMathParaPr>
@@ -15847,7 +16396,7 @@
             </p:txBody>
           </p:sp>
         </mc:Choice>
-        <mc:Fallback>
+        <mc:Fallback xmlns="">
           <p:sp>
             <p:nvSpPr>
               <p:cNvPr id="4" name="TextBox 3">

</xml_diff>

<commit_message>
Updates to 'Our Approach' slide to include more information about how we chose our sites.
</commit_message>
<xml_diff>
--- a/TeamDocs/Examining the Hydrologic Properties of the Missouri River.pptx
+++ b/TeamDocs/Examining the Hydrologic Properties of the Missouri River.pptx
@@ -207,7 +207,7 @@
           <a:p>
             <a:fld id="{B56C8744-E6BD-4290-891C-CE220D660B8A}" type="datetimeFigureOut">
               <a:rPr lang="en-US" smtClean="0"/>
-              <a:t>11/20/2019</a:t>
+              <a:t>11/20/19</a:t>
             </a:fld>
             <a:endParaRPr lang="en-US"/>
           </a:p>
@@ -1453,7 +1453,7 @@
             <a:fld id="{B61BEF0D-F0BB-DE4B-95CE-6DB70DBA9567}" type="datetimeFigureOut">
               <a:rPr lang="en-US" dirty="0"/>
               <a:pPr/>
-              <a:t>11/20/2019</a:t>
+              <a:t>11/20/19</a:t>
             </a:fld>
             <a:endParaRPr lang="en-US" dirty="0"/>
           </a:p>
@@ -1788,7 +1788,7 @@
             <a:fld id="{B61BEF0D-F0BB-DE4B-95CE-6DB70DBA9567}" type="datetimeFigureOut">
               <a:rPr lang="en-US" dirty="0"/>
               <a:pPr/>
-              <a:t>11/20/2019</a:t>
+              <a:t>11/20/19</a:t>
             </a:fld>
             <a:endParaRPr lang="en-US" dirty="0"/>
           </a:p>
@@ -2186,7 +2186,7 @@
             <a:fld id="{B61BEF0D-F0BB-DE4B-95CE-6DB70DBA9567}" type="datetimeFigureOut">
               <a:rPr lang="en-US" dirty="0"/>
               <a:pPr/>
-              <a:t>11/20/2019</a:t>
+              <a:t>11/20/19</a:t>
             </a:fld>
             <a:endParaRPr lang="en-US" dirty="0"/>
           </a:p>
@@ -2518,7 +2518,7 @@
             <a:fld id="{B61BEF0D-F0BB-DE4B-95CE-6DB70DBA9567}" type="datetimeFigureOut">
               <a:rPr lang="en-US" dirty="0"/>
               <a:pPr/>
-              <a:t>11/20/2019</a:t>
+              <a:t>11/20/19</a:t>
             </a:fld>
             <a:endParaRPr lang="en-US" dirty="0"/>
           </a:p>
@@ -2835,7 +2835,7 @@
             <a:fld id="{B61BEF0D-F0BB-DE4B-95CE-6DB70DBA9567}" type="datetimeFigureOut">
               <a:rPr lang="en-US" dirty="0"/>
               <a:pPr/>
-              <a:t>11/20/2019</a:t>
+              <a:t>11/20/19</a:t>
             </a:fld>
             <a:endParaRPr lang="en-US" dirty="0"/>
           </a:p>
@@ -3228,7 +3228,7 @@
             <a:fld id="{B61BEF0D-F0BB-DE4B-95CE-6DB70DBA9567}" type="datetimeFigureOut">
               <a:rPr lang="en-US" dirty="0"/>
               <a:pPr/>
-              <a:t>11/20/2019</a:t>
+              <a:t>11/20/19</a:t>
             </a:fld>
             <a:endParaRPr lang="en-US" dirty="0"/>
           </a:p>
@@ -3482,7 +3482,7 @@
             <a:fld id="{B61BEF0D-F0BB-DE4B-95CE-6DB70DBA9567}" type="datetimeFigureOut">
               <a:rPr lang="en-US" dirty="0"/>
               <a:pPr/>
-              <a:t>11/20/2019</a:t>
+              <a:t>11/20/19</a:t>
             </a:fld>
             <a:endParaRPr lang="en-US" dirty="0"/>
           </a:p>
@@ -3741,7 +3741,7 @@
             <a:fld id="{B61BEF0D-F0BB-DE4B-95CE-6DB70DBA9567}" type="datetimeFigureOut">
               <a:rPr lang="en-US" dirty="0"/>
               <a:pPr/>
-              <a:t>11/20/2019</a:t>
+              <a:t>11/20/19</a:t>
             </a:fld>
             <a:endParaRPr lang="en-US" dirty="0"/>
           </a:p>
@@ -4000,7 +4000,7 @@
             <a:fld id="{B61BEF0D-F0BB-DE4B-95CE-6DB70DBA9567}" type="datetimeFigureOut">
               <a:rPr lang="en-US" dirty="0"/>
               <a:pPr/>
-              <a:t>11/20/2019</a:t>
+              <a:t>11/20/19</a:t>
             </a:fld>
             <a:endParaRPr lang="en-US" dirty="0"/>
           </a:p>
@@ -4326,7 +4326,7 @@
             <a:fld id="{B61BEF0D-F0BB-DE4B-95CE-6DB70DBA9567}" type="datetimeFigureOut">
               <a:rPr lang="en-US" dirty="0"/>
               <a:pPr/>
-              <a:t>11/20/2019</a:t>
+              <a:t>11/20/19</a:t>
             </a:fld>
             <a:endParaRPr lang="en-US" dirty="0"/>
           </a:p>
@@ -4646,7 +4646,7 @@
             <a:fld id="{B61BEF0D-F0BB-DE4B-95CE-6DB70DBA9567}" type="datetimeFigureOut">
               <a:rPr lang="en-US" dirty="0"/>
               <a:pPr/>
-              <a:t>11/20/2019</a:t>
+              <a:t>11/20/19</a:t>
             </a:fld>
             <a:endParaRPr lang="en-US" dirty="0"/>
           </a:p>
@@ -5100,7 +5100,7 @@
             <a:fld id="{B61BEF0D-F0BB-DE4B-95CE-6DB70DBA9567}" type="datetimeFigureOut">
               <a:rPr lang="en-US" dirty="0"/>
               <a:pPr/>
-              <a:t>11/20/2019</a:t>
+              <a:t>11/20/19</a:t>
             </a:fld>
             <a:endParaRPr lang="en-US" dirty="0"/>
           </a:p>
@@ -5302,7 +5302,7 @@
             <a:fld id="{B61BEF0D-F0BB-DE4B-95CE-6DB70DBA9567}" type="datetimeFigureOut">
               <a:rPr lang="en-US" dirty="0"/>
               <a:pPr/>
-              <a:t>11/20/2019</a:t>
+              <a:t>11/20/19</a:t>
             </a:fld>
             <a:endParaRPr lang="en-US" dirty="0"/>
           </a:p>
@@ -5476,7 +5476,7 @@
             <a:fld id="{B61BEF0D-F0BB-DE4B-95CE-6DB70DBA9567}" type="datetimeFigureOut">
               <a:rPr lang="en-US" dirty="0"/>
               <a:pPr/>
-              <a:t>11/20/2019</a:t>
+              <a:t>11/20/19</a:t>
             </a:fld>
             <a:endParaRPr lang="en-US" dirty="0"/>
           </a:p>
@@ -5806,7 +5806,7 @@
             <a:fld id="{B61BEF0D-F0BB-DE4B-95CE-6DB70DBA9567}" type="datetimeFigureOut">
               <a:rPr lang="en-US" dirty="0"/>
               <a:pPr/>
-              <a:t>11/20/2019</a:t>
+              <a:t>11/20/19</a:t>
             </a:fld>
             <a:endParaRPr lang="en-US" dirty="0"/>
           </a:p>
@@ -6148,7 +6148,7 @@
             <a:fld id="{B61BEF0D-F0BB-DE4B-95CE-6DB70DBA9567}" type="datetimeFigureOut">
               <a:rPr lang="en-US" dirty="0"/>
               <a:pPr/>
-              <a:t>11/20/2019</a:t>
+              <a:t>11/20/19</a:t>
             </a:fld>
             <a:endParaRPr lang="en-US" dirty="0"/>
           </a:p>
@@ -8262,7 +8262,7 @@
             <a:fld id="{B61BEF0D-F0BB-DE4B-95CE-6DB70DBA9567}" type="datetimeFigureOut">
               <a:rPr lang="en-US" dirty="0"/>
               <a:pPr/>
-              <a:t>11/20/2019</a:t>
+              <a:t>11/20/19</a:t>
             </a:fld>
             <a:endParaRPr lang="en-US" dirty="0"/>
           </a:p>
@@ -10469,7 +10469,14 @@
           <a:p>
             <a:r>
               <a:rPr lang="en-US" dirty="0"/>
-              <a:t>22 sites</a:t>
+              <a:t>22 sites chosen throughout HUCs 1020 – 1030</a:t>
+            </a:r>
+          </a:p>
+          <a:p>
+            <a:pPr lvl="1"/>
+            <a:r>
+              <a:rPr lang="en-US" dirty="0"/>
+              <a:t>2 sites per HUC</a:t>
             </a:r>
           </a:p>
           <a:p>
@@ -10477,6 +10484,12 @@
               <a:rPr lang="en-US" dirty="0"/>
               <a:t>Nitrogen, Phosphorus, Discharge, Time</a:t>
             </a:r>
+          </a:p>
+          <a:p>
+            <a:pPr marL="0" indent="0">
+              <a:buNone/>
+            </a:pPr>
+            <a:endParaRPr lang="en-US" dirty="0"/>
           </a:p>
           <a:p>
             <a:endParaRPr lang="en-US" dirty="0"/>

</xml_diff>

<commit_message>
Nov20 Haoyu. Added slides for intro and Q1
</commit_message>
<xml_diff>
--- a/TeamDocs/Examining the Hydrologic Properties of the Missouri River.pptx
+++ b/TeamDocs/Examining the Hydrologic Properties of the Missouri River.pptx
@@ -9,12 +9,12 @@
   </p:notesMasterIdLst>
   <p:sldIdLst>
     <p:sldId id="256" r:id="rId2"/>
-    <p:sldId id="257" r:id="rId3"/>
+    <p:sldId id="269" r:id="rId3"/>
     <p:sldId id="258" r:id="rId4"/>
     <p:sldId id="259" r:id="rId5"/>
     <p:sldId id="267" r:id="rId6"/>
     <p:sldId id="261" r:id="rId7"/>
-    <p:sldId id="262" r:id="rId8"/>
+    <p:sldId id="270" r:id="rId8"/>
     <p:sldId id="263" r:id="rId9"/>
     <p:sldId id="264" r:id="rId10"/>
     <p:sldId id="268" r:id="rId11"/>
@@ -207,7 +207,7 @@
           <a:p>
             <a:fld id="{B56C8744-E6BD-4290-891C-CE220D660B8A}" type="datetimeFigureOut">
               <a:rPr lang="en-US" smtClean="0"/>
-              <a:t>11/20/19</a:t>
+              <a:t>11/20/2019</a:t>
             </a:fld>
             <a:endParaRPr lang="en-US"/>
           </a:p>
@@ -520,7 +520,40 @@
           <a:p>
             <a:r>
               <a:rPr lang="en-US" dirty="0"/>
-              <a:t>Hubert</a:t>
+              <a:t>Hubert ~ 1min</a:t>
+            </a:r>
+          </a:p>
+          <a:p>
+            <a:r>
+              <a:rPr lang="en-US" dirty="0"/>
+              <a:t>As you may have known, the Missouri River is the largest river in North America, and it also has the second largest watershed of 338 million acres including a small part in Canada.</a:t>
+            </a:r>
+          </a:p>
+          <a:p>
+            <a:endParaRPr lang="en-US" dirty="0"/>
+          </a:p>
+          <a:p>
+            <a:r>
+              <a:rPr lang="en-US" dirty="0"/>
+              <a:t>The basin is primarily rural, but also has several large or medium-sized cities. As shown on this map, a large proportion of the region is agricultural land. 218 acres are related to agriculture, and two major land uses are cropland and pasture. </a:t>
+            </a:r>
+          </a:p>
+          <a:p>
+            <a:endParaRPr lang="en-US" dirty="0"/>
+          </a:p>
+          <a:p>
+            <a:r>
+              <a:rPr lang="en-US" dirty="0"/>
+              <a:t>Across the whole basin, agricultural lands are the predominant source for nutrient loading into water bodies. According to Clean Water Act 303 d list 2015, more than 160 waterbodies are impaired due to nutrient enrichment.</a:t>
+            </a:r>
+          </a:p>
+          <a:p>
+            <a:endParaRPr lang="en-US" dirty="0"/>
+          </a:p>
+          <a:p>
+            <a:r>
+              <a:rPr lang="en-US" dirty="0"/>
+              <a:t>Since most of agricultural lands are located in the lower Missouri basin, in this project we focused on sub-basins in the southeast.</a:t>
             </a:r>
           </a:p>
         </p:txBody>
@@ -961,7 +994,30 @@
           <a:p>
             <a:r>
               <a:rPr lang="en-US" dirty="0"/>
-              <a:t>Hubert</a:t>
+              <a:t>Hubert ~2min</a:t>
+            </a:r>
+          </a:p>
+          <a:p>
+            <a:r>
+              <a:rPr lang="en-US" dirty="0"/>
+              <a:t>To investigate the trend of nutrient concentration, we used long-term daily values and seasonal Mann-Kendal test. Among all 22 sites, 7 sites show significantly increasing trends in nitrogen concentration, while 7 show decreasing trends. For phosphorus, concentrations at 7 sites have increased over time, while decreased at other 5 sites. Despite inconsistent results at all sites, those on the mainstem show higher nutrient concentration, such as 7, 10, and 22.</a:t>
+            </a:r>
+          </a:p>
+          <a:p>
+            <a:endParaRPr lang="en-US" dirty="0"/>
+          </a:p>
+          <a:p>
+            <a:r>
+              <a:rPr lang="en-US" dirty="0"/>
+              <a:t>We further examined the interaction between discharge and nutrient concentration. High-</a:t>
+            </a:r>
+            <a:r>
+              <a:rPr lang="en-US" dirty="0" err="1"/>
+              <a:t>freq</a:t>
+            </a:r>
+            <a:r>
+              <a:rPr lang="en-US" dirty="0"/>
+              <a:t> data were used for sites where the data are available, and for all other sites daily values were used. The relationship was analyzed by linear model with total nitrogen as the response variable and discharge as the explanatory variable.18 out of the 22 sites show a significant positive relationships.</a:t>
             </a:r>
           </a:p>
         </p:txBody>
@@ -1453,7 +1509,7 @@
             <a:fld id="{B61BEF0D-F0BB-DE4B-95CE-6DB70DBA9567}" type="datetimeFigureOut">
               <a:rPr lang="en-US" dirty="0"/>
               <a:pPr/>
-              <a:t>11/20/19</a:t>
+              <a:t>11/20/2019</a:t>
             </a:fld>
             <a:endParaRPr lang="en-US" dirty="0"/>
           </a:p>
@@ -1788,7 +1844,7 @@
             <a:fld id="{B61BEF0D-F0BB-DE4B-95CE-6DB70DBA9567}" type="datetimeFigureOut">
               <a:rPr lang="en-US" dirty="0"/>
               <a:pPr/>
-              <a:t>11/20/19</a:t>
+              <a:t>11/20/2019</a:t>
             </a:fld>
             <a:endParaRPr lang="en-US" dirty="0"/>
           </a:p>
@@ -2186,7 +2242,7 @@
             <a:fld id="{B61BEF0D-F0BB-DE4B-95CE-6DB70DBA9567}" type="datetimeFigureOut">
               <a:rPr lang="en-US" dirty="0"/>
               <a:pPr/>
-              <a:t>11/20/19</a:t>
+              <a:t>11/20/2019</a:t>
             </a:fld>
             <a:endParaRPr lang="en-US" dirty="0"/>
           </a:p>
@@ -2518,7 +2574,7 @@
             <a:fld id="{B61BEF0D-F0BB-DE4B-95CE-6DB70DBA9567}" type="datetimeFigureOut">
               <a:rPr lang="en-US" dirty="0"/>
               <a:pPr/>
-              <a:t>11/20/19</a:t>
+              <a:t>11/20/2019</a:t>
             </a:fld>
             <a:endParaRPr lang="en-US" dirty="0"/>
           </a:p>
@@ -2835,7 +2891,7 @@
             <a:fld id="{B61BEF0D-F0BB-DE4B-95CE-6DB70DBA9567}" type="datetimeFigureOut">
               <a:rPr lang="en-US" dirty="0"/>
               <a:pPr/>
-              <a:t>11/20/19</a:t>
+              <a:t>11/20/2019</a:t>
             </a:fld>
             <a:endParaRPr lang="en-US" dirty="0"/>
           </a:p>
@@ -3228,7 +3284,7 @@
             <a:fld id="{B61BEF0D-F0BB-DE4B-95CE-6DB70DBA9567}" type="datetimeFigureOut">
               <a:rPr lang="en-US" dirty="0"/>
               <a:pPr/>
-              <a:t>11/20/19</a:t>
+              <a:t>11/20/2019</a:t>
             </a:fld>
             <a:endParaRPr lang="en-US" dirty="0"/>
           </a:p>
@@ -3482,7 +3538,7 @@
             <a:fld id="{B61BEF0D-F0BB-DE4B-95CE-6DB70DBA9567}" type="datetimeFigureOut">
               <a:rPr lang="en-US" dirty="0"/>
               <a:pPr/>
-              <a:t>11/20/19</a:t>
+              <a:t>11/20/2019</a:t>
             </a:fld>
             <a:endParaRPr lang="en-US" dirty="0"/>
           </a:p>
@@ -3741,7 +3797,7 @@
             <a:fld id="{B61BEF0D-F0BB-DE4B-95CE-6DB70DBA9567}" type="datetimeFigureOut">
               <a:rPr lang="en-US" dirty="0"/>
               <a:pPr/>
-              <a:t>11/20/19</a:t>
+              <a:t>11/20/2019</a:t>
             </a:fld>
             <a:endParaRPr lang="en-US" dirty="0"/>
           </a:p>
@@ -4000,7 +4056,7 @@
             <a:fld id="{B61BEF0D-F0BB-DE4B-95CE-6DB70DBA9567}" type="datetimeFigureOut">
               <a:rPr lang="en-US" dirty="0"/>
               <a:pPr/>
-              <a:t>11/20/19</a:t>
+              <a:t>11/20/2019</a:t>
             </a:fld>
             <a:endParaRPr lang="en-US" dirty="0"/>
           </a:p>
@@ -4326,7 +4382,7 @@
             <a:fld id="{B61BEF0D-F0BB-DE4B-95CE-6DB70DBA9567}" type="datetimeFigureOut">
               <a:rPr lang="en-US" dirty="0"/>
               <a:pPr/>
-              <a:t>11/20/19</a:t>
+              <a:t>11/20/2019</a:t>
             </a:fld>
             <a:endParaRPr lang="en-US" dirty="0"/>
           </a:p>
@@ -4646,7 +4702,7 @@
             <a:fld id="{B61BEF0D-F0BB-DE4B-95CE-6DB70DBA9567}" type="datetimeFigureOut">
               <a:rPr lang="en-US" dirty="0"/>
               <a:pPr/>
-              <a:t>11/20/19</a:t>
+              <a:t>11/20/2019</a:t>
             </a:fld>
             <a:endParaRPr lang="en-US" dirty="0"/>
           </a:p>
@@ -5100,7 +5156,7 @@
             <a:fld id="{B61BEF0D-F0BB-DE4B-95CE-6DB70DBA9567}" type="datetimeFigureOut">
               <a:rPr lang="en-US" dirty="0"/>
               <a:pPr/>
-              <a:t>11/20/19</a:t>
+              <a:t>11/20/2019</a:t>
             </a:fld>
             <a:endParaRPr lang="en-US" dirty="0"/>
           </a:p>
@@ -5302,7 +5358,7 @@
             <a:fld id="{B61BEF0D-F0BB-DE4B-95CE-6DB70DBA9567}" type="datetimeFigureOut">
               <a:rPr lang="en-US" dirty="0"/>
               <a:pPr/>
-              <a:t>11/20/19</a:t>
+              <a:t>11/20/2019</a:t>
             </a:fld>
             <a:endParaRPr lang="en-US" dirty="0"/>
           </a:p>
@@ -5476,7 +5532,7 @@
             <a:fld id="{B61BEF0D-F0BB-DE4B-95CE-6DB70DBA9567}" type="datetimeFigureOut">
               <a:rPr lang="en-US" dirty="0"/>
               <a:pPr/>
-              <a:t>11/20/19</a:t>
+              <a:t>11/20/2019</a:t>
             </a:fld>
             <a:endParaRPr lang="en-US" dirty="0"/>
           </a:p>
@@ -5806,7 +5862,7 @@
             <a:fld id="{B61BEF0D-F0BB-DE4B-95CE-6DB70DBA9567}" type="datetimeFigureOut">
               <a:rPr lang="en-US" dirty="0"/>
               <a:pPr/>
-              <a:t>11/20/19</a:t>
+              <a:t>11/20/2019</a:t>
             </a:fld>
             <a:endParaRPr lang="en-US" dirty="0"/>
           </a:p>
@@ -6148,7 +6204,7 @@
             <a:fld id="{B61BEF0D-F0BB-DE4B-95CE-6DB70DBA9567}" type="datetimeFigureOut">
               <a:rPr lang="en-US" dirty="0"/>
               <a:pPr/>
-              <a:t>11/20/19</a:t>
+              <a:t>11/20/2019</a:t>
             </a:fld>
             <a:endParaRPr lang="en-US" dirty="0"/>
           </a:p>
@@ -8262,7 +8318,7 @@
             <a:fld id="{B61BEF0D-F0BB-DE4B-95CE-6DB70DBA9567}" type="datetimeFigureOut">
               <a:rPr lang="en-US" dirty="0"/>
               <a:pPr/>
-              <a:t>11/20/19</a:t>
+              <a:t>11/20/2019</a:t>
             </a:fld>
             <a:endParaRPr lang="en-US" dirty="0"/>
           </a:p>
@@ -9495,6 +9551,451 @@
 <file path=ppt/slides/slide2.xml><?xml version="1.0" encoding="utf-8"?>
 <p:sld xmlns:a="http://schemas.openxmlformats.org/drawingml/2006/main" xmlns:r="http://schemas.openxmlformats.org/officeDocument/2006/relationships" xmlns:p="http://schemas.openxmlformats.org/presentationml/2006/main">
   <p:cSld>
+    <p:spTree>
+      <p:nvGrpSpPr>
+        <p:cNvPr id="1" name=""/>
+        <p:cNvGrpSpPr/>
+        <p:nvPr/>
+      </p:nvGrpSpPr>
+      <p:grpSpPr>
+        <a:xfrm>
+          <a:off x="0" y="0"/>
+          <a:ext cx="0" cy="0"/>
+          <a:chOff x="0" y="0"/>
+          <a:chExt cx="0" cy="0"/>
+        </a:xfrm>
+      </p:grpSpPr>
+      <p:sp>
+        <p:nvSpPr>
+          <p:cNvPr id="2" name="Title 1">
+            <a:extLst>
+              <a:ext uri="{FF2B5EF4-FFF2-40B4-BE49-F238E27FC236}">
+                <a16:creationId xmlns:a16="http://schemas.microsoft.com/office/drawing/2014/main" id="{D163DEE8-D523-418F-BF89-5DEB404CC53B}"/>
+              </a:ext>
+            </a:extLst>
+          </p:cNvPr>
+          <p:cNvSpPr>
+            <a:spLocks noGrp="1"/>
+          </p:cNvSpPr>
+          <p:nvPr>
+            <p:ph type="title"/>
+          </p:nvPr>
+        </p:nvSpPr>
+        <p:spPr>
+          <a:xfrm>
+            <a:off x="649224" y="645106"/>
+            <a:ext cx="3650279" cy="1259894"/>
+          </a:xfrm>
+        </p:spPr>
+        <p:txBody>
+          <a:bodyPr>
+            <a:normAutofit/>
+          </a:bodyPr>
+          <a:lstStyle/>
+          <a:p>
+            <a:r>
+              <a:rPr lang="en-US" dirty="0"/>
+              <a:t>Study Rationale</a:t>
+            </a:r>
+          </a:p>
+        </p:txBody>
+      </p:sp>
+      <p:sp>
+        <p:nvSpPr>
+          <p:cNvPr id="9" name="Content Placeholder 8">
+            <a:extLst>
+              <a:ext uri="{FF2B5EF4-FFF2-40B4-BE49-F238E27FC236}">
+                <a16:creationId xmlns:a16="http://schemas.microsoft.com/office/drawing/2014/main" id="{C31BB103-1960-4DAF-A5AB-1A6C4E1C46CC}"/>
+              </a:ext>
+            </a:extLst>
+          </p:cNvPr>
+          <p:cNvSpPr>
+            <a:spLocks noGrp="1"/>
+          </p:cNvSpPr>
+          <p:nvPr>
+            <p:ph idx="1"/>
+          </p:nvPr>
+        </p:nvSpPr>
+        <p:spPr>
+          <a:xfrm>
+            <a:off x="649225" y="2133600"/>
+            <a:ext cx="3970318" cy="3759253"/>
+          </a:xfrm>
+        </p:spPr>
+        <p:txBody>
+          <a:bodyPr>
+            <a:normAutofit/>
+          </a:bodyPr>
+          <a:lstStyle/>
+          <a:p>
+            <a:r>
+              <a:rPr lang="en-US" sz="2000" dirty="0"/>
+              <a:t>Largest river  in N.A.; 2</a:t>
+            </a:r>
+            <a:r>
+              <a:rPr lang="en-US" sz="2000" baseline="30000" dirty="0"/>
+              <a:t>nd</a:t>
+            </a:r>
+            <a:r>
+              <a:rPr lang="en-US" sz="2000" dirty="0"/>
+              <a:t> largest watershed.</a:t>
+            </a:r>
+          </a:p>
+          <a:p>
+            <a:r>
+              <a:rPr lang="en-US" sz="2000" dirty="0"/>
+              <a:t>Large proportion of agricultural lands.</a:t>
+            </a:r>
+          </a:p>
+          <a:p>
+            <a:r>
+              <a:rPr lang="en-US" sz="2000" dirty="0"/>
+              <a:t>Nutrient enrichment &amp; water impairment</a:t>
+            </a:r>
+          </a:p>
+          <a:p>
+            <a:endParaRPr lang="en-US" sz="2000" dirty="0"/>
+          </a:p>
+          <a:p>
+            <a:endParaRPr lang="en-US" sz="2000" dirty="0"/>
+          </a:p>
+        </p:txBody>
+      </p:sp>
+      <p:pic>
+        <p:nvPicPr>
+          <p:cNvPr id="5" name="Content Placeholder 4" descr="A close up of a map&#10;&#10;Description automatically generated">
+            <a:extLst>
+              <a:ext uri="{FF2B5EF4-FFF2-40B4-BE49-F238E27FC236}">
+                <a16:creationId xmlns:a16="http://schemas.microsoft.com/office/drawing/2014/main" id="{DC9D4C11-E5FD-49A8-8524-117326B11CA5}"/>
+              </a:ext>
+            </a:extLst>
+          </p:cNvPr>
+          <p:cNvPicPr>
+            <a:picLocks noChangeAspect="1"/>
+          </p:cNvPicPr>
+          <p:nvPr/>
+        </p:nvPicPr>
+        <p:blipFill>
+          <a:blip r:embed="rId3"/>
+          <a:stretch>
+            <a:fillRect/>
+          </a:stretch>
+        </p:blipFill>
+        <p:spPr>
+          <a:xfrm>
+            <a:off x="4619543" y="1219024"/>
+            <a:ext cx="6953577" cy="4094884"/>
+          </a:xfrm>
+          <a:prstGeom prst="rect">
+            <a:avLst/>
+          </a:prstGeom>
+        </p:spPr>
+      </p:pic>
+      <p:sp>
+        <p:nvSpPr>
+          <p:cNvPr id="6" name="TextBox 5">
+            <a:extLst>
+              <a:ext uri="{FF2B5EF4-FFF2-40B4-BE49-F238E27FC236}">
+                <a16:creationId xmlns:a16="http://schemas.microsoft.com/office/drawing/2014/main" id="{4C892208-206D-4F2C-8441-4101946E8F5D}"/>
+              </a:ext>
+            </a:extLst>
+          </p:cNvPr>
+          <p:cNvSpPr txBox="1"/>
+          <p:nvPr/>
+        </p:nvSpPr>
+        <p:spPr>
+          <a:xfrm>
+            <a:off x="4619543" y="5437248"/>
+            <a:ext cx="7229360" cy="1077218"/>
+          </a:xfrm>
+          <a:prstGeom prst="rect">
+            <a:avLst/>
+          </a:prstGeom>
+          <a:noFill/>
+        </p:spPr>
+        <p:txBody>
+          <a:bodyPr wrap="square" rtlCol="0">
+            <a:spAutoFit/>
+          </a:bodyPr>
+          <a:lstStyle/>
+          <a:p>
+            <a:r>
+              <a:rPr lang="en-US" sz="1600" dirty="0"/>
+              <a:t>Map Layers Sources:</a:t>
+            </a:r>
+          </a:p>
+          <a:p>
+            <a:r>
+              <a:rPr lang="en-US" sz="1600" dirty="0"/>
+              <a:t>Land use: GAP/LANDFIRE National Terrestrial Ecosystems 2011;</a:t>
+            </a:r>
+          </a:p>
+          <a:p>
+            <a:r>
+              <a:rPr lang="en-US" sz="1600" dirty="0"/>
+              <a:t>Impaired waters: EPA ATTAINS (cf. Clean Water Act 303d List 2015)</a:t>
+            </a:r>
+          </a:p>
+          <a:p>
+            <a:r>
+              <a:rPr lang="en-US" sz="1600" dirty="0"/>
+              <a:t>Watersheds &amp; streams: USGS</a:t>
+            </a:r>
+          </a:p>
+        </p:txBody>
+      </p:sp>
+    </p:spTree>
+    <p:extLst>
+      <p:ext uri="{BB962C8B-B14F-4D97-AF65-F5344CB8AC3E}">
+        <p14:creationId xmlns:p14="http://schemas.microsoft.com/office/powerpoint/2010/main" val="4133301055"/>
+      </p:ext>
+    </p:extLst>
+  </p:cSld>
+  <p:clrMapOvr>
+    <a:masterClrMapping/>
+  </p:clrMapOvr>
+</p:sld>
+</file>
+
+<file path=ppt/slides/slide3.xml><?xml version="1.0" encoding="utf-8"?>
+<p:sld xmlns:a="http://schemas.openxmlformats.org/drawingml/2006/main" xmlns:r="http://schemas.openxmlformats.org/officeDocument/2006/relationships" xmlns:p="http://schemas.openxmlformats.org/presentationml/2006/main">
+  <p:cSld>
+    <p:spTree>
+      <p:nvGrpSpPr>
+        <p:cNvPr id="1" name=""/>
+        <p:cNvGrpSpPr/>
+        <p:nvPr/>
+      </p:nvGrpSpPr>
+      <p:grpSpPr>
+        <a:xfrm>
+          <a:off x="0" y="0"/>
+          <a:ext cx="0" cy="0"/>
+          <a:chOff x="0" y="0"/>
+          <a:chExt cx="0" cy="0"/>
+        </a:xfrm>
+      </p:grpSpPr>
+      <p:sp>
+        <p:nvSpPr>
+          <p:cNvPr id="2" name="Title 1">
+            <a:extLst>
+              <a:ext uri="{FF2B5EF4-FFF2-40B4-BE49-F238E27FC236}">
+                <a16:creationId xmlns:a16="http://schemas.microsoft.com/office/drawing/2014/main" id="{ECEA5BB2-DA58-4016-B999-ED53C5CE5B6A}"/>
+              </a:ext>
+            </a:extLst>
+          </p:cNvPr>
+          <p:cNvSpPr>
+            <a:spLocks noGrp="1"/>
+          </p:cNvSpPr>
+          <p:nvPr>
+            <p:ph type="title"/>
+          </p:nvPr>
+        </p:nvSpPr>
+        <p:spPr/>
+        <p:txBody>
+          <a:bodyPr/>
+          <a:lstStyle/>
+          <a:p>
+            <a:r>
+              <a:rPr lang="en-US" dirty="0"/>
+              <a:t>Our Research Questions</a:t>
+            </a:r>
+          </a:p>
+        </p:txBody>
+      </p:sp>
+      <p:sp>
+        <p:nvSpPr>
+          <p:cNvPr id="3" name="Content Placeholder 2">
+            <a:extLst>
+              <a:ext uri="{FF2B5EF4-FFF2-40B4-BE49-F238E27FC236}">
+                <a16:creationId xmlns:a16="http://schemas.microsoft.com/office/drawing/2014/main" id="{22DE1CB8-3079-4C03-B591-F2540166561D}"/>
+              </a:ext>
+            </a:extLst>
+          </p:cNvPr>
+          <p:cNvSpPr>
+            <a:spLocks noGrp="1"/>
+          </p:cNvSpPr>
+          <p:nvPr>
+            <p:ph idx="1"/>
+          </p:nvPr>
+        </p:nvSpPr>
+        <p:spPr>
+          <a:xfrm>
+            <a:off x="1443319" y="1353671"/>
+            <a:ext cx="10354234" cy="5172635"/>
+          </a:xfrm>
+        </p:spPr>
+        <p:txBody>
+          <a:bodyPr>
+            <a:noAutofit/>
+          </a:bodyPr>
+          <a:lstStyle/>
+          <a:p>
+            <a:pPr>
+              <a:buFont typeface="+mj-lt"/>
+              <a:buAutoNum type="arabicPeriod"/>
+            </a:pPr>
+            <a:r>
+              <a:rPr lang="en-US" sz="1300" dirty="0"/>
+              <a:t>How have changes in discharge (i.e. water quantity) interacted with nutrient enrichment (i.e. water quality) in the Missouri River Basin?</a:t>
+            </a:r>
+          </a:p>
+          <a:p>
+            <a:pPr marL="0" indent="0">
+              <a:buNone/>
+            </a:pPr>
+            <a:r>
+              <a:rPr lang="en-US" sz="1300" dirty="0"/>
+              <a:t>	a) Nutrient levels have increased over time </a:t>
+            </a:r>
+          </a:p>
+          <a:p>
+            <a:pPr marL="0" indent="0">
+              <a:buNone/>
+            </a:pPr>
+            <a:r>
+              <a:rPr lang="en-US" sz="1300" dirty="0"/>
+              <a:t>	 b) Discharge has become more variable over time </a:t>
+            </a:r>
+          </a:p>
+          <a:p>
+            <a:pPr marL="0" indent="0">
+              <a:buNone/>
+            </a:pPr>
+            <a:r>
+              <a:rPr lang="en-US" sz="1300" dirty="0"/>
+              <a:t>	 c) Nutrient levels increase with discharge </a:t>
+            </a:r>
+          </a:p>
+          <a:p>
+            <a:pPr>
+              <a:buFont typeface="+mj-lt"/>
+              <a:buAutoNum type="arabicPeriod"/>
+            </a:pPr>
+            <a:endParaRPr lang="en-US" sz="1300" dirty="0"/>
+          </a:p>
+          <a:p>
+            <a:pPr>
+              <a:buFont typeface="+mj-lt"/>
+              <a:buAutoNum type="arabicPeriod" startAt="2"/>
+            </a:pPr>
+            <a:r>
+              <a:rPr lang="en-US" sz="1300" dirty="0"/>
+              <a:t>What effects do specific flood and drought events have on the water quality and quantity of rivers in the Missouri River Basin areas of interest?</a:t>
+            </a:r>
+          </a:p>
+          <a:p>
+            <a:pPr marL="0" indent="0">
+              <a:buNone/>
+            </a:pPr>
+            <a:r>
+              <a:rPr lang="en-US" sz="1300" dirty="0"/>
+              <a:t>	 a) Rivers will exhibit a flushing behavior due to the land use and type of flow during storms </a:t>
+            </a:r>
+          </a:p>
+          <a:p>
+            <a:pPr marL="0" indent="0">
+              <a:buNone/>
+            </a:pPr>
+            <a:r>
+              <a:rPr lang="en-US" sz="1300" dirty="0"/>
+              <a:t>	  b) Discharge will decrease during drought due to decreased overland flow. </a:t>
+            </a:r>
+          </a:p>
+          <a:p>
+            <a:pPr>
+              <a:buFont typeface="+mj-lt"/>
+              <a:buAutoNum type="arabicPeriod"/>
+            </a:pPr>
+            <a:endParaRPr lang="en-US" sz="1300" dirty="0"/>
+          </a:p>
+          <a:p>
+            <a:pPr>
+              <a:buFont typeface="+mj-lt"/>
+              <a:buAutoNum type="arabicPeriod" startAt="3"/>
+            </a:pPr>
+            <a:r>
+              <a:rPr lang="en-US" sz="1300" dirty="0"/>
+              <a:t>What factors contribute to the variability of total nitrogen in the rivers?</a:t>
+            </a:r>
+          </a:p>
+          <a:p>
+            <a:pPr marL="0" indent="0">
+              <a:buNone/>
+            </a:pPr>
+            <a:r>
+              <a:rPr lang="en-US" sz="1300" dirty="0"/>
+              <a:t>	a) Land use, year, discharge, phosphorus, and HUC region will contribute to the variability of total nitrogen across sites </a:t>
+            </a:r>
+          </a:p>
+          <a:p>
+            <a:pPr>
+              <a:buFont typeface="+mj-lt"/>
+              <a:buAutoNum type="arabicPeriod"/>
+            </a:pPr>
+            <a:endParaRPr lang="en-US" sz="1300" dirty="0"/>
+          </a:p>
+          <a:p>
+            <a:pPr>
+              <a:buFont typeface="+mj-lt"/>
+              <a:buAutoNum type="arabicPeriod" startAt="4"/>
+            </a:pPr>
+            <a:r>
+              <a:rPr lang="en-US" sz="1300" dirty="0"/>
+              <a:t>Given past and current data, what can we predict about the future state of water in the Missouri River Basin?</a:t>
+            </a:r>
+          </a:p>
+          <a:p>
+            <a:pPr marL="0" indent="0">
+              <a:buNone/>
+            </a:pPr>
+            <a:r>
+              <a:rPr lang="en-US" sz="1300" dirty="0"/>
+              <a:t>	a) Total flow in the Missouri River Basin is </a:t>
+            </a:r>
+            <a:r>
+              <a:rPr lang="en-US" altLang="zh-CN" sz="1300" dirty="0"/>
+              <a:t>increa</a:t>
+            </a:r>
+            <a:r>
+              <a:rPr lang="en-US" sz="1300" dirty="0"/>
+              <a:t>sing (non-stationary) over time </a:t>
+            </a:r>
+          </a:p>
+          <a:p>
+            <a:pPr marL="0" indent="0">
+              <a:buNone/>
+            </a:pPr>
+            <a:r>
+              <a:rPr lang="en-US" sz="1300" dirty="0"/>
+              <a:t>	b) The future situation of the river basin will see the continuation of current trends </a:t>
+            </a:r>
+            <a:r>
+              <a:rPr lang="en-US" sz="1300"/>
+              <a:t>of increasing </a:t>
+            </a:r>
+            <a:r>
+              <a:rPr lang="en-US" sz="1300" dirty="0"/>
+              <a:t>overall volume of flow. </a:t>
+            </a:r>
+          </a:p>
+        </p:txBody>
+      </p:sp>
+    </p:spTree>
+    <p:extLst>
+      <p:ext uri="{BB962C8B-B14F-4D97-AF65-F5344CB8AC3E}">
+        <p14:creationId xmlns:p14="http://schemas.microsoft.com/office/powerpoint/2010/main" val="1343678091"/>
+      </p:ext>
+    </p:extLst>
+  </p:cSld>
+  <p:clrMapOvr>
+    <a:masterClrMapping/>
+  </p:clrMapOvr>
+</p:sld>
+</file>
+
+<file path=ppt/slides/slide4.xml><?xml version="1.0" encoding="utf-8"?>
+<p:sld xmlns:a="http://schemas.openxmlformats.org/drawingml/2006/main" xmlns:r="http://schemas.openxmlformats.org/officeDocument/2006/relationships" xmlns:p="http://schemas.openxmlformats.org/presentationml/2006/main">
+  <p:cSld>
     <p:bg>
       <p:bgPr>
         <a:gradFill rotWithShape="1">
@@ -9537,7 +10038,7 @@
       </p:grpSpPr>
       <p:sp useBgFill="1">
         <p:nvSpPr>
-          <p:cNvPr id="12" name="Rectangle 11">
+          <p:cNvPr id="7" name="Rectangle 11">
             <a:extLst>
               <a:ext uri="{FF2B5EF4-FFF2-40B4-BE49-F238E27FC236}">
                 <a16:creationId xmlns:a16="http://schemas.microsoft.com/office/drawing/2014/main" id="{FBFE3618-8387-4153-870E-99EA1B9784F5}"/>
@@ -9600,7 +10101,7 @@
           <p:cNvPr id="2" name="Title 1">
             <a:extLst>
               <a:ext uri="{FF2B5EF4-FFF2-40B4-BE49-F238E27FC236}">
-                <a16:creationId xmlns:a16="http://schemas.microsoft.com/office/drawing/2014/main" id="{D163DEE8-D523-418F-BF89-5DEB404CC53B}"/>
+                <a16:creationId xmlns:a16="http://schemas.microsoft.com/office/drawing/2014/main" id="{60BC4ADD-07E0-4923-8EF5-E4A2ECFCA0BD}"/>
               </a:ext>
             </a:extLst>
           </p:cNvPr>
@@ -9625,14 +10126,14 @@
           <a:p>
             <a:r>
               <a:rPr lang="en-US" dirty="0"/>
-              <a:t>Study Rationale</a:t>
+              <a:t>Our Approach</a:t>
             </a:r>
           </a:p>
         </p:txBody>
       </p:sp>
       <p:sp>
         <p:nvSpPr>
-          <p:cNvPr id="14" name="Rectangle 13">
+          <p:cNvPr id="8" name="Rectangle 13">
             <a:extLst>
               <a:ext uri="{FF2B5EF4-FFF2-40B4-BE49-F238E27FC236}">
                 <a16:creationId xmlns:a16="http://schemas.microsoft.com/office/drawing/2014/main" id="{BB99A42A-5548-4BB8-9115-A05821C360AB}"/>
@@ -9686,10 +10187,10 @@
       </p:sp>
       <p:sp>
         <p:nvSpPr>
-          <p:cNvPr id="9" name="Content Placeholder 8">
+          <p:cNvPr id="10" name="Content Placeholder 8">
             <a:extLst>
               <a:ext uri="{FF2B5EF4-FFF2-40B4-BE49-F238E27FC236}">
-                <a16:creationId xmlns:a16="http://schemas.microsoft.com/office/drawing/2014/main" id="{C31BB103-1960-4DAF-A5AB-1A6C4E1C46CC}"/>
+                <a16:creationId xmlns:a16="http://schemas.microsoft.com/office/drawing/2014/main" id="{2FF29D03-2F16-46CF-AB7F-59D35FA9D81B}"/>
               </a:ext>
             </a:extLst>
           </p:cNvPr>
@@ -9712,6 +10213,31 @@
           </a:bodyPr>
           <a:lstStyle/>
           <a:p>
+            <a:r>
+              <a:rPr lang="en-US" dirty="0"/>
+              <a:t>22 sites chosen throughout HUCs 1020 – 1030</a:t>
+            </a:r>
+          </a:p>
+          <a:p>
+            <a:pPr lvl="1"/>
+            <a:r>
+              <a:rPr lang="en-US" dirty="0"/>
+              <a:t>2 sites per HUC</a:t>
+            </a:r>
+          </a:p>
+          <a:p>
+            <a:r>
+              <a:rPr lang="en-US" dirty="0"/>
+              <a:t>Nitrogen, Phosphorus, Discharge, Time</a:t>
+            </a:r>
+          </a:p>
+          <a:p>
+            <a:pPr marL="0" indent="0">
+              <a:buNone/>
+            </a:pPr>
+            <a:endParaRPr lang="en-US" dirty="0"/>
+          </a:p>
+          <a:p>
             <a:endParaRPr lang="en-US" dirty="0"/>
           </a:p>
         </p:txBody>
@@ -9721,7 +10247,7 @@
           <p:cNvPr id="5" name="Content Placeholder 4" descr="A close up of a map&#10;&#10;Description automatically generated">
             <a:extLst>
               <a:ext uri="{FF2B5EF4-FFF2-40B4-BE49-F238E27FC236}">
-                <a16:creationId xmlns:a16="http://schemas.microsoft.com/office/drawing/2014/main" id="{DC9D4C11-E5FD-49A8-8524-117326B11CA5}"/>
+                <a16:creationId xmlns:a16="http://schemas.microsoft.com/office/drawing/2014/main" id="{36CF0943-DC0A-48D1-A950-B0C446A91A54}"/>
               </a:ext>
             </a:extLst>
           </p:cNvPr>
@@ -9738,8 +10264,8 @@
         </p:blipFill>
         <p:spPr>
           <a:xfrm>
-            <a:off x="4619543" y="1219024"/>
-            <a:ext cx="6953577" cy="4094884"/>
+            <a:off x="4619543" y="1215162"/>
+            <a:ext cx="6953577" cy="4102609"/>
           </a:xfrm>
           <a:prstGeom prst="rect">
             <a:avLst/>
@@ -9748,7 +10274,7 @@
       </p:pic>
       <p:sp>
         <p:nvSpPr>
-          <p:cNvPr id="16" name="Freeform 11">
+          <p:cNvPr id="11" name="Freeform 11">
             <a:extLst>
               <a:ext uri="{FF2B5EF4-FFF2-40B4-BE49-F238E27FC236}">
                 <a16:creationId xmlns:a16="http://schemas.microsoft.com/office/drawing/2014/main" id="{D49441E5-946F-46B3-BDD2-BAD088532367}"/>
@@ -9963,786 +10489,6 @@
           </a:p>
         </p:txBody>
       </p:sp>
-      <p:sp>
-        <p:nvSpPr>
-          <p:cNvPr id="6" name="TextBox 5">
-            <a:extLst>
-              <a:ext uri="{FF2B5EF4-FFF2-40B4-BE49-F238E27FC236}">
-                <a16:creationId xmlns:a16="http://schemas.microsoft.com/office/drawing/2014/main" id="{4C892208-206D-4F2C-8441-4101946E8F5D}"/>
-              </a:ext>
-            </a:extLst>
-          </p:cNvPr>
-          <p:cNvSpPr txBox="1"/>
-          <p:nvPr/>
-        </p:nvSpPr>
-        <p:spPr>
-          <a:xfrm>
-            <a:off x="9677084" y="6382834"/>
-            <a:ext cx="3792071" cy="369332"/>
-          </a:xfrm>
-          <a:prstGeom prst="rect">
-            <a:avLst/>
-          </a:prstGeom>
-          <a:noFill/>
-        </p:spPr>
-        <p:txBody>
-          <a:bodyPr wrap="square" rtlCol="0">
-            <a:spAutoFit/>
-          </a:bodyPr>
-          <a:lstStyle/>
-          <a:p>
-            <a:r>
-              <a:rPr lang="en-US" dirty="0"/>
-              <a:t>Insert citations here</a:t>
-            </a:r>
-          </a:p>
-        </p:txBody>
-      </p:sp>
-    </p:spTree>
-    <p:extLst>
-      <p:ext uri="{BB962C8B-B14F-4D97-AF65-F5344CB8AC3E}">
-        <p14:creationId xmlns:p14="http://schemas.microsoft.com/office/powerpoint/2010/main" val="473213667"/>
-      </p:ext>
-    </p:extLst>
-  </p:cSld>
-  <p:clrMapOvr>
-    <a:masterClrMapping/>
-  </p:clrMapOvr>
-</p:sld>
-</file>
-
-<file path=ppt/slides/slide3.xml><?xml version="1.0" encoding="utf-8"?>
-<p:sld xmlns:a="http://schemas.openxmlformats.org/drawingml/2006/main" xmlns:r="http://schemas.openxmlformats.org/officeDocument/2006/relationships" xmlns:p="http://schemas.openxmlformats.org/presentationml/2006/main">
-  <p:cSld>
-    <p:spTree>
-      <p:nvGrpSpPr>
-        <p:cNvPr id="1" name=""/>
-        <p:cNvGrpSpPr/>
-        <p:nvPr/>
-      </p:nvGrpSpPr>
-      <p:grpSpPr>
-        <a:xfrm>
-          <a:off x="0" y="0"/>
-          <a:ext cx="0" cy="0"/>
-          <a:chOff x="0" y="0"/>
-          <a:chExt cx="0" cy="0"/>
-        </a:xfrm>
-      </p:grpSpPr>
-      <p:sp>
-        <p:nvSpPr>
-          <p:cNvPr id="2" name="Title 1">
-            <a:extLst>
-              <a:ext uri="{FF2B5EF4-FFF2-40B4-BE49-F238E27FC236}">
-                <a16:creationId xmlns:a16="http://schemas.microsoft.com/office/drawing/2014/main" id="{ECEA5BB2-DA58-4016-B999-ED53C5CE5B6A}"/>
-              </a:ext>
-            </a:extLst>
-          </p:cNvPr>
-          <p:cNvSpPr>
-            <a:spLocks noGrp="1"/>
-          </p:cNvSpPr>
-          <p:nvPr>
-            <p:ph type="title"/>
-          </p:nvPr>
-        </p:nvSpPr>
-        <p:spPr/>
-        <p:txBody>
-          <a:bodyPr/>
-          <a:lstStyle/>
-          <a:p>
-            <a:r>
-              <a:rPr lang="en-US" dirty="0"/>
-              <a:t>Our Research Questions</a:t>
-            </a:r>
-          </a:p>
-        </p:txBody>
-      </p:sp>
-      <p:sp>
-        <p:nvSpPr>
-          <p:cNvPr id="3" name="Content Placeholder 2">
-            <a:extLst>
-              <a:ext uri="{FF2B5EF4-FFF2-40B4-BE49-F238E27FC236}">
-                <a16:creationId xmlns:a16="http://schemas.microsoft.com/office/drawing/2014/main" id="{22DE1CB8-3079-4C03-B591-F2540166561D}"/>
-              </a:ext>
-            </a:extLst>
-          </p:cNvPr>
-          <p:cNvSpPr>
-            <a:spLocks noGrp="1"/>
-          </p:cNvSpPr>
-          <p:nvPr>
-            <p:ph idx="1"/>
-          </p:nvPr>
-        </p:nvSpPr>
-        <p:spPr>
-          <a:xfrm>
-            <a:off x="1443319" y="1353671"/>
-            <a:ext cx="10354234" cy="5172635"/>
-          </a:xfrm>
-        </p:spPr>
-        <p:txBody>
-          <a:bodyPr>
-            <a:noAutofit/>
-          </a:bodyPr>
-          <a:lstStyle/>
-          <a:p>
-            <a:pPr>
-              <a:buFont typeface="+mj-lt"/>
-              <a:buAutoNum type="arabicPeriod"/>
-            </a:pPr>
-            <a:r>
-              <a:rPr lang="en-US" sz="1300" dirty="0"/>
-              <a:t>How have changes in discharge (i.e. water quantity) interacted with nutrient enrichment (i.e. water quality) in the Missouri River Basin?</a:t>
-            </a:r>
-          </a:p>
-          <a:p>
-            <a:pPr marL="0" indent="0">
-              <a:buNone/>
-            </a:pPr>
-            <a:r>
-              <a:rPr lang="en-US" sz="1300" dirty="0"/>
-              <a:t>	a) Nutrient levels have increased over time </a:t>
-            </a:r>
-          </a:p>
-          <a:p>
-            <a:pPr marL="0" indent="0">
-              <a:buNone/>
-            </a:pPr>
-            <a:r>
-              <a:rPr lang="en-US" sz="1300" dirty="0"/>
-              <a:t>	 b) Discharge has become more variable over time </a:t>
-            </a:r>
-          </a:p>
-          <a:p>
-            <a:pPr marL="0" indent="0">
-              <a:buNone/>
-            </a:pPr>
-            <a:r>
-              <a:rPr lang="en-US" sz="1300" dirty="0"/>
-              <a:t>	 c) Nutrient levels increase with discharge </a:t>
-            </a:r>
-          </a:p>
-          <a:p>
-            <a:pPr>
-              <a:buFont typeface="+mj-lt"/>
-              <a:buAutoNum type="arabicPeriod"/>
-            </a:pPr>
-            <a:endParaRPr lang="en-US" sz="1300" dirty="0"/>
-          </a:p>
-          <a:p>
-            <a:pPr>
-              <a:buFont typeface="+mj-lt"/>
-              <a:buAutoNum type="arabicPeriod" startAt="2"/>
-            </a:pPr>
-            <a:r>
-              <a:rPr lang="en-US" sz="1300" dirty="0"/>
-              <a:t>What effects do specific flood and drought events have on the water quality and quantity of rivers in the Missouri River Basin areas of interest?</a:t>
-            </a:r>
-          </a:p>
-          <a:p>
-            <a:pPr marL="0" indent="0">
-              <a:buNone/>
-            </a:pPr>
-            <a:r>
-              <a:rPr lang="en-US" sz="1300" dirty="0"/>
-              <a:t>	 a) Rivers will exhibit a flushing behavior due to the land use and type of flow during storms </a:t>
-            </a:r>
-          </a:p>
-          <a:p>
-            <a:pPr marL="0" indent="0">
-              <a:buNone/>
-            </a:pPr>
-            <a:r>
-              <a:rPr lang="en-US" sz="1300" dirty="0"/>
-              <a:t>	  b) Discharge will decrease during drought due to decreased overland flow. </a:t>
-            </a:r>
-          </a:p>
-          <a:p>
-            <a:pPr>
-              <a:buFont typeface="+mj-lt"/>
-              <a:buAutoNum type="arabicPeriod"/>
-            </a:pPr>
-            <a:endParaRPr lang="en-US" sz="1300" dirty="0"/>
-          </a:p>
-          <a:p>
-            <a:pPr>
-              <a:buFont typeface="+mj-lt"/>
-              <a:buAutoNum type="arabicPeriod" startAt="3"/>
-            </a:pPr>
-            <a:r>
-              <a:rPr lang="en-US" sz="1300" dirty="0"/>
-              <a:t>What factors contribute to the variability of total nitrogen in the rivers?</a:t>
-            </a:r>
-          </a:p>
-          <a:p>
-            <a:pPr marL="0" indent="0">
-              <a:buNone/>
-            </a:pPr>
-            <a:r>
-              <a:rPr lang="en-US" sz="1300" dirty="0"/>
-              <a:t>	a) Land use, year, discharge, phosphorus, and HUC region will contribute to the variability of total nitrogen across sites </a:t>
-            </a:r>
-          </a:p>
-          <a:p>
-            <a:pPr>
-              <a:buFont typeface="+mj-lt"/>
-              <a:buAutoNum type="arabicPeriod"/>
-            </a:pPr>
-            <a:endParaRPr lang="en-US" sz="1300" dirty="0"/>
-          </a:p>
-          <a:p>
-            <a:pPr>
-              <a:buFont typeface="+mj-lt"/>
-              <a:buAutoNum type="arabicPeriod" startAt="4"/>
-            </a:pPr>
-            <a:r>
-              <a:rPr lang="en-US" sz="1300" dirty="0"/>
-              <a:t>Given past and current data, what can we predict about the future state of water in the Missouri River Basin?</a:t>
-            </a:r>
-          </a:p>
-          <a:p>
-            <a:pPr marL="0" indent="0">
-              <a:buNone/>
-            </a:pPr>
-            <a:r>
-              <a:rPr lang="en-US" sz="1300" dirty="0"/>
-              <a:t>	a) Total flow in the Missouri River Basin is </a:t>
-            </a:r>
-            <a:r>
-              <a:rPr lang="en-US" altLang="zh-CN" sz="1300" dirty="0"/>
-              <a:t>increa</a:t>
-            </a:r>
-            <a:r>
-              <a:rPr lang="en-US" sz="1300" dirty="0"/>
-              <a:t>sing (non-stationary) over time </a:t>
-            </a:r>
-          </a:p>
-          <a:p>
-            <a:pPr marL="0" indent="0">
-              <a:buNone/>
-            </a:pPr>
-            <a:r>
-              <a:rPr lang="en-US" sz="1300" dirty="0"/>
-              <a:t>	b) The future situation of the river basin will see the continuation of current trends </a:t>
-            </a:r>
-            <a:r>
-              <a:rPr lang="en-US" sz="1300"/>
-              <a:t>of increasing </a:t>
-            </a:r>
-            <a:r>
-              <a:rPr lang="en-US" sz="1300" dirty="0"/>
-              <a:t>overall volume of flow. </a:t>
-            </a:r>
-          </a:p>
-        </p:txBody>
-      </p:sp>
-    </p:spTree>
-    <p:extLst>
-      <p:ext uri="{BB962C8B-B14F-4D97-AF65-F5344CB8AC3E}">
-        <p14:creationId xmlns:p14="http://schemas.microsoft.com/office/powerpoint/2010/main" val="1343678091"/>
-      </p:ext>
-    </p:extLst>
-  </p:cSld>
-  <p:clrMapOvr>
-    <a:masterClrMapping/>
-  </p:clrMapOvr>
-</p:sld>
-</file>
-
-<file path=ppt/slides/slide4.xml><?xml version="1.0" encoding="utf-8"?>
-<p:sld xmlns:a="http://schemas.openxmlformats.org/drawingml/2006/main" xmlns:r="http://schemas.openxmlformats.org/officeDocument/2006/relationships" xmlns:p="http://schemas.openxmlformats.org/presentationml/2006/main">
-  <p:cSld>
-    <p:bg>
-      <p:bgPr>
-        <a:gradFill rotWithShape="1">
-          <a:gsLst>
-            <a:gs pos="0">
-              <a:schemeClr val="bg2">
-                <a:tint val="90000"/>
-                <a:satMod val="92000"/>
-                <a:lumMod val="120000"/>
-              </a:schemeClr>
-            </a:gs>
-            <a:gs pos="100000">
-              <a:schemeClr val="bg2">
-                <a:shade val="98000"/>
-                <a:satMod val="120000"/>
-                <a:lumMod val="98000"/>
-              </a:schemeClr>
-            </a:gs>
-          </a:gsLst>
-          <a:path path="circle">
-            <a:fillToRect l="50000" t="50000" r="100000" b="100000"/>
-          </a:path>
-        </a:gradFill>
-        <a:effectLst/>
-      </p:bgPr>
-    </p:bg>
-    <p:spTree>
-      <p:nvGrpSpPr>
-        <p:cNvPr id="1" name=""/>
-        <p:cNvGrpSpPr/>
-        <p:nvPr/>
-      </p:nvGrpSpPr>
-      <p:grpSpPr>
-        <a:xfrm>
-          <a:off x="0" y="0"/>
-          <a:ext cx="0" cy="0"/>
-          <a:chOff x="0" y="0"/>
-          <a:chExt cx="0" cy="0"/>
-        </a:xfrm>
-      </p:grpSpPr>
-      <p:sp useBgFill="1">
-        <p:nvSpPr>
-          <p:cNvPr id="7" name="Rectangle 11">
-            <a:extLst>
-              <a:ext uri="{FF2B5EF4-FFF2-40B4-BE49-F238E27FC236}">
-                <a16:creationId xmlns:a16="http://schemas.microsoft.com/office/drawing/2014/main" id="{FBFE3618-8387-4153-870E-99EA1B9784F5}"/>
-              </a:ext>
-              <a:ext uri="{C183D7F6-B498-43B3-948B-1728B52AA6E4}">
-                <adec:decorative xmlns:adec="http://schemas.microsoft.com/office/drawing/2017/decorative" val="1"/>
-              </a:ext>
-            </a:extLst>
-          </p:cNvPr>
-          <p:cNvSpPr>
-            <a:spLocks noGrp="1" noRot="1" noChangeAspect="1" noMove="1" noResize="1" noEditPoints="1" noAdjustHandles="1" noChangeArrowheads="1" noChangeShapeType="1" noTextEdit="1"/>
-          </p:cNvSpPr>
-          <p:nvPr>
-            <p:extLst>
-              <p:ext uri="{386F3935-93C4-4BCD-93E2-E3B085C9AB24}">
-                <p16:designElem xmlns:p16="http://schemas.microsoft.com/office/powerpoint/2015/main" val="1"/>
-              </p:ext>
-            </p:extLst>
-          </p:nvPr>
-        </p:nvSpPr>
-        <p:spPr>
-          <a:xfrm>
-            <a:off x="0" y="-786"/>
-            <a:ext cx="12192000" cy="6854038"/>
-          </a:xfrm>
-          <a:prstGeom prst="rect">
-            <a:avLst/>
-          </a:prstGeom>
-          <a:ln>
-            <a:noFill/>
-          </a:ln>
-        </p:spPr>
-        <p:style>
-          <a:lnRef idx="2">
-            <a:schemeClr val="accent1">
-              <a:shade val="50000"/>
-            </a:schemeClr>
-          </a:lnRef>
-          <a:fillRef idx="1">
-            <a:schemeClr val="accent1"/>
-          </a:fillRef>
-          <a:effectRef idx="0">
-            <a:schemeClr val="accent1"/>
-          </a:effectRef>
-          <a:fontRef idx="minor">
-            <a:schemeClr val="lt1"/>
-          </a:fontRef>
-        </p:style>
-        <p:txBody>
-          <a:bodyPr rtlCol="0" anchor="ctr"/>
-          <a:lstStyle/>
-          <a:p>
-            <a:pPr algn="ctr"/>
-            <a:endParaRPr lang="en-US"/>
-          </a:p>
-        </p:txBody>
-      </p:sp>
-      <p:sp>
-        <p:nvSpPr>
-          <p:cNvPr id="2" name="Title 1">
-            <a:extLst>
-              <a:ext uri="{FF2B5EF4-FFF2-40B4-BE49-F238E27FC236}">
-                <a16:creationId xmlns:a16="http://schemas.microsoft.com/office/drawing/2014/main" id="{60BC4ADD-07E0-4923-8EF5-E4A2ECFCA0BD}"/>
-              </a:ext>
-            </a:extLst>
-          </p:cNvPr>
-          <p:cNvSpPr>
-            <a:spLocks noGrp="1"/>
-          </p:cNvSpPr>
-          <p:nvPr>
-            <p:ph type="title"/>
-          </p:nvPr>
-        </p:nvSpPr>
-        <p:spPr>
-          <a:xfrm>
-            <a:off x="649224" y="645106"/>
-            <a:ext cx="3650279" cy="1259894"/>
-          </a:xfrm>
-        </p:spPr>
-        <p:txBody>
-          <a:bodyPr>
-            <a:normAutofit/>
-          </a:bodyPr>
-          <a:lstStyle/>
-          <a:p>
-            <a:r>
-              <a:rPr lang="en-US" dirty="0"/>
-              <a:t>Our Approach</a:t>
-            </a:r>
-          </a:p>
-        </p:txBody>
-      </p:sp>
-      <p:sp>
-        <p:nvSpPr>
-          <p:cNvPr id="8" name="Rectangle 13">
-            <a:extLst>
-              <a:ext uri="{FF2B5EF4-FFF2-40B4-BE49-F238E27FC236}">
-                <a16:creationId xmlns:a16="http://schemas.microsoft.com/office/drawing/2014/main" id="{BB99A42A-5548-4BB8-9115-A05821C360AB}"/>
-              </a:ext>
-              <a:ext uri="{C183D7F6-B498-43B3-948B-1728B52AA6E4}">
-                <adec:decorative xmlns:adec="http://schemas.microsoft.com/office/drawing/2017/decorative" val="1"/>
-              </a:ext>
-            </a:extLst>
-          </p:cNvPr>
-          <p:cNvSpPr>
-            <a:spLocks noGrp="1" noRot="1" noChangeAspect="1" noMove="1" noResize="1" noEditPoints="1" noAdjustHandles="1" noChangeArrowheads="1" noChangeShapeType="1" noTextEdit="1"/>
-          </p:cNvSpPr>
-          <p:nvPr>
-            <p:extLst>
-              <p:ext uri="{386F3935-93C4-4BCD-93E2-E3B085C9AB24}">
-                <p16:designElem xmlns:p16="http://schemas.microsoft.com/office/powerpoint/2015/main" val="1"/>
-              </p:ext>
-            </p:extLst>
-          </p:nvPr>
-        </p:nvSpPr>
-        <p:spPr>
-          <a:xfrm>
-            <a:off x="0" y="0"/>
-            <a:ext cx="182880" cy="6858000"/>
-          </a:xfrm>
-          <a:prstGeom prst="rect">
-            <a:avLst/>
-          </a:prstGeom>
-          <a:solidFill>
-            <a:schemeClr val="tx2"/>
-          </a:solidFill>
-          <a:ln>
-            <a:noFill/>
-          </a:ln>
-          <a:effectLst/>
-        </p:spPr>
-        <p:style>
-          <a:lnRef idx="1">
-            <a:schemeClr val="accent1"/>
-          </a:lnRef>
-          <a:fillRef idx="3">
-            <a:schemeClr val="accent1"/>
-          </a:fillRef>
-          <a:effectRef idx="2">
-            <a:schemeClr val="accent1"/>
-          </a:effectRef>
-          <a:fontRef idx="minor">
-            <a:schemeClr val="lt1"/>
-          </a:fontRef>
-        </p:style>
-      </p:sp>
-      <p:sp>
-        <p:nvSpPr>
-          <p:cNvPr id="10" name="Content Placeholder 8">
-            <a:extLst>
-              <a:ext uri="{FF2B5EF4-FFF2-40B4-BE49-F238E27FC236}">
-                <a16:creationId xmlns:a16="http://schemas.microsoft.com/office/drawing/2014/main" id="{2FF29D03-2F16-46CF-AB7F-59D35FA9D81B}"/>
-              </a:ext>
-            </a:extLst>
-          </p:cNvPr>
-          <p:cNvSpPr>
-            <a:spLocks noGrp="1"/>
-          </p:cNvSpPr>
-          <p:nvPr>
-            <p:ph idx="1"/>
-          </p:nvPr>
-        </p:nvSpPr>
-        <p:spPr>
-          <a:xfrm>
-            <a:off x="649225" y="2133600"/>
-            <a:ext cx="3650278" cy="3759253"/>
-          </a:xfrm>
-        </p:spPr>
-        <p:txBody>
-          <a:bodyPr>
-            <a:normAutofit/>
-          </a:bodyPr>
-          <a:lstStyle/>
-          <a:p>
-            <a:r>
-              <a:rPr lang="en-US" dirty="0"/>
-              <a:t>22 sites chosen throughout HUCs 1020 – 1030</a:t>
-            </a:r>
-          </a:p>
-          <a:p>
-            <a:pPr lvl="1"/>
-            <a:r>
-              <a:rPr lang="en-US" dirty="0"/>
-              <a:t>2 sites per HUC</a:t>
-            </a:r>
-          </a:p>
-          <a:p>
-            <a:r>
-              <a:rPr lang="en-US" dirty="0"/>
-              <a:t>Nitrogen, Phosphorus, Discharge, Time</a:t>
-            </a:r>
-          </a:p>
-          <a:p>
-            <a:pPr marL="0" indent="0">
-              <a:buNone/>
-            </a:pPr>
-            <a:endParaRPr lang="en-US" dirty="0"/>
-          </a:p>
-          <a:p>
-            <a:endParaRPr lang="en-US" dirty="0"/>
-          </a:p>
-        </p:txBody>
-      </p:sp>
-      <p:pic>
-        <p:nvPicPr>
-          <p:cNvPr id="5" name="Content Placeholder 4" descr="A close up of a map&#10;&#10;Description automatically generated">
-            <a:extLst>
-              <a:ext uri="{FF2B5EF4-FFF2-40B4-BE49-F238E27FC236}">
-                <a16:creationId xmlns:a16="http://schemas.microsoft.com/office/drawing/2014/main" id="{36CF0943-DC0A-48D1-A950-B0C446A91A54}"/>
-              </a:ext>
-            </a:extLst>
-          </p:cNvPr>
-          <p:cNvPicPr>
-            <a:picLocks noChangeAspect="1"/>
-          </p:cNvPicPr>
-          <p:nvPr/>
-        </p:nvPicPr>
-        <p:blipFill>
-          <a:blip r:embed="rId3"/>
-          <a:stretch>
-            <a:fillRect/>
-          </a:stretch>
-        </p:blipFill>
-        <p:spPr>
-          <a:xfrm>
-            <a:off x="4619543" y="1215162"/>
-            <a:ext cx="6953577" cy="4102609"/>
-          </a:xfrm>
-          <a:prstGeom prst="rect">
-            <a:avLst/>
-          </a:prstGeom>
-        </p:spPr>
-      </p:pic>
-      <p:sp>
-        <p:nvSpPr>
-          <p:cNvPr id="11" name="Freeform 11">
-            <a:extLst>
-              <a:ext uri="{FF2B5EF4-FFF2-40B4-BE49-F238E27FC236}">
-                <a16:creationId xmlns:a16="http://schemas.microsoft.com/office/drawing/2014/main" id="{D49441E5-946F-46B3-BDD2-BAD088532367}"/>
-              </a:ext>
-              <a:ext uri="{C183D7F6-B498-43B3-948B-1728B52AA6E4}">
-                <adec:decorative xmlns:adec="http://schemas.microsoft.com/office/drawing/2017/decorative" val="1"/>
-              </a:ext>
-            </a:extLst>
-          </p:cNvPr>
-          <p:cNvSpPr>
-            <a:spLocks noGrp="1" noRot="1" noChangeAspect="1" noMove="1" noResize="1" noEditPoints="1" noAdjustHandles="1" noChangeArrowheads="1" noChangeShapeType="1" noTextEdit="1"/>
-          </p:cNvSpPr>
-          <p:nvPr>
-            <p:extLst>
-              <p:ext uri="{386F3935-93C4-4BCD-93E2-E3B085C9AB24}">
-                <p16:designElem xmlns:p16="http://schemas.microsoft.com/office/powerpoint/2015/main" val="1"/>
-              </p:ext>
-            </p:extLst>
-          </p:nvPr>
-        </p:nvSpPr>
-        <p:spPr>
-          <a:xfrm>
-            <a:off x="-1" y="6061223"/>
-            <a:ext cx="1038036" cy="506277"/>
-          </a:xfrm>
-          <a:custGeom>
-            <a:avLst/>
-            <a:gdLst>
-              <a:gd name="connsiteX0" fmla="*/ 0 w 1038036"/>
-              <a:gd name="connsiteY0" fmla="*/ 0 h 506277"/>
-              <a:gd name="connsiteX1" fmla="*/ 182880 w 1038036"/>
-              <a:gd name="connsiteY1" fmla="*/ 0 h 506277"/>
-              <a:gd name="connsiteX2" fmla="*/ 291705 w 1038036"/>
-              <a:gd name="connsiteY2" fmla="*/ 0 h 506277"/>
-              <a:gd name="connsiteX3" fmla="*/ 291705 w 1038036"/>
-              <a:gd name="connsiteY3" fmla="*/ 151 h 506277"/>
-              <a:gd name="connsiteX4" fmla="*/ 692049 w 1038036"/>
-              <a:gd name="connsiteY4" fmla="*/ 705 h 506277"/>
-              <a:gd name="connsiteX5" fmla="*/ 782744 w 1038036"/>
-              <a:gd name="connsiteY5" fmla="*/ 705 h 506277"/>
-              <a:gd name="connsiteX6" fmla="*/ 797001 w 1038036"/>
-              <a:gd name="connsiteY6" fmla="*/ 5473 h 506277"/>
-              <a:gd name="connsiteX7" fmla="*/ 801982 w 1038036"/>
-              <a:gd name="connsiteY7" fmla="*/ 10242 h 506277"/>
-              <a:gd name="connsiteX8" fmla="*/ 1030951 w 1038036"/>
-              <a:gd name="connsiteY8" fmla="*/ 239185 h 506277"/>
-              <a:gd name="connsiteX9" fmla="*/ 1030951 w 1038036"/>
-              <a:gd name="connsiteY9" fmla="*/ 267797 h 506277"/>
-              <a:gd name="connsiteX10" fmla="*/ 801982 w 1038036"/>
-              <a:gd name="connsiteY10" fmla="*/ 496740 h 506277"/>
-              <a:gd name="connsiteX11" fmla="*/ 797001 w 1038036"/>
-              <a:gd name="connsiteY11" fmla="*/ 501508 h 506277"/>
-              <a:gd name="connsiteX12" fmla="*/ 782744 w 1038036"/>
-              <a:gd name="connsiteY12" fmla="*/ 506277 h 506277"/>
-              <a:gd name="connsiteX13" fmla="*/ 692049 w 1038036"/>
-              <a:gd name="connsiteY13" fmla="*/ 506277 h 506277"/>
-              <a:gd name="connsiteX14" fmla="*/ 291705 w 1038036"/>
-              <a:gd name="connsiteY14" fmla="*/ 505140 h 506277"/>
-              <a:gd name="connsiteX15" fmla="*/ 291705 w 1038036"/>
-              <a:gd name="connsiteY15" fmla="*/ 506277 h 506277"/>
-              <a:gd name="connsiteX16" fmla="*/ 0 w 1038036"/>
-              <a:gd name="connsiteY16" fmla="*/ 506277 h 506277"/>
-            </a:gdLst>
-            <a:ahLst/>
-            <a:cxnLst>
-              <a:cxn ang="0">
-                <a:pos x="connsiteX0" y="connsiteY0"/>
-              </a:cxn>
-              <a:cxn ang="0">
-                <a:pos x="connsiteX1" y="connsiteY1"/>
-              </a:cxn>
-              <a:cxn ang="0">
-                <a:pos x="connsiteX2" y="connsiteY2"/>
-              </a:cxn>
-              <a:cxn ang="0">
-                <a:pos x="connsiteX3" y="connsiteY3"/>
-              </a:cxn>
-              <a:cxn ang="0">
-                <a:pos x="connsiteX4" y="connsiteY4"/>
-              </a:cxn>
-              <a:cxn ang="0">
-                <a:pos x="connsiteX5" y="connsiteY5"/>
-              </a:cxn>
-              <a:cxn ang="0">
-                <a:pos x="connsiteX6" y="connsiteY6"/>
-              </a:cxn>
-              <a:cxn ang="0">
-                <a:pos x="connsiteX7" y="connsiteY7"/>
-              </a:cxn>
-              <a:cxn ang="0">
-                <a:pos x="connsiteX8" y="connsiteY8"/>
-              </a:cxn>
-              <a:cxn ang="0">
-                <a:pos x="connsiteX9" y="connsiteY9"/>
-              </a:cxn>
-              <a:cxn ang="0">
-                <a:pos x="connsiteX10" y="connsiteY10"/>
-              </a:cxn>
-              <a:cxn ang="0">
-                <a:pos x="connsiteX11" y="connsiteY11"/>
-              </a:cxn>
-              <a:cxn ang="0">
-                <a:pos x="connsiteX12" y="connsiteY12"/>
-              </a:cxn>
-              <a:cxn ang="0">
-                <a:pos x="connsiteX13" y="connsiteY13"/>
-              </a:cxn>
-              <a:cxn ang="0">
-                <a:pos x="connsiteX14" y="connsiteY14"/>
-              </a:cxn>
-              <a:cxn ang="0">
-                <a:pos x="connsiteX15" y="connsiteY15"/>
-              </a:cxn>
-              <a:cxn ang="0">
-                <a:pos x="connsiteX16" y="connsiteY16"/>
-              </a:cxn>
-            </a:cxnLst>
-            <a:rect l="l" t="t" r="r" b="b"/>
-            <a:pathLst>
-              <a:path w="1038036" h="506277">
-                <a:moveTo>
-                  <a:pt x="0" y="0"/>
-                </a:moveTo>
-                <a:lnTo>
-                  <a:pt x="182880" y="0"/>
-                </a:lnTo>
-                <a:lnTo>
-                  <a:pt x="291705" y="0"/>
-                </a:lnTo>
-                <a:lnTo>
-                  <a:pt x="291705" y="151"/>
-                </a:lnTo>
-                <a:lnTo>
-                  <a:pt x="692049" y="705"/>
-                </a:lnTo>
-                <a:lnTo>
-                  <a:pt x="782744" y="705"/>
-                </a:lnTo>
-                <a:cubicBezTo>
-                  <a:pt x="787553" y="705"/>
-                  <a:pt x="792363" y="5473"/>
-                  <a:pt x="797001" y="5473"/>
-                </a:cubicBezTo>
-                <a:cubicBezTo>
-                  <a:pt x="797001" y="10242"/>
-                  <a:pt x="801982" y="10242"/>
-                  <a:pt x="801982" y="10242"/>
-                </a:cubicBezTo>
-                <a:lnTo>
-                  <a:pt x="1030951" y="239185"/>
-                </a:lnTo>
-                <a:cubicBezTo>
-                  <a:pt x="1040398" y="248722"/>
-                  <a:pt x="1040398" y="258259"/>
-                  <a:pt x="1030951" y="267797"/>
-                </a:cubicBezTo>
-                <a:lnTo>
-                  <a:pt x="801982" y="496740"/>
-                </a:lnTo>
-                <a:cubicBezTo>
-                  <a:pt x="800436" y="498363"/>
-                  <a:pt x="798547" y="499885"/>
-                  <a:pt x="797001" y="501508"/>
-                </a:cubicBezTo>
-                <a:cubicBezTo>
-                  <a:pt x="792363" y="506277"/>
-                  <a:pt x="787553" y="506277"/>
-                  <a:pt x="782744" y="506277"/>
-                </a:cubicBezTo>
-                <a:lnTo>
-                  <a:pt x="692049" y="506277"/>
-                </a:lnTo>
-                <a:lnTo>
-                  <a:pt x="291705" y="505140"/>
-                </a:lnTo>
-                <a:lnTo>
-                  <a:pt x="291705" y="506277"/>
-                </a:lnTo>
-                <a:lnTo>
-                  <a:pt x="0" y="506277"/>
-                </a:lnTo>
-                <a:close/>
-              </a:path>
-            </a:pathLst>
-          </a:custGeom>
-          <a:ln>
-            <a:noFill/>
-          </a:ln>
-        </p:spPr>
-        <p:style>
-          <a:lnRef idx="2">
-            <a:schemeClr val="accent1">
-              <a:shade val="50000"/>
-            </a:schemeClr>
-          </a:lnRef>
-          <a:fillRef idx="1">
-            <a:schemeClr val="accent1"/>
-          </a:fillRef>
-          <a:effectRef idx="0">
-            <a:schemeClr val="accent1"/>
-          </a:effectRef>
-          <a:fontRef idx="minor">
-            <a:schemeClr val="lt1"/>
-          </a:fontRef>
-        </p:style>
-        <p:txBody>
-          <a:bodyPr rtlCol="0" anchor="ctr"/>
-          <a:lstStyle/>
-          <a:p>
-            <a:pPr algn="ctr"/>
-            <a:endParaRPr lang="en-US"/>
-          </a:p>
-        </p:txBody>
-      </p:sp>
     </p:spTree>
     <p:extLst>
       <p:ext uri="{BB962C8B-B14F-4D97-AF65-F5344CB8AC3E}">
@@ -15973,46 +15719,450 @@
           </a:p>
         </p:txBody>
       </p:sp>
-      <p:sp>
-        <p:nvSpPr>
-          <p:cNvPr id="3" name="Content Placeholder 2">
+      <p:pic>
+        <p:nvPicPr>
+          <p:cNvPr id="5" name="Content Placeholder 4">
             <a:extLst>
               <a:ext uri="{FF2B5EF4-FFF2-40B4-BE49-F238E27FC236}">
-                <a16:creationId xmlns:a16="http://schemas.microsoft.com/office/drawing/2014/main" id="{816D4D45-FF27-4F43-85CD-C4E3ED8AF5A1}"/>
+                <a16:creationId xmlns:a16="http://schemas.microsoft.com/office/drawing/2014/main" id="{EA359B8F-5E71-4A31-A7FE-D13B6DEFC1B7}"/>
               </a:ext>
             </a:extLst>
           </p:cNvPr>
-          <p:cNvSpPr>
-            <a:spLocks noGrp="1"/>
-          </p:cNvSpPr>
+          <p:cNvPicPr>
+            <a:picLocks noGrp="1" noChangeAspect="1"/>
+          </p:cNvPicPr>
           <p:nvPr>
             <p:ph idx="1"/>
           </p:nvPr>
-        </p:nvSpPr>
+        </p:nvPicPr>
+        <p:blipFill rotWithShape="1">
+          <a:blip r:embed="rId3"/>
+          <a:srcRect b="21635"/>
+          <a:stretch/>
+        </p:blipFill>
         <p:spPr>
           <a:xfrm>
-            <a:off x="2589212" y="2133600"/>
-            <a:ext cx="8915400" cy="3777622"/>
+            <a:off x="6096000" y="1721547"/>
+            <a:ext cx="5639908" cy="4955690"/>
           </a:xfrm>
         </p:spPr>
+      </p:pic>
+      <p:sp>
+        <p:nvSpPr>
+          <p:cNvPr id="6" name="Content Placeholder 8">
+            <a:extLst>
+              <a:ext uri="{FF2B5EF4-FFF2-40B4-BE49-F238E27FC236}">
+                <a16:creationId xmlns:a16="http://schemas.microsoft.com/office/drawing/2014/main" id="{C3EF1C8F-4869-4BA1-9095-8FBFF1A66CCD}"/>
+              </a:ext>
+            </a:extLst>
+          </p:cNvPr>
+          <p:cNvSpPr txBox="1">
+            <a:spLocks/>
+          </p:cNvSpPr>
+          <p:nvPr/>
+        </p:nvSpPr>
+        <p:spPr>
+          <a:xfrm>
+            <a:off x="649224" y="2133601"/>
+            <a:ext cx="4211503" cy="2523874"/>
+          </a:xfrm>
+          <a:prstGeom prst="rect">
+            <a:avLst/>
+          </a:prstGeom>
+        </p:spPr>
         <p:txBody>
-          <a:bodyPr/>
-          <a:lstStyle/>
-          <a:p>
-            <a:endParaRPr lang="en-US"/>
+          <a:bodyPr vert="horz" lIns="91440" tIns="45720" rIns="91440" bIns="45720" rtlCol="0">
+            <a:normAutofit fontScale="92500" lnSpcReduction="10000"/>
+          </a:bodyPr>
+          <a:lstStyle>
+            <a:lvl1pPr marL="342900" indent="-342900" algn="l" defTabSz="457200" rtl="0" eaLnBrk="1" latinLnBrk="0" hangingPunct="1">
+              <a:spcBef>
+                <a:spcPts val="1000"/>
+              </a:spcBef>
+              <a:spcAft>
+                <a:spcPts val="0"/>
+              </a:spcAft>
+              <a:buClr>
+                <a:schemeClr val="accent1"/>
+              </a:buClr>
+              <a:buFont typeface="Wingdings 3" charset="2"/>
+              <a:buChar char=""/>
+              <a:defRPr sz="1800" kern="1200">
+                <a:solidFill>
+                  <a:schemeClr val="tx1">
+                    <a:lumMod val="75000"/>
+                    <a:lumOff val="25000"/>
+                  </a:schemeClr>
+                </a:solidFill>
+                <a:latin typeface="+mn-lt"/>
+                <a:ea typeface="+mn-ea"/>
+                <a:cs typeface="+mn-cs"/>
+              </a:defRPr>
+            </a:lvl1pPr>
+            <a:lvl2pPr marL="742950" indent="-285750" algn="l" defTabSz="457200" rtl="0" eaLnBrk="1" latinLnBrk="0" hangingPunct="1">
+              <a:spcBef>
+                <a:spcPts val="1000"/>
+              </a:spcBef>
+              <a:spcAft>
+                <a:spcPts val="0"/>
+              </a:spcAft>
+              <a:buClr>
+                <a:schemeClr val="accent1"/>
+              </a:buClr>
+              <a:buFont typeface="Wingdings 3" charset="2"/>
+              <a:buChar char=""/>
+              <a:defRPr sz="1600" kern="1200">
+                <a:solidFill>
+                  <a:schemeClr val="tx1">
+                    <a:lumMod val="75000"/>
+                    <a:lumOff val="25000"/>
+                  </a:schemeClr>
+                </a:solidFill>
+                <a:latin typeface="+mn-lt"/>
+                <a:ea typeface="+mn-ea"/>
+                <a:cs typeface="+mn-cs"/>
+              </a:defRPr>
+            </a:lvl2pPr>
+            <a:lvl3pPr marL="1143000" indent="-228600" algn="l" defTabSz="457200" rtl="0" eaLnBrk="1" latinLnBrk="0" hangingPunct="1">
+              <a:spcBef>
+                <a:spcPts val="1000"/>
+              </a:spcBef>
+              <a:spcAft>
+                <a:spcPts val="0"/>
+              </a:spcAft>
+              <a:buClr>
+                <a:schemeClr val="accent1"/>
+              </a:buClr>
+              <a:buFont typeface="Wingdings 3" charset="2"/>
+              <a:buChar char=""/>
+              <a:defRPr sz="1400" kern="1200">
+                <a:solidFill>
+                  <a:schemeClr val="tx1">
+                    <a:lumMod val="75000"/>
+                    <a:lumOff val="25000"/>
+                  </a:schemeClr>
+                </a:solidFill>
+                <a:latin typeface="+mn-lt"/>
+                <a:ea typeface="+mn-ea"/>
+                <a:cs typeface="+mn-cs"/>
+              </a:defRPr>
+            </a:lvl3pPr>
+            <a:lvl4pPr marL="1600200" indent="-228600" algn="l" defTabSz="457200" rtl="0" eaLnBrk="1" latinLnBrk="0" hangingPunct="1">
+              <a:spcBef>
+                <a:spcPts val="1000"/>
+              </a:spcBef>
+              <a:spcAft>
+                <a:spcPts val="0"/>
+              </a:spcAft>
+              <a:buClr>
+                <a:schemeClr val="accent1"/>
+              </a:buClr>
+              <a:buFont typeface="Wingdings 3" charset="2"/>
+              <a:buChar char=""/>
+              <a:defRPr sz="1200" kern="1200">
+                <a:solidFill>
+                  <a:schemeClr val="tx1">
+                    <a:lumMod val="75000"/>
+                    <a:lumOff val="25000"/>
+                  </a:schemeClr>
+                </a:solidFill>
+                <a:latin typeface="+mn-lt"/>
+                <a:ea typeface="+mn-ea"/>
+                <a:cs typeface="+mn-cs"/>
+              </a:defRPr>
+            </a:lvl4pPr>
+            <a:lvl5pPr marL="2057400" indent="-228600" algn="l" defTabSz="457200" rtl="0" eaLnBrk="1" latinLnBrk="0" hangingPunct="1">
+              <a:spcBef>
+                <a:spcPts val="1000"/>
+              </a:spcBef>
+              <a:spcAft>
+                <a:spcPts val="0"/>
+              </a:spcAft>
+              <a:buClr>
+                <a:schemeClr val="accent1"/>
+              </a:buClr>
+              <a:buFont typeface="Wingdings 3" charset="2"/>
+              <a:buChar char=""/>
+              <a:defRPr sz="1200" kern="1200">
+                <a:solidFill>
+                  <a:schemeClr val="tx1">
+                    <a:lumMod val="75000"/>
+                    <a:lumOff val="25000"/>
+                  </a:schemeClr>
+                </a:solidFill>
+                <a:latin typeface="+mn-lt"/>
+                <a:ea typeface="+mn-ea"/>
+                <a:cs typeface="+mn-cs"/>
+              </a:defRPr>
+            </a:lvl5pPr>
+            <a:lvl6pPr marL="2514600" indent="-228600" algn="l" defTabSz="457200" rtl="0" eaLnBrk="1" latinLnBrk="0" hangingPunct="1">
+              <a:spcBef>
+                <a:spcPts val="1000"/>
+              </a:spcBef>
+              <a:spcAft>
+                <a:spcPts val="0"/>
+              </a:spcAft>
+              <a:buClr>
+                <a:schemeClr val="accent1"/>
+              </a:buClr>
+              <a:buFont typeface="Wingdings 3" charset="2"/>
+              <a:buChar char=""/>
+              <a:defRPr sz="1200" kern="1200">
+                <a:solidFill>
+                  <a:schemeClr val="tx1">
+                    <a:lumMod val="75000"/>
+                    <a:lumOff val="25000"/>
+                  </a:schemeClr>
+                </a:solidFill>
+                <a:latin typeface="+mn-lt"/>
+                <a:ea typeface="+mn-ea"/>
+                <a:cs typeface="+mn-cs"/>
+              </a:defRPr>
+            </a:lvl6pPr>
+            <a:lvl7pPr marL="2971800" indent="-228600" algn="l" defTabSz="457200" rtl="0" eaLnBrk="1" latinLnBrk="0" hangingPunct="1">
+              <a:spcBef>
+                <a:spcPts val="1000"/>
+              </a:spcBef>
+              <a:spcAft>
+                <a:spcPts val="0"/>
+              </a:spcAft>
+              <a:buClr>
+                <a:schemeClr val="accent1"/>
+              </a:buClr>
+              <a:buFont typeface="Wingdings 3" charset="2"/>
+              <a:buChar char=""/>
+              <a:defRPr sz="1200" kern="1200">
+                <a:solidFill>
+                  <a:schemeClr val="tx1">
+                    <a:lumMod val="75000"/>
+                    <a:lumOff val="25000"/>
+                  </a:schemeClr>
+                </a:solidFill>
+                <a:latin typeface="+mn-lt"/>
+                <a:ea typeface="+mn-ea"/>
+                <a:cs typeface="+mn-cs"/>
+              </a:defRPr>
+            </a:lvl7pPr>
+            <a:lvl8pPr marL="3429000" indent="-228600" algn="l" defTabSz="457200" rtl="0" eaLnBrk="1" latinLnBrk="0" hangingPunct="1">
+              <a:spcBef>
+                <a:spcPts val="1000"/>
+              </a:spcBef>
+              <a:spcAft>
+                <a:spcPts val="0"/>
+              </a:spcAft>
+              <a:buClr>
+                <a:schemeClr val="accent1"/>
+              </a:buClr>
+              <a:buFont typeface="Wingdings 3" charset="2"/>
+              <a:buChar char=""/>
+              <a:defRPr sz="1200" kern="1200">
+                <a:solidFill>
+                  <a:schemeClr val="tx1">
+                    <a:lumMod val="75000"/>
+                    <a:lumOff val="25000"/>
+                  </a:schemeClr>
+                </a:solidFill>
+                <a:latin typeface="+mn-lt"/>
+                <a:ea typeface="+mn-ea"/>
+                <a:cs typeface="+mn-cs"/>
+              </a:defRPr>
+            </a:lvl8pPr>
+            <a:lvl9pPr marL="3886200" indent="-228600" algn="l" defTabSz="457200" rtl="0" eaLnBrk="1" latinLnBrk="0" hangingPunct="1">
+              <a:spcBef>
+                <a:spcPts val="1000"/>
+              </a:spcBef>
+              <a:spcAft>
+                <a:spcPts val="0"/>
+              </a:spcAft>
+              <a:buClr>
+                <a:schemeClr val="accent1"/>
+              </a:buClr>
+              <a:buFont typeface="Wingdings 3" charset="2"/>
+              <a:buChar char=""/>
+              <a:defRPr sz="1200" kern="1200">
+                <a:solidFill>
+                  <a:schemeClr val="tx1">
+                    <a:lumMod val="75000"/>
+                    <a:lumOff val="25000"/>
+                  </a:schemeClr>
+                </a:solidFill>
+                <a:latin typeface="+mn-lt"/>
+                <a:ea typeface="+mn-ea"/>
+                <a:cs typeface="+mn-cs"/>
+              </a:defRPr>
+            </a:lvl9pPr>
+          </a:lstStyle>
+          <a:p>
+            <a:r>
+              <a:rPr lang="en-US" sz="2000" dirty="0"/>
+              <a:t>Seasonal Mann-Kendall Trend Test</a:t>
+            </a:r>
+          </a:p>
+          <a:p>
+            <a:pPr lvl="1"/>
+            <a:r>
+              <a:rPr lang="en-US" sz="1800" dirty="0"/>
+              <a:t>N: 7 increase; 7 decrease</a:t>
+            </a:r>
+          </a:p>
+          <a:p>
+            <a:pPr lvl="1"/>
+            <a:r>
+              <a:rPr lang="en-US" sz="1800" dirty="0"/>
+              <a:t>P: 7 increase; 5 decrease</a:t>
+            </a:r>
+          </a:p>
+          <a:p>
+            <a:pPr lvl="1"/>
+            <a:r>
+              <a:rPr lang="en-US" sz="1800" dirty="0"/>
+              <a:t>Mainstem increasing</a:t>
+            </a:r>
+          </a:p>
+          <a:p>
+            <a:r>
+              <a:rPr lang="en-US" sz="2000" dirty="0"/>
+              <a:t>Discharge × nutrient</a:t>
+            </a:r>
+          </a:p>
+          <a:p>
+            <a:pPr lvl="1"/>
+            <a:r>
+              <a:rPr lang="en-US" sz="1800" dirty="0"/>
+              <a:t>18/22 positive relationship</a:t>
+            </a:r>
+          </a:p>
+          <a:p>
+            <a:pPr marL="0" indent="0">
+              <a:buNone/>
+            </a:pPr>
+            <a:endParaRPr lang="en-US" sz="2000" dirty="0"/>
           </a:p>
         </p:txBody>
       </p:sp>
+      <p:pic>
+        <p:nvPicPr>
+          <p:cNvPr id="7" name="Content Placeholder 4" descr="A close up of a map&#10;&#10;Description automatically generated">
+            <a:extLst>
+              <a:ext uri="{FF2B5EF4-FFF2-40B4-BE49-F238E27FC236}">
+                <a16:creationId xmlns:a16="http://schemas.microsoft.com/office/drawing/2014/main" id="{7BE4E82C-CE17-4807-A506-01EED4BB2C34}"/>
+              </a:ext>
+            </a:extLst>
+          </p:cNvPr>
+          <p:cNvPicPr>
+            <a:picLocks noChangeAspect="1"/>
+          </p:cNvPicPr>
+          <p:nvPr/>
+        </p:nvPicPr>
+        <p:blipFill>
+          <a:blip r:embed="rId4"/>
+          <a:stretch>
+            <a:fillRect/>
+          </a:stretch>
+        </p:blipFill>
+        <p:spPr>
+          <a:xfrm>
+            <a:off x="4860727" y="2100740"/>
+            <a:ext cx="7128813" cy="4205999"/>
+          </a:xfrm>
+          <a:prstGeom prst="rect">
+            <a:avLst/>
+          </a:prstGeom>
+        </p:spPr>
+      </p:pic>
     </p:spTree>
     <p:extLst>
       <p:ext uri="{BB962C8B-B14F-4D97-AF65-F5344CB8AC3E}">
-        <p14:creationId xmlns:p14="http://schemas.microsoft.com/office/powerpoint/2010/main" val="4220873400"/>
+        <p14:creationId xmlns:p14="http://schemas.microsoft.com/office/powerpoint/2010/main" val="657403828"/>
       </p:ext>
     </p:extLst>
   </p:cSld>
   <p:clrMapOvr>
     <a:masterClrMapping/>
   </p:clrMapOvr>
+  <p:timing>
+    <p:tnLst>
+      <p:par>
+        <p:cTn id="1" dur="indefinite" restart="never" nodeType="tmRoot">
+          <p:childTnLst>
+            <p:seq concurrent="1" nextAc="seek">
+              <p:cTn id="2" dur="indefinite" nodeType="mainSeq">
+                <p:childTnLst>
+                  <p:par>
+                    <p:cTn id="3" fill="hold">
+                      <p:stCondLst>
+                        <p:cond delay="indefinite"/>
+                      </p:stCondLst>
+                      <p:childTnLst>
+                        <p:par>
+                          <p:cTn id="4" fill="hold">
+                            <p:stCondLst>
+                              <p:cond delay="0"/>
+                            </p:stCondLst>
+                            <p:childTnLst>
+                              <p:par>
+                                <p:cTn id="5" presetID="10" presetClass="entr" presetSubtype="0" fill="hold" nodeType="clickEffect">
+                                  <p:stCondLst>
+                                    <p:cond delay="0"/>
+                                  </p:stCondLst>
+                                  <p:childTnLst>
+                                    <p:set>
+                                      <p:cBhvr>
+                                        <p:cTn id="6" dur="1" fill="hold">
+                                          <p:stCondLst>
+                                            <p:cond delay="0"/>
+                                          </p:stCondLst>
+                                        </p:cTn>
+                                        <p:tgtEl>
+                                          <p:spTgt spid="7"/>
+                                        </p:tgtEl>
+                                        <p:attrNameLst>
+                                          <p:attrName>style.visibility</p:attrName>
+                                        </p:attrNameLst>
+                                      </p:cBhvr>
+                                      <p:to>
+                                        <p:strVal val="visible"/>
+                                      </p:to>
+                                    </p:set>
+                                    <p:animEffect transition="in" filter="fade">
+                                      <p:cBhvr>
+                                        <p:cTn id="7" dur="500"/>
+                                        <p:tgtEl>
+                                          <p:spTgt spid="7"/>
+                                        </p:tgtEl>
+                                      </p:cBhvr>
+                                    </p:animEffect>
+                                  </p:childTnLst>
+                                </p:cTn>
+                              </p:par>
+                            </p:childTnLst>
+                          </p:cTn>
+                        </p:par>
+                      </p:childTnLst>
+                    </p:cTn>
+                  </p:par>
+                </p:childTnLst>
+              </p:cTn>
+              <p:prevCondLst>
+                <p:cond evt="onPrev" delay="0">
+                  <p:tgtEl>
+                    <p:sldTgt/>
+                  </p:tgtEl>
+                </p:cond>
+              </p:prevCondLst>
+              <p:nextCondLst>
+                <p:cond evt="onNext" delay="0">
+                  <p:tgtEl>
+                    <p:sldTgt/>
+                  </p:tgtEl>
+                </p:cond>
+              </p:nextCondLst>
+            </p:seq>
+          </p:childTnLst>
+        </p:cTn>
+      </p:par>
+    </p:tnLst>
+  </p:timing>
 </p:sld>
 </file>
 

</xml_diff>

<commit_message>
Update to the drought slide to include the graph we want to present as well as notes for the presentation of the drought slide
</commit_message>
<xml_diff>
--- a/TeamDocs/Examining the Hydrologic Properties of the Missouri River.pptx
+++ b/TeamDocs/Examining the Hydrologic Properties of the Missouri River.pptx
@@ -207,7 +207,7 @@
           <a:p>
             <a:fld id="{B56C8744-E6BD-4290-891C-CE220D660B8A}" type="datetimeFigureOut">
               <a:rPr lang="en-US" smtClean="0"/>
-              <a:t>11/20/2019</a:t>
+              <a:t>11/20/19</a:t>
             </a:fld>
             <a:endParaRPr lang="en-US"/>
           </a:p>
@@ -1107,6 +1107,41 @@
               <a:t>Caroline</a:t>
             </a:r>
           </a:p>
+          <a:p>
+            <a:r>
+              <a:rPr lang="en-US" dirty="0"/>
+              <a:t>This figure shows the 30-day moving average discharge (</a:t>
+            </a:r>
+            <a:r>
+              <a:rPr lang="en-US" dirty="0" err="1"/>
+              <a:t>cfs</a:t>
+            </a:r>
+            <a:r>
+              <a:rPr lang="en-US" dirty="0"/>
+              <a:t>) in 2017 and 2018 at Mill Creek at Johnson Drive, Shawnee, KS. The colors represent what normal conditions would be (green), drought watch conditions (yellow), drought warning conditions (orange), and drought emergency (red). These colors are calculated using historical data by determining the 0– 75</a:t>
+            </a:r>
+            <a:r>
+              <a:rPr lang="en-US" baseline="30000" dirty="0"/>
+              <a:t>th</a:t>
+            </a:r>
+            <a:r>
+              <a:rPr lang="en-US" dirty="0"/>
+              <a:t> percentile of 30-day moving average flow in the river basin. The code for this graph was found through the USGS website and a 30-day moving average was kept, as opposed to going to a </a:t>
+            </a:r>
+            <a:r>
+              <a:rPr lang="en-US"/>
+              <a:t>7-day moving average, </a:t>
+            </a:r>
+            <a:r>
+              <a:rPr lang="en-US" dirty="0"/>
+              <a:t>for this analysis since that is what USGS </a:t>
+            </a:r>
+            <a:r>
+              <a:rPr lang="en-US"/>
+              <a:t>had published.</a:t>
+            </a:r>
+            <a:endParaRPr lang="en-US" dirty="0"/>
+          </a:p>
         </p:txBody>
       </p:sp>
       <p:sp>
@@ -1509,7 +1544,7 @@
             <a:fld id="{B61BEF0D-F0BB-DE4B-95CE-6DB70DBA9567}" type="datetimeFigureOut">
               <a:rPr lang="en-US" dirty="0"/>
               <a:pPr/>
-              <a:t>11/20/2019</a:t>
+              <a:t>11/20/19</a:t>
             </a:fld>
             <a:endParaRPr lang="en-US" dirty="0"/>
           </a:p>
@@ -1844,7 +1879,7 @@
             <a:fld id="{B61BEF0D-F0BB-DE4B-95CE-6DB70DBA9567}" type="datetimeFigureOut">
               <a:rPr lang="en-US" dirty="0"/>
               <a:pPr/>
-              <a:t>11/20/2019</a:t>
+              <a:t>11/20/19</a:t>
             </a:fld>
             <a:endParaRPr lang="en-US" dirty="0"/>
           </a:p>
@@ -2242,7 +2277,7 @@
             <a:fld id="{B61BEF0D-F0BB-DE4B-95CE-6DB70DBA9567}" type="datetimeFigureOut">
               <a:rPr lang="en-US" dirty="0"/>
               <a:pPr/>
-              <a:t>11/20/2019</a:t>
+              <a:t>11/20/19</a:t>
             </a:fld>
             <a:endParaRPr lang="en-US" dirty="0"/>
           </a:p>
@@ -2574,7 +2609,7 @@
             <a:fld id="{B61BEF0D-F0BB-DE4B-95CE-6DB70DBA9567}" type="datetimeFigureOut">
               <a:rPr lang="en-US" dirty="0"/>
               <a:pPr/>
-              <a:t>11/20/2019</a:t>
+              <a:t>11/20/19</a:t>
             </a:fld>
             <a:endParaRPr lang="en-US" dirty="0"/>
           </a:p>
@@ -2891,7 +2926,7 @@
             <a:fld id="{B61BEF0D-F0BB-DE4B-95CE-6DB70DBA9567}" type="datetimeFigureOut">
               <a:rPr lang="en-US" dirty="0"/>
               <a:pPr/>
-              <a:t>11/20/2019</a:t>
+              <a:t>11/20/19</a:t>
             </a:fld>
             <a:endParaRPr lang="en-US" dirty="0"/>
           </a:p>
@@ -3284,7 +3319,7 @@
             <a:fld id="{B61BEF0D-F0BB-DE4B-95CE-6DB70DBA9567}" type="datetimeFigureOut">
               <a:rPr lang="en-US" dirty="0"/>
               <a:pPr/>
-              <a:t>11/20/2019</a:t>
+              <a:t>11/20/19</a:t>
             </a:fld>
             <a:endParaRPr lang="en-US" dirty="0"/>
           </a:p>
@@ -3538,7 +3573,7 @@
             <a:fld id="{B61BEF0D-F0BB-DE4B-95CE-6DB70DBA9567}" type="datetimeFigureOut">
               <a:rPr lang="en-US" dirty="0"/>
               <a:pPr/>
-              <a:t>11/20/2019</a:t>
+              <a:t>11/20/19</a:t>
             </a:fld>
             <a:endParaRPr lang="en-US" dirty="0"/>
           </a:p>
@@ -3797,7 +3832,7 @@
             <a:fld id="{B61BEF0D-F0BB-DE4B-95CE-6DB70DBA9567}" type="datetimeFigureOut">
               <a:rPr lang="en-US" dirty="0"/>
               <a:pPr/>
-              <a:t>11/20/2019</a:t>
+              <a:t>11/20/19</a:t>
             </a:fld>
             <a:endParaRPr lang="en-US" dirty="0"/>
           </a:p>
@@ -4056,7 +4091,7 @@
             <a:fld id="{B61BEF0D-F0BB-DE4B-95CE-6DB70DBA9567}" type="datetimeFigureOut">
               <a:rPr lang="en-US" dirty="0"/>
               <a:pPr/>
-              <a:t>11/20/2019</a:t>
+              <a:t>11/20/19</a:t>
             </a:fld>
             <a:endParaRPr lang="en-US" dirty="0"/>
           </a:p>
@@ -4382,7 +4417,7 @@
             <a:fld id="{B61BEF0D-F0BB-DE4B-95CE-6DB70DBA9567}" type="datetimeFigureOut">
               <a:rPr lang="en-US" dirty="0"/>
               <a:pPr/>
-              <a:t>11/20/2019</a:t>
+              <a:t>11/20/19</a:t>
             </a:fld>
             <a:endParaRPr lang="en-US" dirty="0"/>
           </a:p>
@@ -4702,7 +4737,7 @@
             <a:fld id="{B61BEF0D-F0BB-DE4B-95CE-6DB70DBA9567}" type="datetimeFigureOut">
               <a:rPr lang="en-US" dirty="0"/>
               <a:pPr/>
-              <a:t>11/20/2019</a:t>
+              <a:t>11/20/19</a:t>
             </a:fld>
             <a:endParaRPr lang="en-US" dirty="0"/>
           </a:p>
@@ -5156,7 +5191,7 @@
             <a:fld id="{B61BEF0D-F0BB-DE4B-95CE-6DB70DBA9567}" type="datetimeFigureOut">
               <a:rPr lang="en-US" dirty="0"/>
               <a:pPr/>
-              <a:t>11/20/2019</a:t>
+              <a:t>11/20/19</a:t>
             </a:fld>
             <a:endParaRPr lang="en-US" dirty="0"/>
           </a:p>
@@ -5358,7 +5393,7 @@
             <a:fld id="{B61BEF0D-F0BB-DE4B-95CE-6DB70DBA9567}" type="datetimeFigureOut">
               <a:rPr lang="en-US" dirty="0"/>
               <a:pPr/>
-              <a:t>11/20/2019</a:t>
+              <a:t>11/20/19</a:t>
             </a:fld>
             <a:endParaRPr lang="en-US" dirty="0"/>
           </a:p>
@@ -5532,7 +5567,7 @@
             <a:fld id="{B61BEF0D-F0BB-DE4B-95CE-6DB70DBA9567}" type="datetimeFigureOut">
               <a:rPr lang="en-US" dirty="0"/>
               <a:pPr/>
-              <a:t>11/20/2019</a:t>
+              <a:t>11/20/19</a:t>
             </a:fld>
             <a:endParaRPr lang="en-US" dirty="0"/>
           </a:p>
@@ -5862,7 +5897,7 @@
             <a:fld id="{B61BEF0D-F0BB-DE4B-95CE-6DB70DBA9567}" type="datetimeFigureOut">
               <a:rPr lang="en-US" dirty="0"/>
               <a:pPr/>
-              <a:t>11/20/2019</a:t>
+              <a:t>11/20/19</a:t>
             </a:fld>
             <a:endParaRPr lang="en-US" dirty="0"/>
           </a:p>
@@ -6204,7 +6239,7 @@
             <a:fld id="{B61BEF0D-F0BB-DE4B-95CE-6DB70DBA9567}" type="datetimeFigureOut">
               <a:rPr lang="en-US" dirty="0"/>
               <a:pPr/>
-              <a:t>11/20/2019</a:t>
+              <a:t>11/20/19</a:t>
             </a:fld>
             <a:endParaRPr lang="en-US" dirty="0"/>
           </a:p>
@@ -8318,7 +8353,7 @@
             <a:fld id="{B61BEF0D-F0BB-DE4B-95CE-6DB70DBA9567}" type="datetimeFigureOut">
               <a:rPr lang="en-US" dirty="0"/>
               <a:pPr/>
-              <a:t>11/20/2019</a:t>
+              <a:t>11/20/19</a:t>
             </a:fld>
             <a:endParaRPr lang="en-US" dirty="0"/>
           </a:p>
@@ -16199,7 +16234,12 @@
             <p:ph type="title"/>
           </p:nvPr>
         </p:nvSpPr>
-        <p:spPr/>
+        <p:spPr>
+          <a:xfrm>
+            <a:off x="2510863" y="424818"/>
+            <a:ext cx="8911687" cy="1280890"/>
+          </a:xfrm>
+        </p:spPr>
         <p:txBody>
           <a:bodyPr>
             <a:normAutofit fontScale="90000"/>
@@ -16221,31 +16261,36 @@
           </a:p>
         </p:txBody>
       </p:sp>
-      <p:sp>
-        <p:nvSpPr>
-          <p:cNvPr id="3" name="Content Placeholder 2">
+      <p:pic>
+        <p:nvPicPr>
+          <p:cNvPr id="5" name="Picture 4">
             <a:extLst>
               <a:ext uri="{FF2B5EF4-FFF2-40B4-BE49-F238E27FC236}">
-                <a16:creationId xmlns:a16="http://schemas.microsoft.com/office/drawing/2014/main" id="{38B09376-590C-4612-B7FA-6702C992F642}"/>
+                <a16:creationId xmlns:a16="http://schemas.microsoft.com/office/drawing/2014/main" id="{EC34B30D-5D08-AB44-9952-1726342C9CF0}"/>
               </a:ext>
             </a:extLst>
           </p:cNvPr>
-          <p:cNvSpPr>
-            <a:spLocks noGrp="1"/>
-          </p:cNvSpPr>
-          <p:nvPr>
-            <p:ph idx="1"/>
-          </p:nvPr>
-        </p:nvSpPr>
-        <p:spPr/>
-        <p:txBody>
-          <a:bodyPr/>
-          <a:lstStyle/>
-          <a:p>
-            <a:endParaRPr lang="en-US"/>
-          </a:p>
-        </p:txBody>
-      </p:sp>
+          <p:cNvPicPr>
+            <a:picLocks noChangeAspect="1"/>
+          </p:cNvPicPr>
+          <p:nvPr/>
+        </p:nvPicPr>
+        <p:blipFill>
+          <a:blip r:embed="rId3"/>
+          <a:stretch>
+            <a:fillRect/>
+          </a:stretch>
+        </p:blipFill>
+        <p:spPr>
+          <a:xfrm>
+            <a:off x="2014218" y="1600257"/>
+            <a:ext cx="8911687" cy="5086387"/>
+          </a:xfrm>
+          <a:prstGeom prst="rect">
+            <a:avLst/>
+          </a:prstGeom>
+        </p:spPr>
+      </p:pic>
     </p:spTree>
     <p:extLst>
       <p:ext uri="{BB962C8B-B14F-4D97-AF65-F5344CB8AC3E}">

</xml_diff>

<commit_message>
edited powerpoint and practiced slides
</commit_message>
<xml_diff>
--- a/TeamDocs/Examining the Hydrologic Properties of the Missouri River.pptx
+++ b/TeamDocs/Examining the Hydrologic Properties of the Missouri River.pptx
@@ -207,7 +207,7 @@
           <a:p>
             <a:fld id="{B56C8744-E6BD-4290-891C-CE220D660B8A}" type="datetimeFigureOut">
               <a:rPr lang="en-US" smtClean="0"/>
-              <a:t>11/20/19</a:t>
+              <a:t>11/21/2019</a:t>
             </a:fld>
             <a:endParaRPr lang="en-US"/>
           </a:p>
@@ -520,40 +520,7 @@
           <a:p>
             <a:r>
               <a:rPr lang="en-US" dirty="0"/>
-              <a:t>Hubert ~ 1min</a:t>
-            </a:r>
-          </a:p>
-          <a:p>
-            <a:r>
-              <a:rPr lang="en-US" dirty="0"/>
-              <a:t>As you may have known, the Missouri River is the largest river in North America, and it also has the second largest watershed of 338 million acres including a small part in Canada.</a:t>
-            </a:r>
-          </a:p>
-          <a:p>
-            <a:endParaRPr lang="en-US" dirty="0"/>
-          </a:p>
-          <a:p>
-            <a:r>
-              <a:rPr lang="en-US" dirty="0"/>
-              <a:t>The basin is primarily rural, but also has several large or medium-sized cities. As shown on this map, a large proportion of the region is agricultural land. 218 acres are related to agriculture, and two major land uses are cropland and pasture. </a:t>
-            </a:r>
-          </a:p>
-          <a:p>
-            <a:endParaRPr lang="en-US" dirty="0"/>
-          </a:p>
-          <a:p>
-            <a:r>
-              <a:rPr lang="en-US" dirty="0"/>
-              <a:t>Across the whole basin, agricultural lands are the predominant source for nutrient loading into water bodies. According to Clean Water Act 303 d list 2015, more than 160 waterbodies are impaired due to nutrient enrichment.</a:t>
-            </a:r>
-          </a:p>
-          <a:p>
-            <a:endParaRPr lang="en-US" dirty="0"/>
-          </a:p>
-          <a:p>
-            <a:r>
-              <a:rPr lang="en-US" dirty="0"/>
-              <a:t>Since most of agricultural lands are located in the lower Missouri basin, in this project we focused on sub-basins in the southeast.</a:t>
+              <a:t>Rachel</a:t>
             </a:r>
           </a:p>
         </p:txBody>
@@ -575,7 +542,7 @@
           <a:p>
             <a:fld id="{B78AC56A-6061-4999-A98E-F9A34B7E1C35}" type="slidenum">
               <a:rPr lang="en-US" smtClean="0"/>
-              <a:t>2</a:t>
+              <a:t>1</a:t>
             </a:fld>
             <a:endParaRPr lang="en-US"/>
           </a:p>
@@ -584,7 +551,201 @@
     </p:spTree>
     <p:extLst>
       <p:ext uri="{BB962C8B-B14F-4D97-AF65-F5344CB8AC3E}">
-        <p14:creationId xmlns:p14="http://schemas.microsoft.com/office/powerpoint/2010/main" val="2737847670"/>
+        <p14:creationId xmlns:p14="http://schemas.microsoft.com/office/powerpoint/2010/main" val="3252453354"/>
+      </p:ext>
+    </p:extLst>
+  </p:cSld>
+  <p:clrMapOvr>
+    <a:masterClrMapping/>
+  </p:clrMapOvr>
+</p:notes>
+</file>
+
+<file path=ppt/notesSlides/notesSlide10.xml><?xml version="1.0" encoding="utf-8"?>
+<p:notes xmlns:a="http://schemas.openxmlformats.org/drawingml/2006/main" xmlns:r="http://schemas.openxmlformats.org/officeDocument/2006/relationships" xmlns:p="http://schemas.openxmlformats.org/presentationml/2006/main">
+  <p:cSld>
+    <p:spTree>
+      <p:nvGrpSpPr>
+        <p:cNvPr id="1" name=""/>
+        <p:cNvGrpSpPr/>
+        <p:nvPr/>
+      </p:nvGrpSpPr>
+      <p:grpSpPr>
+        <a:xfrm>
+          <a:off x="0" y="0"/>
+          <a:ext cx="0" cy="0"/>
+          <a:chOff x="0" y="0"/>
+          <a:chExt cx="0" cy="0"/>
+        </a:xfrm>
+      </p:grpSpPr>
+      <p:sp>
+        <p:nvSpPr>
+          <p:cNvPr id="2" name="Slide Image Placeholder 1"/>
+          <p:cNvSpPr>
+            <a:spLocks noGrp="1" noRot="1" noChangeAspect="1"/>
+          </p:cNvSpPr>
+          <p:nvPr>
+            <p:ph type="sldImg"/>
+          </p:nvPr>
+        </p:nvSpPr>
+        <p:spPr/>
+      </p:sp>
+      <p:sp>
+        <p:nvSpPr>
+          <p:cNvPr id="3" name="Notes Placeholder 2"/>
+          <p:cNvSpPr>
+            <a:spLocks noGrp="1"/>
+          </p:cNvSpPr>
+          <p:nvPr>
+            <p:ph type="body" idx="1"/>
+          </p:nvPr>
+        </p:nvSpPr>
+        <p:spPr/>
+        <p:txBody>
+          <a:bodyPr/>
+          <a:lstStyle/>
+          <a:p>
+            <a:r>
+              <a:rPr lang="en-US" dirty="0" err="1"/>
+              <a:t>Keqi</a:t>
+            </a:r>
+            <a:endParaRPr lang="en-US" dirty="0"/>
+          </a:p>
+        </p:txBody>
+      </p:sp>
+      <p:sp>
+        <p:nvSpPr>
+          <p:cNvPr id="4" name="Slide Number Placeholder 3"/>
+          <p:cNvSpPr>
+            <a:spLocks noGrp="1"/>
+          </p:cNvSpPr>
+          <p:nvPr>
+            <p:ph type="sldNum" sz="quarter" idx="5"/>
+          </p:nvPr>
+        </p:nvSpPr>
+        <p:spPr/>
+        <p:txBody>
+          <a:bodyPr/>
+          <a:lstStyle/>
+          <a:p>
+            <a:fld id="{B78AC56A-6061-4999-A98E-F9A34B7E1C35}" type="slidenum">
+              <a:rPr lang="en-US" smtClean="0"/>
+              <a:t>10</a:t>
+            </a:fld>
+            <a:endParaRPr lang="en-US"/>
+          </a:p>
+        </p:txBody>
+      </p:sp>
+    </p:spTree>
+    <p:extLst>
+      <p:ext uri="{BB962C8B-B14F-4D97-AF65-F5344CB8AC3E}">
+        <p14:creationId xmlns:p14="http://schemas.microsoft.com/office/powerpoint/2010/main" val="1015683925"/>
+      </p:ext>
+    </p:extLst>
+  </p:cSld>
+  <p:clrMapOvr>
+    <a:masterClrMapping/>
+  </p:clrMapOvr>
+</p:notes>
+</file>
+
+<file path=ppt/notesSlides/notesSlide11.xml><?xml version="1.0" encoding="utf-8"?>
+<p:notes xmlns:a="http://schemas.openxmlformats.org/drawingml/2006/main" xmlns:r="http://schemas.openxmlformats.org/officeDocument/2006/relationships" xmlns:p="http://schemas.openxmlformats.org/presentationml/2006/main">
+  <p:cSld>
+    <p:spTree>
+      <p:nvGrpSpPr>
+        <p:cNvPr id="1" name=""/>
+        <p:cNvGrpSpPr/>
+        <p:nvPr/>
+      </p:nvGrpSpPr>
+      <p:grpSpPr>
+        <a:xfrm>
+          <a:off x="0" y="0"/>
+          <a:ext cx="0" cy="0"/>
+          <a:chOff x="0" y="0"/>
+          <a:chExt cx="0" cy="0"/>
+        </a:xfrm>
+      </p:grpSpPr>
+      <p:sp>
+        <p:nvSpPr>
+          <p:cNvPr id="2" name="Slide Image Placeholder 1"/>
+          <p:cNvSpPr>
+            <a:spLocks noGrp="1" noRot="1" noChangeAspect="1"/>
+          </p:cNvSpPr>
+          <p:nvPr>
+            <p:ph type="sldImg"/>
+          </p:nvPr>
+        </p:nvSpPr>
+        <p:spPr/>
+      </p:sp>
+      <p:sp>
+        <p:nvSpPr>
+          <p:cNvPr id="3" name="Notes Placeholder 2"/>
+          <p:cNvSpPr>
+            <a:spLocks noGrp="1"/>
+          </p:cNvSpPr>
+          <p:nvPr>
+            <p:ph type="body" idx="1"/>
+          </p:nvPr>
+        </p:nvSpPr>
+        <p:spPr/>
+        <p:txBody>
+          <a:bodyPr/>
+          <a:lstStyle/>
+          <a:p>
+            <a:r>
+              <a:rPr lang="en-US" dirty="0"/>
+              <a:t>Caroline</a:t>
+            </a:r>
+          </a:p>
+          <a:p>
+            <a:r>
+              <a:rPr lang="en-US" dirty="0" err="1"/>
+              <a:t>Keqi</a:t>
+            </a:r>
+            <a:endParaRPr lang="en-US" dirty="0"/>
+          </a:p>
+          <a:p>
+            <a:r>
+              <a:rPr lang="en-US" dirty="0"/>
+              <a:t>Hubert</a:t>
+            </a:r>
+          </a:p>
+          <a:p>
+            <a:r>
+              <a:rPr lang="en-US" dirty="0"/>
+              <a:t>Rachel</a:t>
+            </a:r>
+          </a:p>
+        </p:txBody>
+      </p:sp>
+      <p:sp>
+        <p:nvSpPr>
+          <p:cNvPr id="4" name="Slide Number Placeholder 3"/>
+          <p:cNvSpPr>
+            <a:spLocks noGrp="1"/>
+          </p:cNvSpPr>
+          <p:nvPr>
+            <p:ph type="sldNum" sz="quarter" idx="5"/>
+          </p:nvPr>
+        </p:nvSpPr>
+        <p:spPr/>
+        <p:txBody>
+          <a:bodyPr/>
+          <a:lstStyle/>
+          <a:p>
+            <a:fld id="{B78AC56A-6061-4999-A98E-F9A34B7E1C35}" type="slidenum">
+              <a:rPr lang="en-US" smtClean="0"/>
+              <a:t>11</a:t>
+            </a:fld>
+            <a:endParaRPr lang="en-US"/>
+          </a:p>
+        </p:txBody>
+      </p:sp>
+    </p:spTree>
+    <p:extLst>
+      <p:ext uri="{BB962C8B-B14F-4D97-AF65-F5344CB8AC3E}">
+        <p14:creationId xmlns:p14="http://schemas.microsoft.com/office/powerpoint/2010/main" val="2604882624"/>
       </p:ext>
     </p:extLst>
   </p:cSld>
@@ -639,10 +800,42 @@
           <a:lstStyle/>
           <a:p>
             <a:r>
-              <a:rPr lang="en-US" dirty="0" err="1"/>
-              <a:t>caroline</a:t>
-            </a:r>
+              <a:rPr lang="en-US" dirty="0"/>
+              <a:t>Hubert ~ 1min</a:t>
+            </a:r>
+          </a:p>
+          <a:p>
+            <a:r>
+              <a:rPr lang="en-US" dirty="0"/>
+              <a:t>As you may have known, the Missouri River is the largest river in North America, and it also has the second largest watershed of 338 million acres including a small part in Canada.</a:t>
+            </a:r>
+          </a:p>
+          <a:p>
             <a:endParaRPr lang="en-US" dirty="0"/>
+          </a:p>
+          <a:p>
+            <a:r>
+              <a:rPr lang="en-US" dirty="0"/>
+              <a:t>The basin is primarily rural, but also has several large or medium-sized cities. As shown on this map, a large proportion of the region is agricultural land. 218 acres are related to agriculture, and two major land uses are cropland and pasture. </a:t>
+            </a:r>
+          </a:p>
+          <a:p>
+            <a:endParaRPr lang="en-US" dirty="0"/>
+          </a:p>
+          <a:p>
+            <a:r>
+              <a:rPr lang="en-US" dirty="0"/>
+              <a:t>Across the whole basin, agricultural lands are the predominant source for nutrient loading into water bodies. According to Clean Water Act 303 d list 2015, more than 160 waterbodies are impaired due to nutrient enrichment.</a:t>
+            </a:r>
+          </a:p>
+          <a:p>
+            <a:endParaRPr lang="en-US" dirty="0"/>
+          </a:p>
+          <a:p>
+            <a:r>
+              <a:rPr lang="en-US" dirty="0"/>
+              <a:t>Since most of agricultural lands are located in the lower Missouri basin, in this project we focused on sub-basins in the southeast.</a:t>
+            </a:r>
           </a:p>
         </p:txBody>
       </p:sp>
@@ -663,7 +856,7 @@
           <a:p>
             <a:fld id="{B78AC56A-6061-4999-A98E-F9A34B7E1C35}" type="slidenum">
               <a:rPr lang="en-US" smtClean="0"/>
-              <a:t>3</a:t>
+              <a:t>2</a:t>
             </a:fld>
             <a:endParaRPr lang="en-US"/>
           </a:p>
@@ -672,7 +865,7 @@
     </p:spTree>
     <p:extLst>
       <p:ext uri="{BB962C8B-B14F-4D97-AF65-F5344CB8AC3E}">
-        <p14:creationId xmlns:p14="http://schemas.microsoft.com/office/powerpoint/2010/main" val="2321390170"/>
+        <p14:creationId xmlns:p14="http://schemas.microsoft.com/office/powerpoint/2010/main" val="2737847670"/>
       </p:ext>
     </p:extLst>
   </p:cSld>
@@ -727,11 +920,9 @@
           <a:lstStyle/>
           <a:p>
             <a:r>
-              <a:rPr lang="en-US" dirty="0"/>
-              <a:t>Caroline</a:t>
-            </a:r>
-          </a:p>
-          <a:p>
+              <a:rPr lang="en-US" dirty="0" err="1"/>
+              <a:t>caroline</a:t>
+            </a:r>
             <a:endParaRPr lang="en-US" dirty="0"/>
           </a:p>
         </p:txBody>
@@ -753,7 +944,7 @@
           <a:p>
             <a:fld id="{B78AC56A-6061-4999-A98E-F9A34B7E1C35}" type="slidenum">
               <a:rPr lang="en-US" smtClean="0"/>
-              <a:t>4</a:t>
+              <a:t>3</a:t>
             </a:fld>
             <a:endParaRPr lang="en-US"/>
           </a:p>
@@ -762,7 +953,7 @@
     </p:spTree>
     <p:extLst>
       <p:ext uri="{BB962C8B-B14F-4D97-AF65-F5344CB8AC3E}">
-        <p14:creationId xmlns:p14="http://schemas.microsoft.com/office/powerpoint/2010/main" val="2198439809"/>
+        <p14:creationId xmlns:p14="http://schemas.microsoft.com/office/powerpoint/2010/main" val="2321390170"/>
       </p:ext>
     </p:extLst>
   </p:cSld>
@@ -817,9 +1008,11 @@
           <a:lstStyle/>
           <a:p>
             <a:r>
-              <a:rPr lang="en-US" dirty="0" err="1"/>
-              <a:t>keqi</a:t>
-            </a:r>
+              <a:rPr lang="en-US" dirty="0"/>
+              <a:t>Caroline</a:t>
+            </a:r>
+          </a:p>
+          <a:p>
             <a:endParaRPr lang="en-US" dirty="0"/>
           </a:p>
         </p:txBody>
@@ -841,7 +1034,7 @@
           <a:p>
             <a:fld id="{B78AC56A-6061-4999-A98E-F9A34B7E1C35}" type="slidenum">
               <a:rPr lang="en-US" smtClean="0"/>
-              <a:t>5</a:t>
+              <a:t>4</a:t>
             </a:fld>
             <a:endParaRPr lang="en-US"/>
           </a:p>
@@ -850,7 +1043,7 @@
     </p:spTree>
     <p:extLst>
       <p:ext uri="{BB962C8B-B14F-4D97-AF65-F5344CB8AC3E}">
-        <p14:creationId xmlns:p14="http://schemas.microsoft.com/office/powerpoint/2010/main" val="457785700"/>
+        <p14:creationId xmlns:p14="http://schemas.microsoft.com/office/powerpoint/2010/main" val="2198439809"/>
       </p:ext>
     </p:extLst>
   </p:cSld>
@@ -905,9 +1098,11 @@
           <a:lstStyle/>
           <a:p>
             <a:r>
-              <a:rPr lang="en-US" dirty="0" err="1"/>
-              <a:t>rachel</a:t>
-            </a:r>
+              <a:rPr lang="en-US" dirty="0"/>
+              <a:t>Rachel</a:t>
+            </a:r>
+          </a:p>
+          <a:p>
             <a:endParaRPr lang="en-US" dirty="0"/>
           </a:p>
         </p:txBody>
@@ -929,7 +1124,7 @@
           <a:p>
             <a:fld id="{B78AC56A-6061-4999-A98E-F9A34B7E1C35}" type="slidenum">
               <a:rPr lang="en-US" smtClean="0"/>
-              <a:t>6</a:t>
+              <a:t>5</a:t>
             </a:fld>
             <a:endParaRPr lang="en-US"/>
           </a:p>
@@ -938,7 +1133,7 @@
     </p:spTree>
     <p:extLst>
       <p:ext uri="{BB962C8B-B14F-4D97-AF65-F5344CB8AC3E}">
-        <p14:creationId xmlns:p14="http://schemas.microsoft.com/office/powerpoint/2010/main" val="1940982666"/>
+        <p14:creationId xmlns:p14="http://schemas.microsoft.com/office/powerpoint/2010/main" val="457785700"/>
       </p:ext>
     </p:extLst>
   </p:cSld>
@@ -993,32 +1188,10 @@
           <a:lstStyle/>
           <a:p>
             <a:r>
-              <a:rPr lang="en-US" dirty="0"/>
-              <a:t>Hubert ~2min</a:t>
-            </a:r>
-          </a:p>
-          <a:p>
-            <a:r>
-              <a:rPr lang="en-US" dirty="0"/>
-              <a:t>To investigate the trend of nutrient concentration, we used long-term daily values and seasonal Mann-Kendal test. Among all 22 sites, 7 sites show significantly increasing trends in nitrogen concentration, while 7 show decreasing trends. For phosphorus, concentrations at 7 sites have increased over time, while decreased at other 5 sites. Despite inconsistent results at all sites, those on the mainstem show higher nutrient concentration, such as 7, 10, and 22.</a:t>
-            </a:r>
-          </a:p>
-          <a:p>
+              <a:rPr lang="en-US" dirty="0" err="1"/>
+              <a:t>keqi</a:t>
+            </a:r>
             <a:endParaRPr lang="en-US" dirty="0"/>
-          </a:p>
-          <a:p>
-            <a:r>
-              <a:rPr lang="en-US" dirty="0"/>
-              <a:t>We further examined the interaction between discharge and nutrient concentration. High-</a:t>
-            </a:r>
-            <a:r>
-              <a:rPr lang="en-US" dirty="0" err="1"/>
-              <a:t>freq</a:t>
-            </a:r>
-            <a:r>
-              <a:rPr lang="en-US" dirty="0"/>
-              <a:t> data were used for sites where the data are available, and for all other sites daily values were used. The relationship was analyzed by linear model with total nitrogen as the response variable and discharge as the explanatory variable.18 out of the 22 sites show a significant positive relationships.</a:t>
-            </a:r>
           </a:p>
         </p:txBody>
       </p:sp>
@@ -1039,7 +1212,7 @@
           <a:p>
             <a:fld id="{B78AC56A-6061-4999-A98E-F9A34B7E1C35}" type="slidenum">
               <a:rPr lang="en-US" smtClean="0"/>
-              <a:t>7</a:t>
+              <a:t>6</a:t>
             </a:fld>
             <a:endParaRPr lang="en-US"/>
           </a:p>
@@ -1048,7 +1221,7 @@
     </p:spTree>
     <p:extLst>
       <p:ext uri="{BB962C8B-B14F-4D97-AF65-F5344CB8AC3E}">
-        <p14:creationId xmlns:p14="http://schemas.microsoft.com/office/powerpoint/2010/main" val="3857117621"/>
+        <p14:creationId xmlns:p14="http://schemas.microsoft.com/office/powerpoint/2010/main" val="1940982666"/>
       </p:ext>
     </p:extLst>
   </p:cSld>
@@ -1104,43 +1277,31 @@
           <a:p>
             <a:r>
               <a:rPr lang="en-US" dirty="0"/>
-              <a:t>Caroline</a:t>
+              <a:t>Hubert ~2min</a:t>
             </a:r>
           </a:p>
           <a:p>
             <a:r>
               <a:rPr lang="en-US" dirty="0"/>
-              <a:t>This figure shows the 30-day moving average discharge (</a:t>
+              <a:t>To investigate the trend of nutrient concentration, we used long-term daily values and seasonal Mann-Kendal test. Among all 22 sites, 7 sites show significantly increasing trends in nitrogen concentration, while 7 show decreasing trends. For phosphorus, concentrations at 7 sites have increased over time, while decreased at other 5 sites. Despite inconsistent results at all sites, those on the mainstem show higher nutrient concentration, such as 7, 10, and 22.</a:t>
+            </a:r>
+          </a:p>
+          <a:p>
+            <a:endParaRPr lang="en-US" dirty="0"/>
+          </a:p>
+          <a:p>
+            <a:r>
+              <a:rPr lang="en-US" dirty="0"/>
+              <a:t>We further examined the interaction between discharge and nutrient concentration. High-</a:t>
             </a:r>
             <a:r>
               <a:rPr lang="en-US" dirty="0" err="1"/>
-              <a:t>cfs</a:t>
+              <a:t>freq</a:t>
             </a:r>
             <a:r>
               <a:rPr lang="en-US" dirty="0"/>
-              <a:t>) in 2017 and 2018 at Mill Creek at Johnson Drive, Shawnee, KS. The colors represent what normal conditions would be (green), drought watch conditions (yellow), drought warning conditions (orange), and drought emergency (red). These colors are calculated using historical data by determining the 0– 75</a:t>
-            </a:r>
-            <a:r>
-              <a:rPr lang="en-US" baseline="30000" dirty="0"/>
-              <a:t>th</a:t>
-            </a:r>
-            <a:r>
-              <a:rPr lang="en-US" dirty="0"/>
-              <a:t> percentile of 30-day moving average flow in the river basin. The code for this graph was found through the USGS website and a 30-day moving average was kept, as opposed to going to a </a:t>
-            </a:r>
-            <a:r>
-              <a:rPr lang="en-US"/>
-              <a:t>7-day moving average, </a:t>
-            </a:r>
-            <a:r>
-              <a:rPr lang="en-US" dirty="0"/>
-              <a:t>for this analysis since that is what USGS </a:t>
-            </a:r>
-            <a:r>
-              <a:rPr lang="en-US"/>
-              <a:t>had published.</a:t>
-            </a:r>
-            <a:endParaRPr lang="en-US" dirty="0"/>
+              <a:t> data were used for sites where the data are available, and for all other sites daily values were used. The relationship was analyzed by linear model with total nitrogen as the response variable and discharge as the explanatory variable.18 out of the 22 sites show a significant positive relationships.</a:t>
+            </a:r>
           </a:p>
         </p:txBody>
       </p:sp>
@@ -1161,7 +1322,7 @@
           <a:p>
             <a:fld id="{B78AC56A-6061-4999-A98E-F9A34B7E1C35}" type="slidenum">
               <a:rPr lang="en-US" smtClean="0"/>
-              <a:t>8</a:t>
+              <a:t>7</a:t>
             </a:fld>
             <a:endParaRPr lang="en-US"/>
           </a:p>
@@ -1170,7 +1331,7 @@
     </p:spTree>
     <p:extLst>
       <p:ext uri="{BB962C8B-B14F-4D97-AF65-F5344CB8AC3E}">
-        <p14:creationId xmlns:p14="http://schemas.microsoft.com/office/powerpoint/2010/main" val="51119041"/>
+        <p14:creationId xmlns:p14="http://schemas.microsoft.com/office/powerpoint/2010/main" val="3857117621"/>
       </p:ext>
     </p:extLst>
   </p:cSld>
@@ -1226,8 +1387,43 @@
           <a:p>
             <a:r>
               <a:rPr lang="en-US" dirty="0"/>
-              <a:t>Rachel</a:t>
-            </a:r>
+              <a:t>Caroline</a:t>
+            </a:r>
+          </a:p>
+          <a:p>
+            <a:r>
+              <a:rPr lang="en-US" dirty="0"/>
+              <a:t>This figure shows the 30-day moving average discharge (</a:t>
+            </a:r>
+            <a:r>
+              <a:rPr lang="en-US" dirty="0" err="1"/>
+              <a:t>cfs</a:t>
+            </a:r>
+            <a:r>
+              <a:rPr lang="en-US" dirty="0"/>
+              <a:t>) in 2017 and 2018 at Mill Creek at Johnson Drive, Shawnee, KS. The colors represent what normal conditions would be (green), drought watch conditions (yellow), drought warning conditions (orange), and drought emergency (red). These colors are calculated using historical data by determining the 0– 75</a:t>
+            </a:r>
+            <a:r>
+              <a:rPr lang="en-US" baseline="30000" dirty="0"/>
+              <a:t>th</a:t>
+            </a:r>
+            <a:r>
+              <a:rPr lang="en-US" dirty="0"/>
+              <a:t> percentile of 30-day moving average flow in the river basin. The code for this graph was found through the USGS website and a 30-day moving average was kept, as opposed to going to a </a:t>
+            </a:r>
+            <a:r>
+              <a:rPr lang="en-US"/>
+              <a:t>7-day moving average, </a:t>
+            </a:r>
+            <a:r>
+              <a:rPr lang="en-US" dirty="0"/>
+              <a:t>for this analysis since that is what USGS </a:t>
+            </a:r>
+            <a:r>
+              <a:rPr lang="en-US"/>
+              <a:t>had published.</a:t>
+            </a:r>
+            <a:endParaRPr lang="en-US" dirty="0"/>
           </a:p>
         </p:txBody>
       </p:sp>
@@ -1248,7 +1444,7 @@
           <a:p>
             <a:fld id="{B78AC56A-6061-4999-A98E-F9A34B7E1C35}" type="slidenum">
               <a:rPr lang="en-US" smtClean="0"/>
-              <a:t>9</a:t>
+              <a:t>8</a:t>
             </a:fld>
             <a:endParaRPr lang="en-US"/>
           </a:p>
@@ -1257,7 +1453,7 @@
     </p:spTree>
     <p:extLst>
       <p:ext uri="{BB962C8B-B14F-4D97-AF65-F5344CB8AC3E}">
-        <p14:creationId xmlns:p14="http://schemas.microsoft.com/office/powerpoint/2010/main" val="752203016"/>
+        <p14:creationId xmlns:p14="http://schemas.microsoft.com/office/powerpoint/2010/main" val="51119041"/>
       </p:ext>
     </p:extLst>
   </p:cSld>
@@ -1312,10 +1508,9 @@
           <a:lstStyle/>
           <a:p>
             <a:r>
-              <a:rPr lang="en-US" dirty="0" err="1"/>
-              <a:t>Keqi</a:t>
-            </a:r>
-            <a:endParaRPr lang="en-US" dirty="0"/>
+              <a:rPr lang="en-US" dirty="0"/>
+              <a:t>Rachel</a:t>
+            </a:r>
           </a:p>
         </p:txBody>
       </p:sp>
@@ -1336,7 +1531,7 @@
           <a:p>
             <a:fld id="{B78AC56A-6061-4999-A98E-F9A34B7E1C35}" type="slidenum">
               <a:rPr lang="en-US" smtClean="0"/>
-              <a:t>10</a:t>
+              <a:t>9</a:t>
             </a:fld>
             <a:endParaRPr lang="en-US"/>
           </a:p>
@@ -1345,7 +1540,7 @@
     </p:spTree>
     <p:extLst>
       <p:ext uri="{BB962C8B-B14F-4D97-AF65-F5344CB8AC3E}">
-        <p14:creationId xmlns:p14="http://schemas.microsoft.com/office/powerpoint/2010/main" val="1015683925"/>
+        <p14:creationId xmlns:p14="http://schemas.microsoft.com/office/powerpoint/2010/main" val="752203016"/>
       </p:ext>
     </p:extLst>
   </p:cSld>
@@ -1544,7 +1739,7 @@
             <a:fld id="{B61BEF0D-F0BB-DE4B-95CE-6DB70DBA9567}" type="datetimeFigureOut">
               <a:rPr lang="en-US" dirty="0"/>
               <a:pPr/>
-              <a:t>11/20/19</a:t>
+              <a:t>11/21/2019</a:t>
             </a:fld>
             <a:endParaRPr lang="en-US" dirty="0"/>
           </a:p>
@@ -1879,7 +2074,7 @@
             <a:fld id="{B61BEF0D-F0BB-DE4B-95CE-6DB70DBA9567}" type="datetimeFigureOut">
               <a:rPr lang="en-US" dirty="0"/>
               <a:pPr/>
-              <a:t>11/20/19</a:t>
+              <a:t>11/21/2019</a:t>
             </a:fld>
             <a:endParaRPr lang="en-US" dirty="0"/>
           </a:p>
@@ -2277,7 +2472,7 @@
             <a:fld id="{B61BEF0D-F0BB-DE4B-95CE-6DB70DBA9567}" type="datetimeFigureOut">
               <a:rPr lang="en-US" dirty="0"/>
               <a:pPr/>
-              <a:t>11/20/19</a:t>
+              <a:t>11/21/2019</a:t>
             </a:fld>
             <a:endParaRPr lang="en-US" dirty="0"/>
           </a:p>
@@ -2609,7 +2804,7 @@
             <a:fld id="{B61BEF0D-F0BB-DE4B-95CE-6DB70DBA9567}" type="datetimeFigureOut">
               <a:rPr lang="en-US" dirty="0"/>
               <a:pPr/>
-              <a:t>11/20/19</a:t>
+              <a:t>11/21/2019</a:t>
             </a:fld>
             <a:endParaRPr lang="en-US" dirty="0"/>
           </a:p>
@@ -2926,7 +3121,7 @@
             <a:fld id="{B61BEF0D-F0BB-DE4B-95CE-6DB70DBA9567}" type="datetimeFigureOut">
               <a:rPr lang="en-US" dirty="0"/>
               <a:pPr/>
-              <a:t>11/20/19</a:t>
+              <a:t>11/21/2019</a:t>
             </a:fld>
             <a:endParaRPr lang="en-US" dirty="0"/>
           </a:p>
@@ -3319,7 +3514,7 @@
             <a:fld id="{B61BEF0D-F0BB-DE4B-95CE-6DB70DBA9567}" type="datetimeFigureOut">
               <a:rPr lang="en-US" dirty="0"/>
               <a:pPr/>
-              <a:t>11/20/19</a:t>
+              <a:t>11/21/2019</a:t>
             </a:fld>
             <a:endParaRPr lang="en-US" dirty="0"/>
           </a:p>
@@ -3573,7 +3768,7 @@
             <a:fld id="{B61BEF0D-F0BB-DE4B-95CE-6DB70DBA9567}" type="datetimeFigureOut">
               <a:rPr lang="en-US" dirty="0"/>
               <a:pPr/>
-              <a:t>11/20/19</a:t>
+              <a:t>11/21/2019</a:t>
             </a:fld>
             <a:endParaRPr lang="en-US" dirty="0"/>
           </a:p>
@@ -3832,7 +4027,7 @@
             <a:fld id="{B61BEF0D-F0BB-DE4B-95CE-6DB70DBA9567}" type="datetimeFigureOut">
               <a:rPr lang="en-US" dirty="0"/>
               <a:pPr/>
-              <a:t>11/20/19</a:t>
+              <a:t>11/21/2019</a:t>
             </a:fld>
             <a:endParaRPr lang="en-US" dirty="0"/>
           </a:p>
@@ -4091,7 +4286,7 @@
             <a:fld id="{B61BEF0D-F0BB-DE4B-95CE-6DB70DBA9567}" type="datetimeFigureOut">
               <a:rPr lang="en-US" dirty="0"/>
               <a:pPr/>
-              <a:t>11/20/19</a:t>
+              <a:t>11/21/2019</a:t>
             </a:fld>
             <a:endParaRPr lang="en-US" dirty="0"/>
           </a:p>
@@ -4417,7 +4612,7 @@
             <a:fld id="{B61BEF0D-F0BB-DE4B-95CE-6DB70DBA9567}" type="datetimeFigureOut">
               <a:rPr lang="en-US" dirty="0"/>
               <a:pPr/>
-              <a:t>11/20/19</a:t>
+              <a:t>11/21/2019</a:t>
             </a:fld>
             <a:endParaRPr lang="en-US" dirty="0"/>
           </a:p>
@@ -4737,7 +4932,7 @@
             <a:fld id="{B61BEF0D-F0BB-DE4B-95CE-6DB70DBA9567}" type="datetimeFigureOut">
               <a:rPr lang="en-US" dirty="0"/>
               <a:pPr/>
-              <a:t>11/20/19</a:t>
+              <a:t>11/21/2019</a:t>
             </a:fld>
             <a:endParaRPr lang="en-US" dirty="0"/>
           </a:p>
@@ -5191,7 +5386,7 @@
             <a:fld id="{B61BEF0D-F0BB-DE4B-95CE-6DB70DBA9567}" type="datetimeFigureOut">
               <a:rPr lang="en-US" dirty="0"/>
               <a:pPr/>
-              <a:t>11/20/19</a:t>
+              <a:t>11/21/2019</a:t>
             </a:fld>
             <a:endParaRPr lang="en-US" dirty="0"/>
           </a:p>
@@ -5393,7 +5588,7 @@
             <a:fld id="{B61BEF0D-F0BB-DE4B-95CE-6DB70DBA9567}" type="datetimeFigureOut">
               <a:rPr lang="en-US" dirty="0"/>
               <a:pPr/>
-              <a:t>11/20/19</a:t>
+              <a:t>11/21/2019</a:t>
             </a:fld>
             <a:endParaRPr lang="en-US" dirty="0"/>
           </a:p>
@@ -5567,7 +5762,7 @@
             <a:fld id="{B61BEF0D-F0BB-DE4B-95CE-6DB70DBA9567}" type="datetimeFigureOut">
               <a:rPr lang="en-US" dirty="0"/>
               <a:pPr/>
-              <a:t>11/20/19</a:t>
+              <a:t>11/21/2019</a:t>
             </a:fld>
             <a:endParaRPr lang="en-US" dirty="0"/>
           </a:p>
@@ -5897,7 +6092,7 @@
             <a:fld id="{B61BEF0D-F0BB-DE4B-95CE-6DB70DBA9567}" type="datetimeFigureOut">
               <a:rPr lang="en-US" dirty="0"/>
               <a:pPr/>
-              <a:t>11/20/19</a:t>
+              <a:t>11/21/2019</a:t>
             </a:fld>
             <a:endParaRPr lang="en-US" dirty="0"/>
           </a:p>
@@ -6239,7 +6434,7 @@
             <a:fld id="{B61BEF0D-F0BB-DE4B-95CE-6DB70DBA9567}" type="datetimeFigureOut">
               <a:rPr lang="en-US" dirty="0"/>
               <a:pPr/>
-              <a:t>11/20/19</a:t>
+              <a:t>11/21/2019</a:t>
             </a:fld>
             <a:endParaRPr lang="en-US" dirty="0"/>
           </a:p>
@@ -8353,7 +8548,7 @@
             <a:fld id="{B61BEF0D-F0BB-DE4B-95CE-6DB70DBA9567}" type="datetimeFigureOut">
               <a:rPr lang="en-US" dirty="0"/>
               <a:pPr/>
-              <a:t>11/20/19</a:t>
+              <a:t>11/21/2019</a:t>
             </a:fld>
             <a:endParaRPr lang="en-US" dirty="0"/>
           </a:p>
@@ -9044,25 +9239,7 @@
                 </a:solidFill>
                 <a:latin typeface="LMRoman12-Regular"/>
               </a:rPr>
-              <a:t>Mann-</a:t>
-            </a:r>
-            <a:r>
-              <a:rPr lang="en-US" dirty="0" err="1">
-                <a:solidFill>
-                  <a:srgbClr val="000000"/>
-                </a:solidFill>
-                <a:latin typeface="LMRoman12-Regular"/>
-              </a:rPr>
-              <a:t>Kandall</a:t>
-            </a:r>
-            <a:r>
-              <a:rPr lang="en-US" dirty="0">
-                <a:solidFill>
-                  <a:srgbClr val="000000"/>
-                </a:solidFill>
-                <a:latin typeface="LMRoman12-Regular"/>
-              </a:rPr>
-              <a:t> Trend Test</a:t>
+              <a:t>Mann-Kendall Trend Test</a:t>
             </a:r>
             <a:br>
               <a:rPr lang="en-US" dirty="0"/>
@@ -9566,7 +9743,49 @@
           <a:bodyPr/>
           <a:lstStyle/>
           <a:p>
-            <a:endParaRPr lang="en-US" dirty="0"/>
+            <a:r>
+              <a:rPr lang="en-US" dirty="0"/>
+              <a:t>There are few consistent trends across all of our sites</a:t>
+            </a:r>
+          </a:p>
+          <a:p>
+            <a:pPr lvl="1"/>
+            <a:r>
+              <a:rPr lang="en-US" dirty="0"/>
+              <a:t>It depends on location of sites and size of river</a:t>
+            </a:r>
+          </a:p>
+          <a:p>
+            <a:pPr lvl="1"/>
+            <a:r>
+              <a:rPr lang="en-US" dirty="0"/>
+              <a:t>Hard to compare the Missouri River to its smaller tributaries</a:t>
+            </a:r>
+          </a:p>
+          <a:p>
+            <a:r>
+              <a:rPr lang="en-US" dirty="0"/>
+              <a:t>Mainstem of the Missouri River has increasing Nitrogen, Phosphorus, and Discharge over time</a:t>
+            </a:r>
+          </a:p>
+          <a:p>
+            <a:pPr lvl="1"/>
+            <a:r>
+              <a:rPr lang="en-US" dirty="0"/>
+              <a:t>Tributaries have different characteristics</a:t>
+            </a:r>
+          </a:p>
+          <a:p>
+            <a:r>
+              <a:rPr lang="en-US" dirty="0"/>
+              <a:t>Nitrogen is increasing in the basin over time</a:t>
+            </a:r>
+          </a:p>
+          <a:p>
+            <a:r>
+              <a:rPr lang="en-US" dirty="0"/>
+              <a:t>As population increases, total nitrogen loading into the rivers decrease (because of decreased agricultural land)</a:t>
+            </a:r>
           </a:p>
         </p:txBody>
       </p:sp>
@@ -9618,7 +9837,7 @@
         </p:nvSpPr>
         <p:spPr>
           <a:xfrm>
-            <a:off x="649224" y="645106"/>
+            <a:off x="1945461" y="589077"/>
             <a:ext cx="3650279" cy="1259894"/>
           </a:xfrm>
         </p:spPr>
@@ -10149,7 +10368,7 @@
         </p:nvSpPr>
         <p:spPr>
           <a:xfrm>
-            <a:off x="649224" y="645106"/>
+            <a:off x="630371" y="290500"/>
             <a:ext cx="3650279" cy="1259894"/>
           </a:xfrm>
         </p:spPr>
@@ -10238,13 +10457,13 @@
         </p:nvSpPr>
         <p:spPr>
           <a:xfrm>
-            <a:off x="649225" y="2133600"/>
-            <a:ext cx="3650278" cy="3759253"/>
+            <a:off x="446456" y="1032960"/>
+            <a:ext cx="4479646" cy="5259168"/>
           </a:xfrm>
         </p:spPr>
         <p:txBody>
           <a:bodyPr>
-            <a:normAutofit/>
+            <a:normAutofit lnSpcReduction="10000"/>
           </a:bodyPr>
           <a:lstStyle/>
           <a:p>
@@ -10263,14 +10482,44 @@
           <a:p>
             <a:r>
               <a:rPr lang="en-US" dirty="0"/>
-              <a:t>Nitrogen, Phosphorus, Discharge, Time</a:t>
-            </a:r>
-          </a:p>
-          <a:p>
-            <a:pPr marL="0" indent="0">
-              <a:buNone/>
+              <a:t>Nitrogen, Phosphorus, Discharge, Population, Time</a:t>
+            </a:r>
+          </a:p>
+          <a:p>
+            <a:r>
+              <a:rPr lang="en-US" dirty="0"/>
+              <a:t>Steps:</a:t>
+            </a:r>
+          </a:p>
+          <a:p>
+            <a:pPr marL="800100" lvl="1" indent="-342900">
+              <a:buAutoNum type="arabicParenR"/>
             </a:pPr>
-            <a:endParaRPr lang="en-US" dirty="0"/>
+            <a:r>
+              <a:rPr lang="en-US" dirty="0"/>
+              <a:t>Filter sites in HUC 1020 - 1030 to only show us sites that contained discharge, nitrogen, and phosphorus data. </a:t>
+            </a:r>
+          </a:p>
+          <a:p>
+            <a:pPr marL="800100" lvl="1" indent="-342900">
+              <a:buAutoNum type="arabicParenR"/>
+            </a:pPr>
+            <a:r>
+              <a:rPr lang="en-US" dirty="0"/>
+              <a:t>Choose 2 sites from each HUC sub basin for a total of 22 </a:t>
+            </a:r>
+          </a:p>
+          <a:p>
+            <a:r>
+              <a:rPr lang="en-US" dirty="0"/>
+              <a:t>By comparing the periods of records for each chosen variables and finding the sites with the longest periods of records. </a:t>
+            </a:r>
+          </a:p>
+          <a:p>
+            <a:r>
+              <a:rPr lang="en-US" dirty="0"/>
+              <a:t>Two sites per HUC region: maintain a digestible scope.</a:t>
+            </a:r>
           </a:p>
           <a:p>
             <a:endParaRPr lang="en-US" dirty="0"/>
@@ -10299,7 +10548,7 @@
         </p:blipFill>
         <p:spPr>
           <a:xfrm>
-            <a:off x="4619543" y="1215162"/>
+            <a:off x="4926102" y="1447059"/>
             <a:ext cx="6953577" cy="4102609"/>
           </a:xfrm>
           <a:prstGeom prst="rect">
@@ -10639,48 +10888,6 @@
             </a:r>
             <a:endParaRPr lang="en-US" altLang="zh-CN" dirty="0"/>
           </a:p>
-          <a:p>
-            <a:r>
-              <a:rPr lang="en-US" dirty="0"/>
-              <a:t>Steps:</a:t>
-            </a:r>
-          </a:p>
-          <a:p>
-            <a:pPr marL="800100" lvl="1" indent="-342900">
-              <a:buAutoNum type="arabicParenR"/>
-            </a:pPr>
-            <a:r>
-              <a:rPr lang="en-US" dirty="0"/>
-              <a:t>Filter sites in HUC 1020 - 1030 to only show us sites that contained discharge, nitrogen, and phosphorus data. </a:t>
-            </a:r>
-          </a:p>
-          <a:p>
-            <a:pPr marL="800100" lvl="1" indent="-342900">
-              <a:buAutoNum type="arabicParenR"/>
-            </a:pPr>
-            <a:r>
-              <a:rPr lang="en-US" dirty="0"/>
-              <a:t>Choose 2 sites from each HUC sub basin for a total of 22 </a:t>
-            </a:r>
-          </a:p>
-          <a:p>
-            <a:pPr marL="457200" lvl="1" indent="0">
-              <a:buNone/>
-            </a:pPr>
-            <a:r>
-              <a:rPr lang="en-US" dirty="0"/>
-              <a:t>	By comparing the periods of records for each chosen variables and finding the sites with the longest periods of records. </a:t>
-            </a:r>
-          </a:p>
-          <a:p>
-            <a:pPr marL="457200" lvl="1" indent="0">
-              <a:buNone/>
-            </a:pPr>
-            <a:r>
-              <a:rPr lang="en-US" dirty="0"/>
-              <a:t>	Two sites per HUC region: maintain a digestible scope.</a:t>
-            </a:r>
-          </a:p>
         </p:txBody>
       </p:sp>
       <p:pic>
@@ -15506,7 +15713,7 @@
         </p:blipFill>
         <p:spPr>
           <a:xfrm>
-            <a:off x="2783124" y="921615"/>
+            <a:off x="7472601" y="778495"/>
             <a:ext cx="4031436" cy="3126870"/>
           </a:xfrm>
           <a:prstGeom prst="rect">
@@ -15536,7 +15743,7 @@
         </p:blipFill>
         <p:spPr>
           <a:xfrm>
-            <a:off x="6692448" y="813917"/>
+            <a:off x="2624824" y="778495"/>
             <a:ext cx="4812164" cy="3185074"/>
           </a:xfrm>
           <a:prstGeom prst="rect">
@@ -15657,7 +15864,7 @@
         </p:nvSpPr>
         <p:spPr>
           <a:xfrm>
-            <a:off x="4185857" y="3880470"/>
+            <a:off x="9206628" y="3906292"/>
             <a:ext cx="916010" cy="246221"/>
           </a:xfrm>
           <a:prstGeom prst="rect">

</xml_diff>

<commit_message>
Add a discharge prediction figure
</commit_message>
<xml_diff>
--- a/TeamDocs/Examining the Hydrologic Properties of the Missouri River.pptx
+++ b/TeamDocs/Examining the Hydrologic Properties of the Missouri River.pptx
@@ -9798,6 +9798,117 @@
           </a:p>
         </p:txBody>
       </p:sp>
+      <p:grpSp>
+        <p:nvGrpSpPr>
+          <p:cNvPr id="21" name="Group 20">
+            <a:extLst>
+              <a:ext uri="{FF2B5EF4-FFF2-40B4-BE49-F238E27FC236}">
+                <a16:creationId xmlns:a16="http://schemas.microsoft.com/office/drawing/2014/main" id="{3A1D20F8-D85F-488D-A1F0-29AAD5EE4468}"/>
+              </a:ext>
+            </a:extLst>
+          </p:cNvPr>
+          <p:cNvGrpSpPr/>
+          <p:nvPr/>
+        </p:nvGrpSpPr>
+        <p:grpSpPr>
+          <a:xfrm>
+            <a:off x="53209" y="2664286"/>
+            <a:ext cx="5312399" cy="2917661"/>
+            <a:chOff x="53209" y="2784561"/>
+            <a:chExt cx="5312399" cy="2917661"/>
+          </a:xfrm>
+        </p:grpSpPr>
+        <p:pic>
+          <p:nvPicPr>
+            <p:cNvPr id="8" name="Picture 7">
+              <a:extLst>
+                <a:ext uri="{FF2B5EF4-FFF2-40B4-BE49-F238E27FC236}">
+                  <a16:creationId xmlns:a16="http://schemas.microsoft.com/office/drawing/2014/main" id="{776D6771-D9B4-4EA6-8AF6-88D23F220E61}"/>
+                </a:ext>
+              </a:extLst>
+            </p:cNvPr>
+            <p:cNvPicPr>
+              <a:picLocks noChangeAspect="1"/>
+            </p:cNvPicPr>
+            <p:nvPr/>
+          </p:nvPicPr>
+          <p:blipFill>
+            <a:blip r:embed="rId8"/>
+            <a:stretch>
+              <a:fillRect/>
+            </a:stretch>
+          </p:blipFill>
+          <p:spPr>
+            <a:xfrm>
+              <a:off x="210394" y="2864489"/>
+              <a:ext cx="5155214" cy="2837733"/>
+            </a:xfrm>
+            <a:prstGeom prst="rect">
+              <a:avLst/>
+            </a:prstGeom>
+          </p:spPr>
+        </p:pic>
+        <p:pic>
+          <p:nvPicPr>
+            <p:cNvPr id="10" name="Picture 9">
+              <a:extLst>
+                <a:ext uri="{FF2B5EF4-FFF2-40B4-BE49-F238E27FC236}">
+                  <a16:creationId xmlns:a16="http://schemas.microsoft.com/office/drawing/2014/main" id="{3D5676EE-052E-4CE3-BAED-5F288C6D41C1}"/>
+                </a:ext>
+              </a:extLst>
+            </p:cNvPr>
+            <p:cNvPicPr>
+              <a:picLocks noChangeAspect="1"/>
+            </p:cNvPicPr>
+            <p:nvPr/>
+          </p:nvPicPr>
+          <p:blipFill>
+            <a:blip r:embed="rId9"/>
+            <a:stretch>
+              <a:fillRect/>
+            </a:stretch>
+          </p:blipFill>
+          <p:spPr>
+            <a:xfrm>
+              <a:off x="53209" y="2859496"/>
+              <a:ext cx="314369" cy="1467055"/>
+            </a:xfrm>
+            <a:prstGeom prst="rect">
+              <a:avLst/>
+            </a:prstGeom>
+          </p:spPr>
+        </p:pic>
+        <p:pic>
+          <p:nvPicPr>
+            <p:cNvPr id="19" name="Picture 18">
+              <a:extLst>
+                <a:ext uri="{FF2B5EF4-FFF2-40B4-BE49-F238E27FC236}">
+                  <a16:creationId xmlns:a16="http://schemas.microsoft.com/office/drawing/2014/main" id="{3C86DC78-2222-4956-B1DF-A3568BD676E5}"/>
+                </a:ext>
+              </a:extLst>
+            </p:cNvPr>
+            <p:cNvPicPr>
+              <a:picLocks noChangeAspect="1"/>
+            </p:cNvPicPr>
+            <p:nvPr/>
+          </p:nvPicPr>
+          <p:blipFill>
+            <a:blip r:embed="rId10"/>
+            <a:stretch>
+              <a:fillRect/>
+            </a:stretch>
+          </p:blipFill>
+          <p:spPr>
+            <a:xfrm>
+              <a:off x="503567" y="2784561"/>
+              <a:ext cx="2791215" cy="285790"/>
+            </a:xfrm>
+            <a:prstGeom prst="rect">
+              <a:avLst/>
+            </a:prstGeom>
+          </p:spPr>
+        </p:pic>
+      </p:grpSp>
     </p:spTree>
     <p:extLst>
       <p:ext uri="{BB962C8B-B14F-4D97-AF65-F5344CB8AC3E}">
@@ -10095,6 +10206,132 @@
                       </p:childTnLst>
                     </p:cTn>
                   </p:par>
+                  <p:par>
+                    <p:cTn id="27" fill="hold">
+                      <p:stCondLst>
+                        <p:cond delay="indefinite"/>
+                      </p:stCondLst>
+                      <p:childTnLst>
+                        <p:par>
+                          <p:cTn id="28" fill="hold">
+                            <p:stCondLst>
+                              <p:cond delay="0"/>
+                            </p:stCondLst>
+                            <p:childTnLst>
+                              <p:par>
+                                <p:cTn id="29" presetID="1" presetClass="exit" presetSubtype="0" fill="hold" grpId="1" nodeType="clickEffect">
+                                  <p:stCondLst>
+                                    <p:cond delay="0"/>
+                                  </p:stCondLst>
+                                  <p:childTnLst>
+                                    <p:set>
+                                      <p:cBhvr>
+                                        <p:cTn id="30" dur="1" fill="hold">
+                                          <p:stCondLst>
+                                            <p:cond delay="0"/>
+                                          </p:stCondLst>
+                                        </p:cTn>
+                                        <p:tgtEl>
+                                          <p:spTgt spid="5"/>
+                                        </p:tgtEl>
+                                        <p:attrNameLst>
+                                          <p:attrName>style.visibility</p:attrName>
+                                        </p:attrNameLst>
+                                      </p:cBhvr>
+                                      <p:to>
+                                        <p:strVal val="hidden"/>
+                                      </p:to>
+                                    </p:set>
+                                  </p:childTnLst>
+                                </p:cTn>
+                              </p:par>
+                              <p:par>
+                                <p:cTn id="31" presetID="1" presetClass="exit" presetSubtype="0" fill="hold" nodeType="withEffect">
+                                  <p:stCondLst>
+                                    <p:cond delay="0"/>
+                                  </p:stCondLst>
+                                  <p:childTnLst>
+                                    <p:set>
+                                      <p:cBhvr>
+                                        <p:cTn id="32" dur="1" fill="hold">
+                                          <p:stCondLst>
+                                            <p:cond delay="0"/>
+                                          </p:stCondLst>
+                                        </p:cTn>
+                                        <p:tgtEl>
+                                          <p:spTgt spid="16"/>
+                                        </p:tgtEl>
+                                        <p:attrNameLst>
+                                          <p:attrName>style.visibility</p:attrName>
+                                        </p:attrNameLst>
+                                      </p:cBhvr>
+                                      <p:to>
+                                        <p:strVal val="hidden"/>
+                                      </p:to>
+                                    </p:set>
+                                  </p:childTnLst>
+                                </p:cTn>
+                              </p:par>
+                              <p:par>
+                                <p:cTn id="33" presetID="1" presetClass="exit" presetSubtype="0" fill="hold" nodeType="withEffect">
+                                  <p:stCondLst>
+                                    <p:cond delay="0"/>
+                                  </p:stCondLst>
+                                  <p:childTnLst>
+                                    <p:set>
+                                      <p:cBhvr>
+                                        <p:cTn id="34" dur="1" fill="hold">
+                                          <p:stCondLst>
+                                            <p:cond delay="0"/>
+                                          </p:stCondLst>
+                                        </p:cTn>
+                                        <p:tgtEl>
+                                          <p:spTgt spid="18"/>
+                                        </p:tgtEl>
+                                        <p:attrNameLst>
+                                          <p:attrName>style.visibility</p:attrName>
+                                        </p:attrNameLst>
+                                      </p:cBhvr>
+                                      <p:to>
+                                        <p:strVal val="hidden"/>
+                                      </p:to>
+                                    </p:set>
+                                  </p:childTnLst>
+                                </p:cTn>
+                              </p:par>
+                              <p:par>
+                                <p:cTn id="35" presetID="1" presetClass="entr" presetSubtype="0" fill="hold" nodeType="withEffect">
+                                  <p:stCondLst>
+                                    <p:cond delay="0"/>
+                                  </p:stCondLst>
+                                  <p:childTnLst>
+                                    <p:set>
+                                      <p:cBhvr>
+                                        <p:cTn id="36" dur="1" fill="hold">
+                                          <p:stCondLst>
+                                            <p:cond delay="0"/>
+                                          </p:stCondLst>
+                                        </p:cTn>
+                                        <p:tgtEl>
+                                          <p:spTgt spid="21"/>
+                                        </p:tgtEl>
+                                        <p:attrNameLst>
+                                          <p:attrName>style.visibility</p:attrName>
+                                        </p:attrNameLst>
+                                      </p:cBhvr>
+                                      <p:to>
+                                        <p:strVal val="visible"/>
+                                      </p:to>
+                                    </p:set>
+                                  </p:childTnLst>
+                                </p:cTn>
+                              </p:par>
+                            </p:childTnLst>
+                          </p:cTn>
+                        </p:par>
+                      </p:childTnLst>
+                    </p:cTn>
+                  </p:par>
                 </p:childTnLst>
               </p:cTn>
               <p:prevCondLst>
@@ -10121,6 +10358,7 @@
       <p:bldP spid="7" grpId="0" animBg="1"/>
       <p:bldP spid="7" grpId="1" animBg="1"/>
       <p:bldP spid="5" grpId="0" animBg="1"/>
+      <p:bldP spid="5" grpId="1" animBg="1"/>
     </p:bldLst>
   </p:timing>
 </p:sld>

</xml_diff>

<commit_message>
Add some notes to PPT
</commit_message>
<xml_diff>
--- a/TeamDocs/Examining the Hydrologic Properties of the Missouri River.pptx
+++ b/TeamDocs/Examining the Hydrologic Properties of the Missouri River.pptx
@@ -1188,9 +1188,153 @@
           <a:lstStyle/>
           <a:p>
             <a:r>
-              <a:rPr lang="en-US" dirty="0" err="1"/>
-              <a:t>keqi</a:t>
-            </a:r>
+              <a:rPr lang="en-US" dirty="0"/>
+              <a:t>Keqi</a:t>
+            </a:r>
+          </a:p>
+          <a:p>
+            <a:endParaRPr lang="en-US" dirty="0"/>
+          </a:p>
+          <a:p>
+            <a:r>
+              <a:rPr lang="en-US" dirty="0"/>
+              <a:t>Discharge, nitrogen, and phosphorus were plotted for each site and examined together in order to see if there were any obvious patterns or trends.</a:t>
+            </a:r>
+            <a:r>
+              <a:rPr lang="zh-CN" altLang="en-US" dirty="0"/>
+              <a:t> </a:t>
+            </a:r>
+            <a:r>
+              <a:rPr lang="en-US" altLang="zh-CN" dirty="0"/>
+              <a:t>Here</a:t>
+            </a:r>
+            <a:r>
+              <a:rPr lang="zh-CN" altLang="en-US" dirty="0"/>
+              <a:t> </a:t>
+            </a:r>
+            <a:r>
+              <a:rPr lang="en-US" altLang="zh-CN" dirty="0"/>
+              <a:t>shows</a:t>
+            </a:r>
+            <a:r>
+              <a:rPr lang="zh-CN" altLang="en-US" dirty="0"/>
+              <a:t> </a:t>
+            </a:r>
+            <a:r>
+              <a:rPr lang="en-US" altLang="zh-CN" dirty="0"/>
+              <a:t>an</a:t>
+            </a:r>
+            <a:r>
+              <a:rPr lang="zh-CN" altLang="en-US" dirty="0"/>
+              <a:t> </a:t>
+            </a:r>
+            <a:r>
+              <a:rPr lang="en-US" altLang="zh-CN" dirty="0"/>
+              <a:t>example</a:t>
+            </a:r>
+            <a:r>
+              <a:rPr lang="zh-CN" altLang="en-US" dirty="0"/>
+              <a:t> </a:t>
+            </a:r>
+            <a:r>
+              <a:rPr lang="en-US" altLang="zh-CN" dirty="0"/>
+              <a:t>from</a:t>
+            </a:r>
+            <a:r>
+              <a:rPr lang="zh-CN" altLang="en-US" dirty="0"/>
+              <a:t> </a:t>
+            </a:r>
+            <a:r>
+              <a:rPr lang="en-US" altLang="zh-CN" dirty="0"/>
+              <a:t>the</a:t>
+            </a:r>
+            <a:r>
+              <a:rPr lang="zh-CN" altLang="en-US" dirty="0"/>
+              <a:t> </a:t>
+            </a:r>
+            <a:r>
+              <a:rPr lang="en-US" altLang="zh-CN" dirty="0"/>
+              <a:t>most</a:t>
+            </a:r>
+            <a:r>
+              <a:rPr lang="zh-CN" altLang="en-US" dirty="0"/>
+              <a:t> </a:t>
+            </a:r>
+            <a:r>
+              <a:rPr lang="en-US" altLang="zh-CN" dirty="0"/>
+              <a:t>downstream</a:t>
+            </a:r>
+            <a:r>
+              <a:rPr lang="zh-CN" altLang="en-US" dirty="0"/>
+              <a:t> </a:t>
+            </a:r>
+            <a:r>
+              <a:rPr lang="en-US" altLang="zh-CN" dirty="0"/>
+              <a:t>site – No. 22 Missouri River at Hermann, MO. As you can see, this site has quite good data records, with continuous discharge data from “1928-10-01” to present, nitrogen data from “July, 1973” to “August, 2019”, phosphorus data from “July, 1969” to “August, 2019”.</a:t>
+            </a:r>
+          </a:p>
+          <a:p>
+            <a:endParaRPr lang="en-US" sz="1200" b="0" i="0" kern="1200" dirty="0">
+              <a:solidFill>
+                <a:schemeClr val="tx1"/>
+              </a:solidFill>
+              <a:effectLst/>
+              <a:latin typeface="+mn-lt"/>
+              <a:ea typeface="+mn-ea"/>
+              <a:cs typeface="+mn-cs"/>
+            </a:endParaRPr>
+          </a:p>
+          <a:p>
+            <a:r>
+              <a:rPr lang="en-US" sz="1200" b="0" i="0" kern="1200" dirty="0">
+                <a:solidFill>
+                  <a:schemeClr val="tx1"/>
+                </a:solidFill>
+                <a:effectLst/>
+                <a:latin typeface="+mn-lt"/>
+                <a:ea typeface="+mn-ea"/>
+                <a:cs typeface="+mn-cs"/>
+              </a:rPr>
+              <a:t>We did the yearly discharge patterns analysis for each HUC4 watershed.</a:t>
+            </a:r>
+            <a:r>
+              <a:rPr lang="en-US" dirty="0"/>
+              <a:t> Here shows </a:t>
+            </a:r>
+            <a:r>
+              <a:rPr lang="en-US" sz="1200" b="0" i="0" kern="1200" dirty="0">
+                <a:solidFill>
+                  <a:schemeClr val="tx1"/>
+                </a:solidFill>
+                <a:effectLst/>
+                <a:latin typeface="+mn-lt"/>
+                <a:ea typeface="+mn-ea"/>
+                <a:cs typeface="+mn-cs"/>
+              </a:rPr>
+              <a:t>typical discharge pattern within a year for HUC 1030 watershed. It is the most downstream sub basin. Site No. 22 is on the main stem of the Missouri River. </a:t>
+            </a:r>
+            <a:br>
+              <a:rPr lang="en-US" dirty="0"/>
+            </a:br>
+            <a:r>
+              <a:rPr lang="en-US" sz="1200" b="0" i="0" kern="1200" dirty="0">
+                <a:solidFill>
+                  <a:schemeClr val="tx1"/>
+                </a:solidFill>
+                <a:effectLst/>
+                <a:latin typeface="+mn-lt"/>
+                <a:ea typeface="+mn-ea"/>
+                <a:cs typeface="+mn-cs"/>
+              </a:rPr>
+              <a:t>As we can see from this figure, discharge reaches its peak during the summer and falls to minima during the winter, and it exhibits rather high variations across years, as indicated by the large difference between the medians and the first or the third quartiles. Furthermore, highest variations in discharge appear to occur in the summer, whereas discharge in the winter varies less among years. The large variability within a year and the seasonal pattern is only obvious in larger streams and rivers (No. 22)  but not in small creeks</a:t>
+            </a:r>
+            <a:r>
+              <a:rPr lang="en-US" dirty="0"/>
+              <a:t> (No. 21).</a:t>
+            </a:r>
+            <a:br>
+              <a:rPr lang="en-US" dirty="0"/>
+            </a:br>
             <a:endParaRPr lang="en-US" dirty="0"/>
           </a:p>
         </p:txBody>
@@ -15148,7 +15292,7 @@
           <a:lstStyle/>
           <a:p>
             <a:r>
-              <a:rPr lang="en-US" sz="5400"/>
+              <a:rPr lang="en-US" sz="5400" dirty="0"/>
               <a:t>Exploratory Analysis</a:t>
             </a:r>
           </a:p>
@@ -16400,38 +16544,8 @@
         </p:blipFill>
         <p:spPr>
           <a:xfrm>
-            <a:off x="7472601" y="778495"/>
+            <a:off x="7472602" y="765450"/>
             <a:ext cx="4031436" cy="3126870"/>
-          </a:xfrm>
-          <a:prstGeom prst="rect">
-            <a:avLst/>
-          </a:prstGeom>
-        </p:spPr>
-      </p:pic>
-      <p:pic>
-        <p:nvPicPr>
-          <p:cNvPr id="6" name="Content Placeholder 5" descr="A screenshot of a cell phone&#10;&#10;Description automatically generated">
-            <a:extLst>
-              <a:ext uri="{FF2B5EF4-FFF2-40B4-BE49-F238E27FC236}">
-                <a16:creationId xmlns:a16="http://schemas.microsoft.com/office/drawing/2014/main" id="{261903E1-1520-4358-AFB7-BC48F97AEC62}"/>
-              </a:ext>
-            </a:extLst>
-          </p:cNvPr>
-          <p:cNvPicPr>
-            <a:picLocks noChangeAspect="1"/>
-          </p:cNvPicPr>
-          <p:nvPr/>
-        </p:nvPicPr>
-        <p:blipFill>
-          <a:blip r:embed="rId4"/>
-          <a:stretch>
-            <a:fillRect/>
-          </a:stretch>
-        </p:blipFill>
-        <p:spPr>
-          <a:xfrm>
-            <a:off x="2624824" y="778495"/>
-            <a:ext cx="4812164" cy="3185074"/>
           </a:xfrm>
           <a:prstGeom prst="rect">
             <a:avLst/>
@@ -16571,6 +16685,186 @@
                 <a:cs typeface="Arial" panose="020B0604020202020204" pitchFamily="34" charset="0"/>
               </a:rPr>
               <a:t>Day of year</a:t>
+            </a:r>
+          </a:p>
+        </p:txBody>
+      </p:sp>
+      <p:pic>
+        <p:nvPicPr>
+          <p:cNvPr id="4" name="Picture 3">
+            <a:extLst>
+              <a:ext uri="{FF2B5EF4-FFF2-40B4-BE49-F238E27FC236}">
+                <a16:creationId xmlns:a16="http://schemas.microsoft.com/office/drawing/2014/main" id="{970BE412-F1DA-4B3E-8E22-AC846851309C}"/>
+              </a:ext>
+            </a:extLst>
+          </p:cNvPr>
+          <p:cNvPicPr>
+            <a:picLocks noChangeAspect="1"/>
+          </p:cNvPicPr>
+          <p:nvPr/>
+        </p:nvPicPr>
+        <p:blipFill>
+          <a:blip r:embed="rId4"/>
+          <a:stretch>
+            <a:fillRect/>
+          </a:stretch>
+        </p:blipFill>
+        <p:spPr>
+          <a:xfrm>
+            <a:off x="2666588" y="806384"/>
+            <a:ext cx="4806014" cy="3236247"/>
+          </a:xfrm>
+          <a:prstGeom prst="rect">
+            <a:avLst/>
+          </a:prstGeom>
+        </p:spPr>
+      </p:pic>
+      <p:cxnSp>
+        <p:nvCxnSpPr>
+          <p:cNvPr id="7" name="Straight Connector 6">
+            <a:extLst>
+              <a:ext uri="{FF2B5EF4-FFF2-40B4-BE49-F238E27FC236}">
+                <a16:creationId xmlns:a16="http://schemas.microsoft.com/office/drawing/2014/main" id="{AA1017AC-AF9E-4813-857A-762B034134D0}"/>
+              </a:ext>
+            </a:extLst>
+          </p:cNvPr>
+          <p:cNvCxnSpPr/>
+          <p:nvPr/>
+        </p:nvCxnSpPr>
+        <p:spPr>
+          <a:xfrm flipV="1">
+            <a:off x="10409093" y="1447988"/>
+            <a:ext cx="342900" cy="613064"/>
+          </a:xfrm>
+          <a:prstGeom prst="line">
+            <a:avLst/>
+          </a:prstGeom>
+        </p:spPr>
+        <p:style>
+          <a:lnRef idx="1">
+            <a:schemeClr val="dk1"/>
+          </a:lnRef>
+          <a:fillRef idx="0">
+            <a:schemeClr val="dk1"/>
+          </a:fillRef>
+          <a:effectRef idx="0">
+            <a:schemeClr val="dk1"/>
+          </a:effectRef>
+          <a:fontRef idx="minor">
+            <a:schemeClr val="tx1"/>
+          </a:fontRef>
+        </p:style>
+      </p:cxnSp>
+      <p:cxnSp>
+        <p:nvCxnSpPr>
+          <p:cNvPr id="68" name="Straight Connector 67">
+            <a:extLst>
+              <a:ext uri="{FF2B5EF4-FFF2-40B4-BE49-F238E27FC236}">
+                <a16:creationId xmlns:a16="http://schemas.microsoft.com/office/drawing/2014/main" id="{A84B509B-C1D9-4350-8E89-21F06D8DA715}"/>
+              </a:ext>
+            </a:extLst>
+          </p:cNvPr>
+          <p:cNvCxnSpPr>
+            <a:cxnSpLocks/>
+          </p:cNvCxnSpPr>
+          <p:nvPr/>
+        </p:nvCxnSpPr>
+        <p:spPr>
+          <a:xfrm flipV="1">
+            <a:off x="10702636" y="3151094"/>
+            <a:ext cx="389659" cy="193558"/>
+          </a:xfrm>
+          <a:prstGeom prst="line">
+            <a:avLst/>
+          </a:prstGeom>
+        </p:spPr>
+        <p:style>
+          <a:lnRef idx="1">
+            <a:schemeClr val="dk1"/>
+          </a:lnRef>
+          <a:fillRef idx="0">
+            <a:schemeClr val="dk1"/>
+          </a:fillRef>
+          <a:effectRef idx="0">
+            <a:schemeClr val="dk1"/>
+          </a:effectRef>
+          <a:fontRef idx="minor">
+            <a:schemeClr val="tx1"/>
+          </a:fontRef>
+        </p:style>
+      </p:cxnSp>
+      <p:sp>
+        <p:nvSpPr>
+          <p:cNvPr id="9" name="TextBox 8">
+            <a:extLst>
+              <a:ext uri="{FF2B5EF4-FFF2-40B4-BE49-F238E27FC236}">
+                <a16:creationId xmlns:a16="http://schemas.microsoft.com/office/drawing/2014/main" id="{227DCE13-7F8A-4DE8-9B42-794898810847}"/>
+              </a:ext>
+            </a:extLst>
+          </p:cNvPr>
+          <p:cNvSpPr txBox="1"/>
+          <p:nvPr/>
+        </p:nvSpPr>
+        <p:spPr>
+          <a:xfrm>
+            <a:off x="10751993" y="1308723"/>
+            <a:ext cx="480580" cy="369332"/>
+          </a:xfrm>
+          <a:prstGeom prst="rect">
+            <a:avLst/>
+          </a:prstGeom>
+          <a:noFill/>
+        </p:spPr>
+        <p:txBody>
+          <a:bodyPr wrap="square" rtlCol="0">
+            <a:spAutoFit/>
+          </a:bodyPr>
+          <a:lstStyle/>
+          <a:p>
+            <a:r>
+              <a:rPr lang="en-US" dirty="0">
+                <a:latin typeface="Times New Roman" panose="02020603050405020304" pitchFamily="18" charset="0"/>
+                <a:cs typeface="Times New Roman" panose="02020603050405020304" pitchFamily="18" charset="0"/>
+              </a:rPr>
+              <a:t>22</a:t>
+            </a:r>
+          </a:p>
+        </p:txBody>
+      </p:sp>
+      <p:sp>
+        <p:nvSpPr>
+          <p:cNvPr id="71" name="TextBox 70">
+            <a:extLst>
+              <a:ext uri="{FF2B5EF4-FFF2-40B4-BE49-F238E27FC236}">
+                <a16:creationId xmlns:a16="http://schemas.microsoft.com/office/drawing/2014/main" id="{2581B744-AE1B-4EA9-B1C9-4F401C40AC6D}"/>
+              </a:ext>
+            </a:extLst>
+          </p:cNvPr>
+          <p:cNvSpPr txBox="1"/>
+          <p:nvPr/>
+        </p:nvSpPr>
+        <p:spPr>
+          <a:xfrm>
+            <a:off x="11023458" y="2816117"/>
+            <a:ext cx="480580" cy="369332"/>
+          </a:xfrm>
+          <a:prstGeom prst="rect">
+            <a:avLst/>
+          </a:prstGeom>
+          <a:noFill/>
+        </p:spPr>
+        <p:txBody>
+          <a:bodyPr wrap="square" rtlCol="0">
+            <a:spAutoFit/>
+          </a:bodyPr>
+          <a:lstStyle/>
+          <a:p>
+            <a:r>
+              <a:rPr lang="en-US" dirty="0">
+                <a:latin typeface="Times New Roman" panose="02020603050405020304" pitchFamily="18" charset="0"/>
+                <a:cs typeface="Times New Roman" panose="02020603050405020304" pitchFamily="18" charset="0"/>
+              </a:rPr>
+              <a:t>21</a:t>
             </a:r>
           </a:p>
         </p:txBody>

</xml_diff>

<commit_message>
final update to powerpoint
</commit_message>
<xml_diff>
--- a/TeamDocs/Examining the Hydrologic Properties of the Missouri River.pptx
+++ b/TeamDocs/Examining the Hydrologic Properties of the Missouri River.pptx
@@ -11,7 +11,7 @@
     <p:sldId id="256" r:id="rId2"/>
     <p:sldId id="269" r:id="rId3"/>
     <p:sldId id="258" r:id="rId4"/>
-    <p:sldId id="259" r:id="rId5"/>
+    <p:sldId id="271" r:id="rId5"/>
     <p:sldId id="267" r:id="rId6"/>
     <p:sldId id="261" r:id="rId7"/>
     <p:sldId id="270" r:id="rId8"/>
@@ -1103,6 +1103,29 @@
             </a:r>
           </a:p>
           <a:p>
+            <a:r>
+              <a:rPr lang="en-US" dirty="0"/>
+              <a:t>NWIS – read through column names</a:t>
+            </a:r>
+          </a:p>
+          <a:p>
+            <a:r>
+              <a:rPr lang="en-US" dirty="0"/>
+              <a:t>Together, these sites give us this metadata about our discharge, nitrogen, and phosphorus data</a:t>
+            </a:r>
+          </a:p>
+          <a:p>
+            <a:r>
+              <a:rPr lang="en-US" dirty="0"/>
+              <a:t>Notice that count is much lower for N and P</a:t>
+            </a:r>
+            <a:r>
+              <a:rPr lang="en-US"/>
+              <a:t>, unfortunately</a:t>
+            </a:r>
+            <a:endParaRPr lang="en-US" dirty="0"/>
+          </a:p>
+          <a:p>
             <a:endParaRPr lang="en-US" dirty="0"/>
           </a:p>
         </p:txBody>
@@ -1653,7 +1676,34 @@
           <a:p>
             <a:r>
               <a:rPr lang="en-US" dirty="0"/>
-              <a:t>Rachel</a:t>
+              <a:t>Rachel ~2 min</a:t>
+            </a:r>
+          </a:p>
+          <a:p>
+            <a:endParaRPr lang="en-US" dirty="0"/>
+          </a:p>
+          <a:p>
+            <a:r>
+              <a:rPr lang="en-US" dirty="0"/>
+              <a:t>We wanted to see if across all site data, would nitrogen variability be affected by our variables time, phosphorus, year, population, and discharge. We used a mixed effects model, where year and population, time, and discharge were treated as fixed effects, and HUC 4 area was treated as a random effect, so that we take that variance into account when modeling the IV on total nitrogen. </a:t>
+            </a:r>
+          </a:p>
+          <a:p>
+            <a:endParaRPr lang="en-US" dirty="0"/>
+          </a:p>
+          <a:p>
+            <a:r>
+              <a:rPr lang="en-US" dirty="0"/>
+              <a:t>Nitrogen was transformed in order to fit the assumptions of the mixed effect model that the DV has to be normally distributed. So, each coefficient was exponentiated in order to interpret the regression equation. I also divided Year by 10 and population by 1000 so that the massive range can be scaled down.</a:t>
+            </a:r>
+          </a:p>
+          <a:p>
+            <a:endParaRPr lang="en-US" dirty="0"/>
+          </a:p>
+          <a:p>
+            <a:r>
+              <a:rPr lang="en-US" dirty="0"/>
+              <a:t>The intercept is 0.28, which is the mean of total nitrogen when year is 0 and population is 0 and phosphorus is 0. When exponentiating the Year coefficient, we can conclude that every decade has a 1.01 multiplicative effect on nitrogen. When exponentiating the population coefficient, we can conclude that every 1000 people have a 0.99 multiplicative effect on nitrogen.</a:t>
             </a:r>
           </a:p>
         </p:txBody>
@@ -10668,7 +10718,7 @@
         </p:nvSpPr>
         <p:spPr>
           <a:xfrm>
-            <a:off x="1945461" y="589077"/>
+            <a:off x="1866439" y="668099"/>
             <a:ext cx="3650279" cy="1259894"/>
           </a:xfrm>
         </p:spPr>
@@ -10875,7 +10925,12 @@
             <p:ph type="title"/>
           </p:nvPr>
         </p:nvSpPr>
-        <p:spPr/>
+        <p:spPr>
+          <a:xfrm>
+            <a:off x="2164592" y="624110"/>
+            <a:ext cx="8911687" cy="1280890"/>
+          </a:xfrm>
+        </p:spPr>
         <p:txBody>
           <a:bodyPr/>
           <a:lstStyle/>
@@ -11081,32 +11136,6 @@
 <file path=ppt/slides/slide4.xml><?xml version="1.0" encoding="utf-8"?>
 <p:sld xmlns:a="http://schemas.openxmlformats.org/drawingml/2006/main" xmlns:r="http://schemas.openxmlformats.org/officeDocument/2006/relationships" xmlns:p="http://schemas.openxmlformats.org/presentationml/2006/main">
   <p:cSld>
-    <p:bg>
-      <p:bgPr>
-        <a:gradFill rotWithShape="1">
-          <a:gsLst>
-            <a:gs pos="0">
-              <a:schemeClr val="bg2">
-                <a:tint val="90000"/>
-                <a:satMod val="92000"/>
-                <a:lumMod val="120000"/>
-              </a:schemeClr>
-            </a:gs>
-            <a:gs pos="100000">
-              <a:schemeClr val="bg2">
-                <a:shade val="98000"/>
-                <a:satMod val="120000"/>
-                <a:lumMod val="98000"/>
-              </a:schemeClr>
-            </a:gs>
-          </a:gsLst>
-          <a:path path="circle">
-            <a:fillToRect l="50000" t="50000" r="100000" b="100000"/>
-          </a:path>
-        </a:gradFill>
-        <a:effectLst/>
-      </p:bgPr>
-    </p:bg>
     <p:spTree>
       <p:nvGrpSpPr>
         <p:cNvPr id="1" name=""/>
@@ -11121,155 +11150,6 @@
           <a:chExt cx="0" cy="0"/>
         </a:xfrm>
       </p:grpSpPr>
-      <p:sp useBgFill="1">
-        <p:nvSpPr>
-          <p:cNvPr id="7" name="Rectangle 11">
-            <a:extLst>
-              <a:ext uri="{FF2B5EF4-FFF2-40B4-BE49-F238E27FC236}">
-                <a16:creationId xmlns:a16="http://schemas.microsoft.com/office/drawing/2014/main" id="{FBFE3618-8387-4153-870E-99EA1B9784F5}"/>
-              </a:ext>
-              <a:ext uri="{C183D7F6-B498-43B3-948B-1728B52AA6E4}">
-                <adec:decorative xmlns:adec="http://schemas.microsoft.com/office/drawing/2017/decorative" val="1"/>
-              </a:ext>
-            </a:extLst>
-          </p:cNvPr>
-          <p:cNvSpPr>
-            <a:spLocks noGrp="1" noRot="1" noChangeAspect="1" noMove="1" noResize="1" noEditPoints="1" noAdjustHandles="1" noChangeArrowheads="1" noChangeShapeType="1" noTextEdit="1"/>
-          </p:cNvSpPr>
-          <p:nvPr>
-            <p:extLst>
-              <p:ext uri="{386F3935-93C4-4BCD-93E2-E3B085C9AB24}">
-                <p16:designElem xmlns:p16="http://schemas.microsoft.com/office/powerpoint/2015/main" val="1"/>
-              </p:ext>
-            </p:extLst>
-          </p:nvPr>
-        </p:nvSpPr>
-        <p:spPr>
-          <a:xfrm>
-            <a:off x="0" y="-786"/>
-            <a:ext cx="12192000" cy="6854038"/>
-          </a:xfrm>
-          <a:prstGeom prst="rect">
-            <a:avLst/>
-          </a:prstGeom>
-          <a:ln>
-            <a:noFill/>
-          </a:ln>
-        </p:spPr>
-        <p:style>
-          <a:lnRef idx="2">
-            <a:schemeClr val="accent1">
-              <a:shade val="50000"/>
-            </a:schemeClr>
-          </a:lnRef>
-          <a:fillRef idx="1">
-            <a:schemeClr val="accent1"/>
-          </a:fillRef>
-          <a:effectRef idx="0">
-            <a:schemeClr val="accent1"/>
-          </a:effectRef>
-          <a:fontRef idx="minor">
-            <a:schemeClr val="lt1"/>
-          </a:fontRef>
-        </p:style>
-        <p:txBody>
-          <a:bodyPr rtlCol="0" anchor="ctr"/>
-          <a:lstStyle/>
-          <a:p>
-            <a:pPr algn="ctr"/>
-            <a:endParaRPr lang="en-US"/>
-          </a:p>
-        </p:txBody>
-      </p:sp>
-      <p:sp>
-        <p:nvSpPr>
-          <p:cNvPr id="2" name="Title 1">
-            <a:extLst>
-              <a:ext uri="{FF2B5EF4-FFF2-40B4-BE49-F238E27FC236}">
-                <a16:creationId xmlns:a16="http://schemas.microsoft.com/office/drawing/2014/main" id="{60BC4ADD-07E0-4923-8EF5-E4A2ECFCA0BD}"/>
-              </a:ext>
-            </a:extLst>
-          </p:cNvPr>
-          <p:cNvSpPr>
-            <a:spLocks noGrp="1"/>
-          </p:cNvSpPr>
-          <p:nvPr>
-            <p:ph type="title"/>
-          </p:nvPr>
-        </p:nvSpPr>
-        <p:spPr>
-          <a:xfrm>
-            <a:off x="630371" y="290500"/>
-            <a:ext cx="3650279" cy="1259894"/>
-          </a:xfrm>
-        </p:spPr>
-        <p:txBody>
-          <a:bodyPr>
-            <a:normAutofit/>
-          </a:bodyPr>
-          <a:lstStyle/>
-          <a:p>
-            <a:r>
-              <a:rPr lang="en-US" dirty="0"/>
-              <a:t>Our Approach</a:t>
-            </a:r>
-          </a:p>
-        </p:txBody>
-      </p:sp>
-      <p:sp>
-        <p:nvSpPr>
-          <p:cNvPr id="8" name="Rectangle 13">
-            <a:extLst>
-              <a:ext uri="{FF2B5EF4-FFF2-40B4-BE49-F238E27FC236}">
-                <a16:creationId xmlns:a16="http://schemas.microsoft.com/office/drawing/2014/main" id="{BB99A42A-5548-4BB8-9115-A05821C360AB}"/>
-              </a:ext>
-              <a:ext uri="{C183D7F6-B498-43B3-948B-1728B52AA6E4}">
-                <adec:decorative xmlns:adec="http://schemas.microsoft.com/office/drawing/2017/decorative" val="1"/>
-              </a:ext>
-            </a:extLst>
-          </p:cNvPr>
-          <p:cNvSpPr>
-            <a:spLocks noGrp="1" noRot="1" noChangeAspect="1" noMove="1" noResize="1" noEditPoints="1" noAdjustHandles="1" noChangeArrowheads="1" noChangeShapeType="1" noTextEdit="1"/>
-          </p:cNvSpPr>
-          <p:nvPr>
-            <p:extLst>
-              <p:ext uri="{386F3935-93C4-4BCD-93E2-E3B085C9AB24}">
-                <p16:designElem xmlns:p16="http://schemas.microsoft.com/office/powerpoint/2015/main" val="1"/>
-              </p:ext>
-            </p:extLst>
-          </p:nvPr>
-        </p:nvSpPr>
-        <p:spPr>
-          <a:xfrm>
-            <a:off x="0" y="0"/>
-            <a:ext cx="182880" cy="6858000"/>
-          </a:xfrm>
-          <a:prstGeom prst="rect">
-            <a:avLst/>
-          </a:prstGeom>
-          <a:solidFill>
-            <a:schemeClr val="tx2"/>
-          </a:solidFill>
-          <a:ln>
-            <a:noFill/>
-          </a:ln>
-          <a:effectLst/>
-        </p:spPr>
-        <p:style>
-          <a:lnRef idx="1">
-            <a:schemeClr val="accent1"/>
-          </a:lnRef>
-          <a:fillRef idx="3">
-            <a:schemeClr val="accent1"/>
-          </a:fillRef>
-          <a:effectRef idx="2">
-            <a:schemeClr val="accent1"/>
-          </a:effectRef>
-          <a:fontRef idx="minor">
-            <a:schemeClr val="lt1"/>
-          </a:fontRef>
-        </p:style>
-      </p:sp>
       <p:sp>
         <p:nvSpPr>
           <p:cNvPr id="10" name="Content Placeholder 8">
@@ -11288,26 +11168,19 @@
         </p:nvSpPr>
         <p:spPr>
           <a:xfrm>
-            <a:off x="446456" y="1032960"/>
+            <a:off x="830282" y="1352308"/>
             <a:ext cx="4479646" cy="5259168"/>
           </a:xfrm>
         </p:spPr>
         <p:txBody>
           <a:bodyPr>
-            <a:normAutofit lnSpcReduction="10000"/>
+            <a:normAutofit/>
           </a:bodyPr>
           <a:lstStyle/>
           <a:p>
             <a:r>
               <a:rPr lang="en-US" dirty="0"/>
               <a:t>22 sites chosen throughout HUCs 1020 – 1030</a:t>
-            </a:r>
-          </a:p>
-          <a:p>
-            <a:pPr lvl="1"/>
-            <a:r>
-              <a:rPr lang="en-US" dirty="0"/>
-              <a:t>2 sites per HUC</a:t>
             </a:r>
           </a:p>
           <a:p>
@@ -11344,12 +11217,6 @@
             <a:r>
               <a:rPr lang="en-US" dirty="0"/>
               <a:t>By comparing the periods of records for each chosen variables and finding the sites with the longest periods of records. </a:t>
-            </a:r>
-          </a:p>
-          <a:p>
-            <a:r>
-              <a:rPr lang="en-US" dirty="0"/>
-              <a:t>Two sites per HUC region: maintain a digestible scope.</a:t>
             </a:r>
           </a:p>
           <a:p>
@@ -11379,7 +11246,7 @@
         </p:blipFill>
         <p:spPr>
           <a:xfrm>
-            <a:off x="4926102" y="1447059"/>
+            <a:off x="5230905" y="1447059"/>
             <a:ext cx="6953577" cy="4102609"/>
           </a:xfrm>
           <a:prstGeom prst="rect">
@@ -11389,225 +11256,118 @@
       </p:pic>
       <p:sp>
         <p:nvSpPr>
-          <p:cNvPr id="11" name="Freeform 11">
+          <p:cNvPr id="9" name="Title 1">
             <a:extLst>
               <a:ext uri="{FF2B5EF4-FFF2-40B4-BE49-F238E27FC236}">
-                <a16:creationId xmlns:a16="http://schemas.microsoft.com/office/drawing/2014/main" id="{D49441E5-946F-46B3-BDD2-BAD088532367}"/>
-              </a:ext>
-              <a:ext uri="{C183D7F6-B498-43B3-948B-1728B52AA6E4}">
-                <adec:decorative xmlns:adec="http://schemas.microsoft.com/office/drawing/2017/decorative" val="1"/>
+                <a16:creationId xmlns:a16="http://schemas.microsoft.com/office/drawing/2014/main" id="{C79A521D-93FC-49D9-A597-392BFF21FBB9}"/>
               </a:ext>
             </a:extLst>
           </p:cNvPr>
-          <p:cNvSpPr>
-            <a:spLocks noGrp="1" noRot="1" noChangeAspect="1" noMove="1" noResize="1" noEditPoints="1" noAdjustHandles="1" noChangeArrowheads="1" noChangeShapeType="1" noTextEdit="1"/>
+          <p:cNvSpPr txBox="1">
+            <a:spLocks/>
           </p:cNvSpPr>
-          <p:nvPr>
-            <p:extLst>
-              <p:ext uri="{386F3935-93C4-4BCD-93E2-E3B085C9AB24}">
-                <p16:designElem xmlns:p16="http://schemas.microsoft.com/office/powerpoint/2015/main" val="1"/>
-              </p:ext>
-            </p:extLst>
-          </p:nvPr>
+          <p:nvPr/>
         </p:nvSpPr>
         <p:spPr>
           <a:xfrm>
-            <a:off x="-1" y="6061223"/>
-            <a:ext cx="1038036" cy="506277"/>
+            <a:off x="2592925" y="624110"/>
+            <a:ext cx="8911687" cy="1280890"/>
           </a:xfrm>
-          <a:custGeom>
+          <a:prstGeom prst="rect">
             <a:avLst/>
-            <a:gdLst>
-              <a:gd name="connsiteX0" fmla="*/ 0 w 1038036"/>
-              <a:gd name="connsiteY0" fmla="*/ 0 h 506277"/>
-              <a:gd name="connsiteX1" fmla="*/ 182880 w 1038036"/>
-              <a:gd name="connsiteY1" fmla="*/ 0 h 506277"/>
-              <a:gd name="connsiteX2" fmla="*/ 291705 w 1038036"/>
-              <a:gd name="connsiteY2" fmla="*/ 0 h 506277"/>
-              <a:gd name="connsiteX3" fmla="*/ 291705 w 1038036"/>
-              <a:gd name="connsiteY3" fmla="*/ 151 h 506277"/>
-              <a:gd name="connsiteX4" fmla="*/ 692049 w 1038036"/>
-              <a:gd name="connsiteY4" fmla="*/ 705 h 506277"/>
-              <a:gd name="connsiteX5" fmla="*/ 782744 w 1038036"/>
-              <a:gd name="connsiteY5" fmla="*/ 705 h 506277"/>
-              <a:gd name="connsiteX6" fmla="*/ 797001 w 1038036"/>
-              <a:gd name="connsiteY6" fmla="*/ 5473 h 506277"/>
-              <a:gd name="connsiteX7" fmla="*/ 801982 w 1038036"/>
-              <a:gd name="connsiteY7" fmla="*/ 10242 h 506277"/>
-              <a:gd name="connsiteX8" fmla="*/ 1030951 w 1038036"/>
-              <a:gd name="connsiteY8" fmla="*/ 239185 h 506277"/>
-              <a:gd name="connsiteX9" fmla="*/ 1030951 w 1038036"/>
-              <a:gd name="connsiteY9" fmla="*/ 267797 h 506277"/>
-              <a:gd name="connsiteX10" fmla="*/ 801982 w 1038036"/>
-              <a:gd name="connsiteY10" fmla="*/ 496740 h 506277"/>
-              <a:gd name="connsiteX11" fmla="*/ 797001 w 1038036"/>
-              <a:gd name="connsiteY11" fmla="*/ 501508 h 506277"/>
-              <a:gd name="connsiteX12" fmla="*/ 782744 w 1038036"/>
-              <a:gd name="connsiteY12" fmla="*/ 506277 h 506277"/>
-              <a:gd name="connsiteX13" fmla="*/ 692049 w 1038036"/>
-              <a:gd name="connsiteY13" fmla="*/ 506277 h 506277"/>
-              <a:gd name="connsiteX14" fmla="*/ 291705 w 1038036"/>
-              <a:gd name="connsiteY14" fmla="*/ 505140 h 506277"/>
-              <a:gd name="connsiteX15" fmla="*/ 291705 w 1038036"/>
-              <a:gd name="connsiteY15" fmla="*/ 506277 h 506277"/>
-              <a:gd name="connsiteX16" fmla="*/ 0 w 1038036"/>
-              <a:gd name="connsiteY16" fmla="*/ 506277 h 506277"/>
-            </a:gdLst>
-            <a:ahLst/>
-            <a:cxnLst>
-              <a:cxn ang="0">
-                <a:pos x="connsiteX0" y="connsiteY0"/>
-              </a:cxn>
-              <a:cxn ang="0">
-                <a:pos x="connsiteX1" y="connsiteY1"/>
-              </a:cxn>
-              <a:cxn ang="0">
-                <a:pos x="connsiteX2" y="connsiteY2"/>
-              </a:cxn>
-              <a:cxn ang="0">
-                <a:pos x="connsiteX3" y="connsiteY3"/>
-              </a:cxn>
-              <a:cxn ang="0">
-                <a:pos x="connsiteX4" y="connsiteY4"/>
-              </a:cxn>
-              <a:cxn ang="0">
-                <a:pos x="connsiteX5" y="connsiteY5"/>
-              </a:cxn>
-              <a:cxn ang="0">
-                <a:pos x="connsiteX6" y="connsiteY6"/>
-              </a:cxn>
-              <a:cxn ang="0">
-                <a:pos x="connsiteX7" y="connsiteY7"/>
-              </a:cxn>
-              <a:cxn ang="0">
-                <a:pos x="connsiteX8" y="connsiteY8"/>
-              </a:cxn>
-              <a:cxn ang="0">
-                <a:pos x="connsiteX9" y="connsiteY9"/>
-              </a:cxn>
-              <a:cxn ang="0">
-                <a:pos x="connsiteX10" y="connsiteY10"/>
-              </a:cxn>
-              <a:cxn ang="0">
-                <a:pos x="connsiteX11" y="connsiteY11"/>
-              </a:cxn>
-              <a:cxn ang="0">
-                <a:pos x="connsiteX12" y="connsiteY12"/>
-              </a:cxn>
-              <a:cxn ang="0">
-                <a:pos x="connsiteX13" y="connsiteY13"/>
-              </a:cxn>
-              <a:cxn ang="0">
-                <a:pos x="connsiteX14" y="connsiteY14"/>
-              </a:cxn>
-              <a:cxn ang="0">
-                <a:pos x="connsiteX15" y="connsiteY15"/>
-              </a:cxn>
-              <a:cxn ang="0">
-                <a:pos x="connsiteX16" y="connsiteY16"/>
-              </a:cxn>
-            </a:cxnLst>
-            <a:rect l="l" t="t" r="r" b="b"/>
-            <a:pathLst>
-              <a:path w="1038036" h="506277">
-                <a:moveTo>
-                  <a:pt x="0" y="0"/>
-                </a:moveTo>
-                <a:lnTo>
-                  <a:pt x="182880" y="0"/>
-                </a:lnTo>
-                <a:lnTo>
-                  <a:pt x="291705" y="0"/>
-                </a:lnTo>
-                <a:lnTo>
-                  <a:pt x="291705" y="151"/>
-                </a:lnTo>
-                <a:lnTo>
-                  <a:pt x="692049" y="705"/>
-                </a:lnTo>
-                <a:lnTo>
-                  <a:pt x="782744" y="705"/>
-                </a:lnTo>
-                <a:cubicBezTo>
-                  <a:pt x="787553" y="705"/>
-                  <a:pt x="792363" y="5473"/>
-                  <a:pt x="797001" y="5473"/>
-                </a:cubicBezTo>
-                <a:cubicBezTo>
-                  <a:pt x="797001" y="10242"/>
-                  <a:pt x="801982" y="10242"/>
-                  <a:pt x="801982" y="10242"/>
-                </a:cubicBezTo>
-                <a:lnTo>
-                  <a:pt x="1030951" y="239185"/>
-                </a:lnTo>
-                <a:cubicBezTo>
-                  <a:pt x="1040398" y="248722"/>
-                  <a:pt x="1040398" y="258259"/>
-                  <a:pt x="1030951" y="267797"/>
-                </a:cubicBezTo>
-                <a:lnTo>
-                  <a:pt x="801982" y="496740"/>
-                </a:lnTo>
-                <a:cubicBezTo>
-                  <a:pt x="800436" y="498363"/>
-                  <a:pt x="798547" y="499885"/>
-                  <a:pt x="797001" y="501508"/>
-                </a:cubicBezTo>
-                <a:cubicBezTo>
-                  <a:pt x="792363" y="506277"/>
-                  <a:pt x="787553" y="506277"/>
-                  <a:pt x="782744" y="506277"/>
-                </a:cubicBezTo>
-                <a:lnTo>
-                  <a:pt x="692049" y="506277"/>
-                </a:lnTo>
-                <a:lnTo>
-                  <a:pt x="291705" y="505140"/>
-                </a:lnTo>
-                <a:lnTo>
-                  <a:pt x="291705" y="506277"/>
-                </a:lnTo>
-                <a:lnTo>
-                  <a:pt x="0" y="506277"/>
-                </a:lnTo>
-                <a:close/>
-              </a:path>
-            </a:pathLst>
-          </a:custGeom>
-          <a:ln>
-            <a:noFill/>
-          </a:ln>
+          </a:prstGeom>
         </p:spPr>
-        <p:style>
-          <a:lnRef idx="2">
-            <a:schemeClr val="accent1">
-              <a:shade val="50000"/>
-            </a:schemeClr>
-          </a:lnRef>
-          <a:fillRef idx="1">
-            <a:schemeClr val="accent1"/>
-          </a:fillRef>
-          <a:effectRef idx="0">
-            <a:schemeClr val="accent1"/>
-          </a:effectRef>
-          <a:fontRef idx="minor">
-            <a:schemeClr val="lt1"/>
-          </a:fontRef>
-        </p:style>
         <p:txBody>
-          <a:bodyPr rtlCol="0" anchor="ctr"/>
-          <a:lstStyle/>
-          <a:p>
-            <a:pPr algn="ctr"/>
-            <a:endParaRPr lang="en-US"/>
+          <a:bodyPr vert="horz" lIns="91440" tIns="45720" rIns="91440" bIns="45720" rtlCol="0" anchor="t">
+            <a:normAutofit/>
+          </a:bodyPr>
+          <a:lstStyle>
+            <a:lvl1pPr algn="l" defTabSz="457200" rtl="0" eaLnBrk="1" latinLnBrk="0" hangingPunct="1">
+              <a:spcBef>
+                <a:spcPct val="0"/>
+              </a:spcBef>
+              <a:buNone/>
+              <a:defRPr sz="3600" kern="1200">
+                <a:solidFill>
+                  <a:schemeClr val="tx1">
+                    <a:lumMod val="85000"/>
+                    <a:lumOff val="15000"/>
+                  </a:schemeClr>
+                </a:solidFill>
+                <a:latin typeface="+mj-lt"/>
+                <a:ea typeface="+mj-ea"/>
+                <a:cs typeface="+mj-cs"/>
+              </a:defRPr>
+            </a:lvl1pPr>
+            <a:lvl2pPr eaLnBrk="1" hangingPunct="1">
+              <a:defRPr>
+                <a:solidFill>
+                  <a:schemeClr val="tx2"/>
+                </a:solidFill>
+              </a:defRPr>
+            </a:lvl2pPr>
+            <a:lvl3pPr eaLnBrk="1" hangingPunct="1">
+              <a:defRPr>
+                <a:solidFill>
+                  <a:schemeClr val="tx2"/>
+                </a:solidFill>
+              </a:defRPr>
+            </a:lvl3pPr>
+            <a:lvl4pPr eaLnBrk="1" hangingPunct="1">
+              <a:defRPr>
+                <a:solidFill>
+                  <a:schemeClr val="tx2"/>
+                </a:solidFill>
+              </a:defRPr>
+            </a:lvl4pPr>
+            <a:lvl5pPr eaLnBrk="1" hangingPunct="1">
+              <a:defRPr>
+                <a:solidFill>
+                  <a:schemeClr val="tx2"/>
+                </a:solidFill>
+              </a:defRPr>
+            </a:lvl5pPr>
+            <a:lvl6pPr eaLnBrk="1" hangingPunct="1">
+              <a:defRPr>
+                <a:solidFill>
+                  <a:schemeClr val="tx2"/>
+                </a:solidFill>
+              </a:defRPr>
+            </a:lvl6pPr>
+            <a:lvl7pPr eaLnBrk="1" hangingPunct="1">
+              <a:defRPr>
+                <a:solidFill>
+                  <a:schemeClr val="tx2"/>
+                </a:solidFill>
+              </a:defRPr>
+            </a:lvl7pPr>
+            <a:lvl8pPr eaLnBrk="1" hangingPunct="1">
+              <a:defRPr>
+                <a:solidFill>
+                  <a:schemeClr val="tx2"/>
+                </a:solidFill>
+              </a:defRPr>
+            </a:lvl8pPr>
+            <a:lvl9pPr eaLnBrk="1" hangingPunct="1">
+              <a:defRPr>
+                <a:solidFill>
+                  <a:schemeClr val="tx2"/>
+                </a:solidFill>
+              </a:defRPr>
+            </a:lvl9pPr>
+          </a:lstStyle>
+          <a:p>
+            <a:r>
+              <a:rPr lang="en-US" dirty="0"/>
+              <a:t>Our Approach</a:t>
+            </a:r>
           </a:p>
         </p:txBody>
       </p:sp>
     </p:spTree>
     <p:extLst>
       <p:ext uri="{BB962C8B-B14F-4D97-AF65-F5344CB8AC3E}">
-        <p14:creationId xmlns:p14="http://schemas.microsoft.com/office/powerpoint/2010/main" val="2625875283"/>
+        <p14:creationId xmlns:p14="http://schemas.microsoft.com/office/powerpoint/2010/main" val="1376568950"/>
       </p:ext>
     </p:extLst>
   </p:cSld>
@@ -11699,34 +11459,44 @@
               <a:t>ource: The United States Geological Survey (USGS) database </a:t>
             </a:r>
           </a:p>
-          <a:p>
-            <a:pPr marL="0" indent="0">
-              <a:buNone/>
-            </a:pPr>
-            <a:r>
-              <a:rPr lang="en-US" altLang="zh-CN" dirty="0"/>
-              <a:t>	</a:t>
-            </a:r>
-            <a:r>
-              <a:rPr lang="en-US" altLang="zh-CN" sz="1600" dirty="0"/>
-              <a:t>National Water Information System (NWIS) </a:t>
-            </a:r>
-            <a:r>
-              <a:rPr lang="en-US" dirty="0">
-                <a:hlinkClick r:id="rId3"/>
-              </a:rPr>
-              <a:t>https://waterdata.usgs.gov/nwis</a:t>
-            </a:r>
-            <a:endParaRPr lang="en-US" altLang="zh-CN" dirty="0"/>
-          </a:p>
         </p:txBody>
       </p:sp>
       <p:pic>
         <p:nvPicPr>
-          <p:cNvPr id="5" name="Picture 4">
+          <p:cNvPr id="7" name="Picture 6">
             <a:extLst>
               <a:ext uri="{FF2B5EF4-FFF2-40B4-BE49-F238E27FC236}">
-                <a16:creationId xmlns:a16="http://schemas.microsoft.com/office/drawing/2014/main" id="{B4CF3F96-671D-4FF9-8AAC-9DB0305E4E86}"/>
+                <a16:creationId xmlns:a16="http://schemas.microsoft.com/office/drawing/2014/main" id="{DE4BCA3C-AC69-4226-A9DE-E1B1890221DB}"/>
+              </a:ext>
+            </a:extLst>
+          </p:cNvPr>
+          <p:cNvPicPr>
+            <a:picLocks noChangeAspect="1"/>
+          </p:cNvPicPr>
+          <p:nvPr/>
+        </p:nvPicPr>
+        <p:blipFill>
+          <a:blip r:embed="rId3"/>
+          <a:stretch>
+            <a:fillRect/>
+          </a:stretch>
+        </p:blipFill>
+        <p:spPr>
+          <a:xfrm>
+            <a:off x="1935852" y="2567649"/>
+            <a:ext cx="9694219" cy="1377289"/>
+          </a:xfrm>
+          <a:prstGeom prst="rect">
+            <a:avLst/>
+          </a:prstGeom>
+        </p:spPr>
+      </p:pic>
+      <p:pic>
+        <p:nvPicPr>
+          <p:cNvPr id="8" name="Picture 7">
+            <a:extLst>
+              <a:ext uri="{FF2B5EF4-FFF2-40B4-BE49-F238E27FC236}">
+                <a16:creationId xmlns:a16="http://schemas.microsoft.com/office/drawing/2014/main" id="{AD7427D1-D11D-40C0-B9EB-38E84F71D759}"/>
               </a:ext>
             </a:extLst>
           </p:cNvPr>
@@ -11743,8 +11513,8 @@
         </p:blipFill>
         <p:spPr>
           <a:xfrm>
-            <a:off x="2592925" y="4787160"/>
-            <a:ext cx="8162880" cy="1878054"/>
+            <a:off x="2189707" y="1848093"/>
+            <a:ext cx="9186508" cy="4823742"/>
           </a:xfrm>
           <a:prstGeom prst="rect">
             <a:avLst/>
@@ -11761,6 +11531,126 @@
   <p:clrMapOvr>
     <a:masterClrMapping/>
   </p:clrMapOvr>
+  <p:timing>
+    <p:tnLst>
+      <p:par>
+        <p:cTn id="1" dur="indefinite" restart="never" nodeType="tmRoot">
+          <p:childTnLst>
+            <p:seq concurrent="1" nextAc="seek">
+              <p:cTn id="2" dur="indefinite" nodeType="mainSeq">
+                <p:childTnLst>
+                  <p:par>
+                    <p:cTn id="3" fill="hold">
+                      <p:stCondLst>
+                        <p:cond delay="indefinite"/>
+                      </p:stCondLst>
+                      <p:childTnLst>
+                        <p:par>
+                          <p:cTn id="4" fill="hold">
+                            <p:stCondLst>
+                              <p:cond delay="0"/>
+                            </p:stCondLst>
+                            <p:childTnLst>
+                              <p:par>
+                                <p:cTn id="5" presetID="1" presetClass="exit" presetSubtype="0" fill="hold" nodeType="clickEffect">
+                                  <p:stCondLst>
+                                    <p:cond delay="0"/>
+                                  </p:stCondLst>
+                                  <p:childTnLst>
+                                    <p:set>
+                                      <p:cBhvr>
+                                        <p:cTn id="6" dur="1" fill="hold">
+                                          <p:stCondLst>
+                                            <p:cond delay="0"/>
+                                          </p:stCondLst>
+                                        </p:cTn>
+                                        <p:tgtEl>
+                                          <p:spTgt spid="8"/>
+                                        </p:tgtEl>
+                                        <p:attrNameLst>
+                                          <p:attrName>style.visibility</p:attrName>
+                                        </p:attrNameLst>
+                                      </p:cBhvr>
+                                      <p:to>
+                                        <p:strVal val="hidden"/>
+                                      </p:to>
+                                    </p:set>
+                                  </p:childTnLst>
+                                </p:cTn>
+                              </p:par>
+                            </p:childTnLst>
+                          </p:cTn>
+                        </p:par>
+                      </p:childTnLst>
+                    </p:cTn>
+                  </p:par>
+                  <p:par>
+                    <p:cTn id="7" fill="hold">
+                      <p:stCondLst>
+                        <p:cond delay="indefinite"/>
+                      </p:stCondLst>
+                      <p:childTnLst>
+                        <p:par>
+                          <p:cTn id="8" fill="hold">
+                            <p:stCondLst>
+                              <p:cond delay="0"/>
+                            </p:stCondLst>
+                            <p:childTnLst>
+                              <p:par>
+                                <p:cTn id="9" presetID="1" presetClass="entr" presetSubtype="0" fill="hold" nodeType="clickEffect">
+                                  <p:stCondLst>
+                                    <p:cond delay="0"/>
+                                  </p:stCondLst>
+                                  <p:childTnLst>
+                                    <p:set>
+                                      <p:cBhvr>
+                                        <p:cTn id="10" dur="1" fill="hold">
+                                          <p:stCondLst>
+                                            <p:cond delay="0"/>
+                                          </p:stCondLst>
+                                        </p:cTn>
+                                        <p:tgtEl>
+                                          <p:spTgt spid="7"/>
+                                        </p:tgtEl>
+                                        <p:attrNameLst>
+                                          <p:attrName>style.visibility</p:attrName>
+                                        </p:attrNameLst>
+                                      </p:cBhvr>
+                                      <p:to>
+                                        <p:strVal val="visible"/>
+                                      </p:to>
+                                    </p:set>
+                                  </p:childTnLst>
+                                </p:cTn>
+                              </p:par>
+                            </p:childTnLst>
+                          </p:cTn>
+                        </p:par>
+                      </p:childTnLst>
+                    </p:cTn>
+                  </p:par>
+                </p:childTnLst>
+              </p:cTn>
+              <p:prevCondLst>
+                <p:cond evt="onPrev" delay="0">
+                  <p:tgtEl>
+                    <p:sldTgt/>
+                  </p:tgtEl>
+                </p:cond>
+              </p:prevCondLst>
+              <p:nextCondLst>
+                <p:cond evt="onNext" delay="0">
+                  <p:tgtEl>
+                    <p:sldTgt/>
+                  </p:tgtEl>
+                </p:cond>
+              </p:nextCondLst>
+            </p:seq>
+          </p:childTnLst>
+        </p:cTn>
+      </p:par>
+    </p:tnLst>
+  </p:timing>
 </p:sld>
 </file>
 
@@ -17424,7 +17314,7 @@
         </p:nvSpPr>
         <p:spPr>
           <a:xfrm>
-            <a:off x="2510863" y="424818"/>
+            <a:off x="2589886" y="616729"/>
             <a:ext cx="8911687" cy="1280890"/>
           </a:xfrm>
         </p:spPr>
@@ -17471,7 +17361,7 @@
         </p:blipFill>
         <p:spPr>
           <a:xfrm>
-            <a:off x="2014218" y="1600257"/>
+            <a:off x="2014218" y="1769592"/>
             <a:ext cx="8911687" cy="5086387"/>
           </a:xfrm>
           <a:prstGeom prst="rect">
@@ -17565,29 +17455,25 @@
         </p:nvSpPr>
         <p:spPr>
           <a:xfrm>
-            <a:off x="2589212" y="3808324"/>
-            <a:ext cx="8915400" cy="2102897"/>
+            <a:off x="2589212" y="3429000"/>
+            <a:ext cx="8915400" cy="2482221"/>
           </a:xfrm>
         </p:spPr>
         <p:txBody>
-          <a:bodyPr/>
+          <a:bodyPr>
+            <a:normAutofit fontScale="92500" lnSpcReduction="20000"/>
+          </a:bodyPr>
           <a:lstStyle/>
           <a:p>
             <a:r>
               <a:rPr lang="en-US" dirty="0"/>
-              <a:t>Fixed effects: Year and population</a:t>
+              <a:t>Fixed effects: year and population</a:t>
             </a:r>
           </a:p>
           <a:p>
             <a:r>
               <a:rPr lang="en-US" dirty="0"/>
-              <a:t>Random effect HUC 4 area</a:t>
-            </a:r>
-          </a:p>
-          <a:p>
-            <a:r>
-              <a:rPr lang="en-US" dirty="0"/>
-              <a:t>Exponentiating the coefficients produces integers with multiplicative effects on nitrogen</a:t>
+              <a:t>Random effect: HUC 4 area</a:t>
             </a:r>
           </a:p>
           <a:p>
@@ -17595,6 +17481,36 @@
               <a:rPr lang="en-US" dirty="0"/>
               <a:t>Discharge was not significant</a:t>
             </a:r>
+          </a:p>
+          <a:p>
+            <a:r>
+              <a:rPr lang="en-US" dirty="0"/>
+              <a:t>R² = 56.7%</a:t>
+            </a:r>
+          </a:p>
+          <a:p>
+            <a:r>
+              <a:rPr lang="en-US" dirty="0"/>
+              <a:t>With every decade, total nitrogen increases by 1%</a:t>
+            </a:r>
+          </a:p>
+          <a:p>
+            <a:r>
+              <a:rPr lang="en-US" dirty="0"/>
+              <a:t>With every 1000 person increase in population, nitrogen decreases by 1%</a:t>
+            </a:r>
+          </a:p>
+          <a:p>
+            <a:r>
+              <a:rPr lang="en-US" dirty="0"/>
+              <a:t>A unit increase in phosphorus increases nitrogen by 44%</a:t>
+            </a:r>
+          </a:p>
+          <a:p>
+            <a:pPr marL="0" indent="0">
+              <a:buNone/>
+            </a:pPr>
+            <a:endParaRPr lang="en-US" dirty="0"/>
           </a:p>
         </p:txBody>
       </p:sp>
@@ -17614,8 +17530,8 @@
             </p:nvSpPr>
             <p:spPr>
               <a:xfrm>
-                <a:off x="3523127" y="2116015"/>
-                <a:ext cx="7047570" cy="622350"/>
+                <a:off x="3446471" y="2161171"/>
+                <a:ext cx="7200882" cy="276999"/>
               </a:xfrm>
               <a:prstGeom prst="rect">
                 <a:avLst/>
@@ -17628,164 +17544,87 @@
               </a:bodyPr>
               <a:lstStyle/>
               <a:p>
-                <a:pPr/>
                 <a14:m>
-                  <m:oMathPara xmlns:m="http://schemas.openxmlformats.org/officeDocument/2006/math">
-                    <m:oMathParaPr>
-                      <m:jc m:val="centerGroup"/>
-                    </m:oMathParaPr>
-                    <m:oMath xmlns:m="http://schemas.openxmlformats.org/officeDocument/2006/math">
-                      <m:func>
-                        <m:funcPr>
-                          <m:ctrlPr>
-                            <a:rPr lang="en-US" i="1" smtClean="0">
-                              <a:latin typeface="Cambria Math" panose="02040503050406030204" pitchFamily="18" charset="0"/>
-                            </a:rPr>
-                          </m:ctrlPr>
-                        </m:funcPr>
-                        <m:fName>
-                          <m:r>
-                            <m:rPr>
-                              <m:sty m:val="p"/>
-                            </m:rPr>
-                            <a:rPr lang="en-US" i="0" smtClean="0">
-                              <a:latin typeface="Cambria Math" panose="02040503050406030204" pitchFamily="18" charset="0"/>
-                            </a:rPr>
-                            <m:t>log</m:t>
-                          </m:r>
-                        </m:fName>
-                        <m:e>
-                          <m:r>
-                            <a:rPr lang="en-US" b="0" i="1" smtClean="0">
-                              <a:latin typeface="Cambria Math" panose="02040503050406030204" pitchFamily="18" charset="0"/>
-                            </a:rPr>
-                            <m:t>(</m:t>
-                          </m:r>
-                          <m:r>
-                            <a:rPr lang="en-US" b="0" i="1" smtClean="0">
-                              <a:latin typeface="Cambria Math" panose="02040503050406030204" pitchFamily="18" charset="0"/>
-                            </a:rPr>
-                            <m:t>𝑁𝑖𝑡𝑟𝑜𝑔𝑒𝑛</m:t>
-                          </m:r>
-                          <m:r>
-                            <a:rPr lang="en-US" b="0" i="1" smtClean="0">
-                              <a:latin typeface="Cambria Math" panose="02040503050406030204" pitchFamily="18" charset="0"/>
-                            </a:rPr>
-                            <m:t>)</m:t>
-                          </m:r>
-                        </m:e>
-                      </m:func>
-                      <m:r>
-                        <a:rPr lang="en-US" b="0" i="1" smtClean="0">
-                          <a:latin typeface="Cambria Math" panose="02040503050406030204" pitchFamily="18" charset="0"/>
-                        </a:rPr>
-                        <m:t>=−3.68+0.0299</m:t>
-                      </m:r>
-                      <m:d>
-                        <m:dPr>
-                          <m:ctrlPr>
-                            <a:rPr lang="en-US" b="0" i="1" smtClean="0">
-                              <a:latin typeface="Cambria Math" panose="02040503050406030204" pitchFamily="18" charset="0"/>
-                            </a:rPr>
-                          </m:ctrlPr>
-                        </m:dPr>
-                        <m:e>
-                          <m:f>
-                            <m:fPr>
-                              <m:ctrlPr>
-                                <a:rPr lang="en-US" b="0" i="1" smtClean="0">
-                                  <a:latin typeface="Cambria Math" panose="02040503050406030204" pitchFamily="18" charset="0"/>
-                                </a:rPr>
-                              </m:ctrlPr>
-                            </m:fPr>
-                            <m:num>
-                              <m:r>
-                                <a:rPr lang="en-US" b="0" i="1" smtClean="0">
-                                  <a:latin typeface="Cambria Math" panose="02040503050406030204" pitchFamily="18" charset="0"/>
-                                </a:rPr>
-                                <m:t>𝑌𝑒𝑎𝑟</m:t>
-                              </m:r>
-                            </m:num>
-                            <m:den>
-                              <m:r>
-                                <a:rPr lang="en-US" b="0" i="1" smtClean="0">
-                                  <a:latin typeface="Cambria Math" panose="02040503050406030204" pitchFamily="18" charset="0"/>
-                                </a:rPr>
-                                <m:t>10</m:t>
-                              </m:r>
-                            </m:den>
-                          </m:f>
-                        </m:e>
-                      </m:d>
-                      <m:r>
-                        <a:rPr lang="en-US" b="0" i="1" smtClean="0">
-                          <a:latin typeface="Cambria Math" panose="02040503050406030204" pitchFamily="18" charset="0"/>
-                        </a:rPr>
-                        <m:t>−9.95</m:t>
-                      </m:r>
-                      <m:sSup>
-                        <m:sSupPr>
-                          <m:ctrlPr>
-                            <a:rPr lang="en-US" b="0" i="1" smtClean="0">
-                              <a:latin typeface="Cambria Math" panose="02040503050406030204" pitchFamily="18" charset="0"/>
-                            </a:rPr>
-                          </m:ctrlPr>
-                        </m:sSupPr>
-                        <m:e>
-                          <m:r>
-                            <a:rPr lang="en-US" b="0" i="1" smtClean="0">
-                              <a:latin typeface="Cambria Math" panose="02040503050406030204" pitchFamily="18" charset="0"/>
-                            </a:rPr>
-                            <m:t>∗10</m:t>
-                          </m:r>
-                        </m:e>
-                        <m:sup>
-                          <m:r>
-                            <a:rPr lang="en-US" b="0" i="1" smtClean="0">
-                              <a:latin typeface="Cambria Math" panose="02040503050406030204" pitchFamily="18" charset="0"/>
-                            </a:rPr>
-                            <m:t>−4</m:t>
-                          </m:r>
-                        </m:sup>
-                      </m:sSup>
-                      <m:d>
-                        <m:dPr>
-                          <m:ctrlPr>
-                            <a:rPr lang="en-US" b="0" i="1" smtClean="0">
-                              <a:latin typeface="Cambria Math" panose="02040503050406030204" pitchFamily="18" charset="0"/>
-                            </a:rPr>
-                          </m:ctrlPr>
-                        </m:dPr>
-                        <m:e>
-                          <m:f>
-                            <m:fPr>
-                              <m:ctrlPr>
-                                <a:rPr lang="en-US" b="0" i="1" smtClean="0">
-                                  <a:latin typeface="Cambria Math" panose="02040503050406030204" pitchFamily="18" charset="0"/>
-                                </a:rPr>
-                              </m:ctrlPr>
-                            </m:fPr>
-                            <m:num>
-                              <m:r>
-                                <a:rPr lang="en-US" b="0" i="1" smtClean="0">
-                                  <a:latin typeface="Cambria Math" panose="02040503050406030204" pitchFamily="18" charset="0"/>
-                                </a:rPr>
-                                <m:t>𝑝𝑜𝑝𝑢𝑙𝑎𝑡𝑖𝑜𝑛</m:t>
-                              </m:r>
-                            </m:num>
-                            <m:den>
-                              <m:r>
-                                <a:rPr lang="en-US" b="0" i="1" smtClean="0">
-                                  <a:latin typeface="Cambria Math" panose="02040503050406030204" pitchFamily="18" charset="0"/>
-                                </a:rPr>
-                                <m:t>1000</m:t>
-                              </m:r>
-                            </m:den>
-                          </m:f>
-                        </m:e>
-                      </m:d>
-                    </m:oMath>
-                  </m:oMathPara>
+                  <m:oMath xmlns:m="http://schemas.openxmlformats.org/officeDocument/2006/math">
+                    <m:r>
+                      <a:rPr lang="en-US" b="0" i="1" smtClean="0">
+                        <a:latin typeface="Cambria Math" panose="02040503050406030204" pitchFamily="18" charset="0"/>
+                      </a:rPr>
+                      <m:t>𝑁𝑖𝑡𝑟𝑜𝑔𝑒𝑛</m:t>
+                    </m:r>
+                    <m:r>
+                      <a:rPr lang="en-US" b="0" i="1" smtClean="0">
+                        <a:latin typeface="Cambria Math" panose="02040503050406030204" pitchFamily="18" charset="0"/>
+                      </a:rPr>
+                      <m:t>=0.28+1.01</m:t>
+                    </m:r>
+                    <m:d>
+                      <m:dPr>
+                        <m:ctrlPr>
+                          <a:rPr lang="en-US" b="0" i="1" smtClean="0">
+                            <a:latin typeface="Cambria Math" panose="02040503050406030204" pitchFamily="18" charset="0"/>
+                          </a:rPr>
+                        </m:ctrlPr>
+                      </m:dPr>
+                      <m:e>
+                        <m:r>
+                          <a:rPr lang="en-US" b="0" i="1" smtClean="0">
+                            <a:latin typeface="Cambria Math" panose="02040503050406030204" pitchFamily="18" charset="0"/>
+                          </a:rPr>
+                          <m:t>𝑦𝑒𝑎𝑟</m:t>
+                        </m:r>
+                      </m:e>
+                    </m:d>
+                    <m:r>
+                      <a:rPr lang="en-US" b="0" i="1" smtClean="0">
+                        <a:latin typeface="Cambria Math" panose="02040503050406030204" pitchFamily="18" charset="0"/>
+                      </a:rPr>
+                      <m:t>+0.99</m:t>
+                    </m:r>
+                    <m:d>
+                      <m:dPr>
+                        <m:ctrlPr>
+                          <a:rPr lang="en-US" b="0" i="1" smtClean="0">
+                            <a:latin typeface="Cambria Math" panose="02040503050406030204" pitchFamily="18" charset="0"/>
+                          </a:rPr>
+                        </m:ctrlPr>
+                      </m:dPr>
+                      <m:e>
+                        <m:r>
+                          <a:rPr lang="en-US" b="0" i="1" smtClean="0">
+                            <a:latin typeface="Cambria Math" panose="02040503050406030204" pitchFamily="18" charset="0"/>
+                          </a:rPr>
+                          <m:t>𝑝𝑜𝑝𝑢𝑙𝑎𝑡𝑖𝑜𝑛</m:t>
+                        </m:r>
+                      </m:e>
+                    </m:d>
+                  </m:oMath>
+                </a14:m>
+                <a:r>
+                  <a:rPr lang="en-US" dirty="0"/>
+                  <a:t> </a:t>
+                </a:r>
+                <a14:m>
+                  <m:oMath xmlns:m="http://schemas.openxmlformats.org/officeDocument/2006/math">
+                    <m:r>
+                      <a:rPr lang="en-US" b="0" i="0" dirty="0" smtClean="0">
+                        <a:latin typeface="Cambria Math" panose="02040503050406030204" pitchFamily="18" charset="0"/>
+                      </a:rPr>
+                      <m:t>+1.44(</m:t>
+                    </m:r>
+                    <m:r>
+                      <a:rPr lang="en-US" b="0" i="1" dirty="0" smtClean="0">
+                        <a:latin typeface="Cambria Math" panose="02040503050406030204" pitchFamily="18" charset="0"/>
+                      </a:rPr>
+                      <m:t>𝑝h𝑜𝑠𝑝h𝑜𝑟𝑢𝑠</m:t>
+                    </m:r>
+                    <m:r>
+                      <a:rPr lang="en-US" b="0" i="1" dirty="0" smtClean="0">
+                        <a:latin typeface="Cambria Math" panose="02040503050406030204" pitchFamily="18" charset="0"/>
+                      </a:rPr>
+                      <m:t>)</m:t>
+                    </m:r>
+                  </m:oMath>
                 </a14:m>
                 <a:endParaRPr lang="en-US" dirty="0"/>
               </a:p>
@@ -17809,8 +17648,8 @@
             </p:nvSpPr>
             <p:spPr>
               <a:xfrm>
-                <a:off x="3523127" y="2116015"/>
-                <a:ext cx="7047570" cy="622350"/>
+                <a:off x="3446471" y="2161171"/>
+                <a:ext cx="7200882" cy="276999"/>
               </a:xfrm>
               <a:prstGeom prst="rect">
                 <a:avLst/>
@@ -17818,7 +17657,7 @@
               <a:blipFill>
                 <a:blip r:embed="rId3"/>
                 <a:stretch>
-                  <a:fillRect/>
+                  <a:fillRect l="-1523" r="-423" b="-40000"/>
                 </a:stretch>
               </a:blipFill>
             </p:spPr>

</xml_diff>

<commit_message>
Nov22 Haoyu. Fixed unlinked bibliography.
</commit_message>
<xml_diff>
--- a/TeamDocs/Examining the Hydrologic Properties of the Missouri River.pptx
+++ b/TeamDocs/Examining the Hydrologic Properties of the Missouri River.pptx
@@ -207,7 +207,7 @@
           <a:p>
             <a:fld id="{B56C8744-E6BD-4290-891C-CE220D660B8A}" type="datetimeFigureOut">
               <a:rPr lang="en-US" smtClean="0"/>
-              <a:t>11/21/2019</a:t>
+              <a:t>11/22/2019</a:t>
             </a:fld>
             <a:endParaRPr lang="en-US"/>
           </a:p>
@@ -816,7 +816,15 @@
           <a:p>
             <a:r>
               <a:rPr lang="en-US" dirty="0"/>
-              <a:t>The basin is primarily rural, but also has several large or medium-sized cities. As shown on this map, a large proportion of the region is agricultural land. 218 acres are related to agriculture, and two major land uses are cropland and pasture. </a:t>
+              <a:t>The basin is primarily rural, but also has several large or medium-sized cities. As shown on this map, a large proportion of the region is agricultural land. 218 million acres out of 328 million acres </a:t>
+            </a:r>
+            <a:r>
+              <a:rPr lang="en-US"/>
+              <a:t>in US (64.2%) are </a:t>
+            </a:r>
+            <a:r>
+              <a:rPr lang="en-US" dirty="0"/>
+              <a:t>related to agriculture, and two major land uses are cropland and pasture. </a:t>
             </a:r>
           </a:p>
           <a:p>
@@ -1933,7 +1941,7 @@
             <a:fld id="{B61BEF0D-F0BB-DE4B-95CE-6DB70DBA9567}" type="datetimeFigureOut">
               <a:rPr lang="en-US" dirty="0"/>
               <a:pPr/>
-              <a:t>11/21/2019</a:t>
+              <a:t>11/22/2019</a:t>
             </a:fld>
             <a:endParaRPr lang="en-US" dirty="0"/>
           </a:p>
@@ -2268,7 +2276,7 @@
             <a:fld id="{B61BEF0D-F0BB-DE4B-95CE-6DB70DBA9567}" type="datetimeFigureOut">
               <a:rPr lang="en-US" dirty="0"/>
               <a:pPr/>
-              <a:t>11/21/2019</a:t>
+              <a:t>11/22/2019</a:t>
             </a:fld>
             <a:endParaRPr lang="en-US" dirty="0"/>
           </a:p>
@@ -2666,7 +2674,7 @@
             <a:fld id="{B61BEF0D-F0BB-DE4B-95CE-6DB70DBA9567}" type="datetimeFigureOut">
               <a:rPr lang="en-US" dirty="0"/>
               <a:pPr/>
-              <a:t>11/21/2019</a:t>
+              <a:t>11/22/2019</a:t>
             </a:fld>
             <a:endParaRPr lang="en-US" dirty="0"/>
           </a:p>
@@ -2998,7 +3006,7 @@
             <a:fld id="{B61BEF0D-F0BB-DE4B-95CE-6DB70DBA9567}" type="datetimeFigureOut">
               <a:rPr lang="en-US" dirty="0"/>
               <a:pPr/>
-              <a:t>11/21/2019</a:t>
+              <a:t>11/22/2019</a:t>
             </a:fld>
             <a:endParaRPr lang="en-US" dirty="0"/>
           </a:p>
@@ -3315,7 +3323,7 @@
             <a:fld id="{B61BEF0D-F0BB-DE4B-95CE-6DB70DBA9567}" type="datetimeFigureOut">
               <a:rPr lang="en-US" dirty="0"/>
               <a:pPr/>
-              <a:t>11/21/2019</a:t>
+              <a:t>11/22/2019</a:t>
             </a:fld>
             <a:endParaRPr lang="en-US" dirty="0"/>
           </a:p>
@@ -3708,7 +3716,7 @@
             <a:fld id="{B61BEF0D-F0BB-DE4B-95CE-6DB70DBA9567}" type="datetimeFigureOut">
               <a:rPr lang="en-US" dirty="0"/>
               <a:pPr/>
-              <a:t>11/21/2019</a:t>
+              <a:t>11/22/2019</a:t>
             </a:fld>
             <a:endParaRPr lang="en-US" dirty="0"/>
           </a:p>
@@ -3962,7 +3970,7 @@
             <a:fld id="{B61BEF0D-F0BB-DE4B-95CE-6DB70DBA9567}" type="datetimeFigureOut">
               <a:rPr lang="en-US" dirty="0"/>
               <a:pPr/>
-              <a:t>11/21/2019</a:t>
+              <a:t>11/22/2019</a:t>
             </a:fld>
             <a:endParaRPr lang="en-US" dirty="0"/>
           </a:p>
@@ -4221,7 +4229,7 @@
             <a:fld id="{B61BEF0D-F0BB-DE4B-95CE-6DB70DBA9567}" type="datetimeFigureOut">
               <a:rPr lang="en-US" dirty="0"/>
               <a:pPr/>
-              <a:t>11/21/2019</a:t>
+              <a:t>11/22/2019</a:t>
             </a:fld>
             <a:endParaRPr lang="en-US" dirty="0"/>
           </a:p>
@@ -4480,7 +4488,7 @@
             <a:fld id="{B61BEF0D-F0BB-DE4B-95CE-6DB70DBA9567}" type="datetimeFigureOut">
               <a:rPr lang="en-US" dirty="0"/>
               <a:pPr/>
-              <a:t>11/21/2019</a:t>
+              <a:t>11/22/2019</a:t>
             </a:fld>
             <a:endParaRPr lang="en-US" dirty="0"/>
           </a:p>
@@ -4806,7 +4814,7 @@
             <a:fld id="{B61BEF0D-F0BB-DE4B-95CE-6DB70DBA9567}" type="datetimeFigureOut">
               <a:rPr lang="en-US" dirty="0"/>
               <a:pPr/>
-              <a:t>11/21/2019</a:t>
+              <a:t>11/22/2019</a:t>
             </a:fld>
             <a:endParaRPr lang="en-US" dirty="0"/>
           </a:p>
@@ -5126,7 +5134,7 @@
             <a:fld id="{B61BEF0D-F0BB-DE4B-95CE-6DB70DBA9567}" type="datetimeFigureOut">
               <a:rPr lang="en-US" dirty="0"/>
               <a:pPr/>
-              <a:t>11/21/2019</a:t>
+              <a:t>11/22/2019</a:t>
             </a:fld>
             <a:endParaRPr lang="en-US" dirty="0"/>
           </a:p>
@@ -5580,7 +5588,7 @@
             <a:fld id="{B61BEF0D-F0BB-DE4B-95CE-6DB70DBA9567}" type="datetimeFigureOut">
               <a:rPr lang="en-US" dirty="0"/>
               <a:pPr/>
-              <a:t>11/21/2019</a:t>
+              <a:t>11/22/2019</a:t>
             </a:fld>
             <a:endParaRPr lang="en-US" dirty="0"/>
           </a:p>
@@ -5782,7 +5790,7 @@
             <a:fld id="{B61BEF0D-F0BB-DE4B-95CE-6DB70DBA9567}" type="datetimeFigureOut">
               <a:rPr lang="en-US" dirty="0"/>
               <a:pPr/>
-              <a:t>11/21/2019</a:t>
+              <a:t>11/22/2019</a:t>
             </a:fld>
             <a:endParaRPr lang="en-US" dirty="0"/>
           </a:p>
@@ -5956,7 +5964,7 @@
             <a:fld id="{B61BEF0D-F0BB-DE4B-95CE-6DB70DBA9567}" type="datetimeFigureOut">
               <a:rPr lang="en-US" dirty="0"/>
               <a:pPr/>
-              <a:t>11/21/2019</a:t>
+              <a:t>11/22/2019</a:t>
             </a:fld>
             <a:endParaRPr lang="en-US" dirty="0"/>
           </a:p>
@@ -6286,7 +6294,7 @@
             <a:fld id="{B61BEF0D-F0BB-DE4B-95CE-6DB70DBA9567}" type="datetimeFigureOut">
               <a:rPr lang="en-US" dirty="0"/>
               <a:pPr/>
-              <a:t>11/21/2019</a:t>
+              <a:t>11/22/2019</a:t>
             </a:fld>
             <a:endParaRPr lang="en-US" dirty="0"/>
           </a:p>
@@ -6628,7 +6636,7 @@
             <a:fld id="{B61BEF0D-F0BB-DE4B-95CE-6DB70DBA9567}" type="datetimeFigureOut">
               <a:rPr lang="en-US" dirty="0"/>
               <a:pPr/>
-              <a:t>11/21/2019</a:t>
+              <a:t>11/22/2019</a:t>
             </a:fld>
             <a:endParaRPr lang="en-US" dirty="0"/>
           </a:p>
@@ -8742,7 +8750,7 @@
             <a:fld id="{B61BEF0D-F0BB-DE4B-95CE-6DB70DBA9567}" type="datetimeFigureOut">
               <a:rPr lang="en-US" dirty="0"/>
               <a:pPr/>
-              <a:t>11/21/2019</a:t>
+              <a:t>11/22/2019</a:t>
             </a:fld>
             <a:endParaRPr lang="en-US" dirty="0"/>
           </a:p>

</xml_diff>

<commit_message>
Update to powerpoint to move table on slide 5 to center of slide instead of the bottom
</commit_message>
<xml_diff>
--- a/TeamDocs/Examining the Hydrologic Properties of the Missouri River.pptx
+++ b/TeamDocs/Examining the Hydrologic Properties of the Missouri River.pptx
@@ -207,7 +207,7 @@
           <a:p>
             <a:fld id="{B56C8744-E6BD-4290-891C-CE220D660B8A}" type="datetimeFigureOut">
               <a:rPr lang="en-US" smtClean="0"/>
-              <a:t>11/21/2019</a:t>
+              <a:t>11/22/19</a:t>
             </a:fld>
             <a:endParaRPr lang="en-US"/>
           </a:p>
@@ -1883,7 +1883,7 @@
             <a:fld id="{B61BEF0D-F0BB-DE4B-95CE-6DB70DBA9567}" type="datetimeFigureOut">
               <a:rPr lang="en-US" dirty="0"/>
               <a:pPr/>
-              <a:t>11/21/2019</a:t>
+              <a:t>11/22/19</a:t>
             </a:fld>
             <a:endParaRPr lang="en-US" dirty="0"/>
           </a:p>
@@ -2218,7 +2218,7 @@
             <a:fld id="{B61BEF0D-F0BB-DE4B-95CE-6DB70DBA9567}" type="datetimeFigureOut">
               <a:rPr lang="en-US" dirty="0"/>
               <a:pPr/>
-              <a:t>11/21/2019</a:t>
+              <a:t>11/22/19</a:t>
             </a:fld>
             <a:endParaRPr lang="en-US" dirty="0"/>
           </a:p>
@@ -2616,7 +2616,7 @@
             <a:fld id="{B61BEF0D-F0BB-DE4B-95CE-6DB70DBA9567}" type="datetimeFigureOut">
               <a:rPr lang="en-US" dirty="0"/>
               <a:pPr/>
-              <a:t>11/21/2019</a:t>
+              <a:t>11/22/19</a:t>
             </a:fld>
             <a:endParaRPr lang="en-US" dirty="0"/>
           </a:p>
@@ -2948,7 +2948,7 @@
             <a:fld id="{B61BEF0D-F0BB-DE4B-95CE-6DB70DBA9567}" type="datetimeFigureOut">
               <a:rPr lang="en-US" dirty="0"/>
               <a:pPr/>
-              <a:t>11/21/2019</a:t>
+              <a:t>11/22/19</a:t>
             </a:fld>
             <a:endParaRPr lang="en-US" dirty="0"/>
           </a:p>
@@ -3265,7 +3265,7 @@
             <a:fld id="{B61BEF0D-F0BB-DE4B-95CE-6DB70DBA9567}" type="datetimeFigureOut">
               <a:rPr lang="en-US" dirty="0"/>
               <a:pPr/>
-              <a:t>11/21/2019</a:t>
+              <a:t>11/22/19</a:t>
             </a:fld>
             <a:endParaRPr lang="en-US" dirty="0"/>
           </a:p>
@@ -3658,7 +3658,7 @@
             <a:fld id="{B61BEF0D-F0BB-DE4B-95CE-6DB70DBA9567}" type="datetimeFigureOut">
               <a:rPr lang="en-US" dirty="0"/>
               <a:pPr/>
-              <a:t>11/21/2019</a:t>
+              <a:t>11/22/19</a:t>
             </a:fld>
             <a:endParaRPr lang="en-US" dirty="0"/>
           </a:p>
@@ -3912,7 +3912,7 @@
             <a:fld id="{B61BEF0D-F0BB-DE4B-95CE-6DB70DBA9567}" type="datetimeFigureOut">
               <a:rPr lang="en-US" dirty="0"/>
               <a:pPr/>
-              <a:t>11/21/2019</a:t>
+              <a:t>11/22/19</a:t>
             </a:fld>
             <a:endParaRPr lang="en-US" dirty="0"/>
           </a:p>
@@ -4171,7 +4171,7 @@
             <a:fld id="{B61BEF0D-F0BB-DE4B-95CE-6DB70DBA9567}" type="datetimeFigureOut">
               <a:rPr lang="en-US" dirty="0"/>
               <a:pPr/>
-              <a:t>11/21/2019</a:t>
+              <a:t>11/22/19</a:t>
             </a:fld>
             <a:endParaRPr lang="en-US" dirty="0"/>
           </a:p>
@@ -4430,7 +4430,7 @@
             <a:fld id="{B61BEF0D-F0BB-DE4B-95CE-6DB70DBA9567}" type="datetimeFigureOut">
               <a:rPr lang="en-US" dirty="0"/>
               <a:pPr/>
-              <a:t>11/21/2019</a:t>
+              <a:t>11/22/19</a:t>
             </a:fld>
             <a:endParaRPr lang="en-US" dirty="0"/>
           </a:p>
@@ -4756,7 +4756,7 @@
             <a:fld id="{B61BEF0D-F0BB-DE4B-95CE-6DB70DBA9567}" type="datetimeFigureOut">
               <a:rPr lang="en-US" dirty="0"/>
               <a:pPr/>
-              <a:t>11/21/2019</a:t>
+              <a:t>11/22/19</a:t>
             </a:fld>
             <a:endParaRPr lang="en-US" dirty="0"/>
           </a:p>
@@ -5076,7 +5076,7 @@
             <a:fld id="{B61BEF0D-F0BB-DE4B-95CE-6DB70DBA9567}" type="datetimeFigureOut">
               <a:rPr lang="en-US" dirty="0"/>
               <a:pPr/>
-              <a:t>11/21/2019</a:t>
+              <a:t>11/22/19</a:t>
             </a:fld>
             <a:endParaRPr lang="en-US" dirty="0"/>
           </a:p>
@@ -5530,7 +5530,7 @@
             <a:fld id="{B61BEF0D-F0BB-DE4B-95CE-6DB70DBA9567}" type="datetimeFigureOut">
               <a:rPr lang="en-US" dirty="0"/>
               <a:pPr/>
-              <a:t>11/21/2019</a:t>
+              <a:t>11/22/19</a:t>
             </a:fld>
             <a:endParaRPr lang="en-US" dirty="0"/>
           </a:p>
@@ -5732,7 +5732,7 @@
             <a:fld id="{B61BEF0D-F0BB-DE4B-95CE-6DB70DBA9567}" type="datetimeFigureOut">
               <a:rPr lang="en-US" dirty="0"/>
               <a:pPr/>
-              <a:t>11/21/2019</a:t>
+              <a:t>11/22/19</a:t>
             </a:fld>
             <a:endParaRPr lang="en-US" dirty="0"/>
           </a:p>
@@ -5906,7 +5906,7 @@
             <a:fld id="{B61BEF0D-F0BB-DE4B-95CE-6DB70DBA9567}" type="datetimeFigureOut">
               <a:rPr lang="en-US" dirty="0"/>
               <a:pPr/>
-              <a:t>11/21/2019</a:t>
+              <a:t>11/22/19</a:t>
             </a:fld>
             <a:endParaRPr lang="en-US" dirty="0"/>
           </a:p>
@@ -6236,7 +6236,7 @@
             <a:fld id="{B61BEF0D-F0BB-DE4B-95CE-6DB70DBA9567}" type="datetimeFigureOut">
               <a:rPr lang="en-US" dirty="0"/>
               <a:pPr/>
-              <a:t>11/21/2019</a:t>
+              <a:t>11/22/19</a:t>
             </a:fld>
             <a:endParaRPr lang="en-US" dirty="0"/>
           </a:p>
@@ -6578,7 +6578,7 @@
             <a:fld id="{B61BEF0D-F0BB-DE4B-95CE-6DB70DBA9567}" type="datetimeFigureOut">
               <a:rPr lang="en-US" dirty="0"/>
               <a:pPr/>
-              <a:t>11/21/2019</a:t>
+              <a:t>11/22/19</a:t>
             </a:fld>
             <a:endParaRPr lang="en-US" dirty="0"/>
           </a:p>
@@ -8692,7 +8692,7 @@
             <a:fld id="{B61BEF0D-F0BB-DE4B-95CE-6DB70DBA9567}" type="datetimeFigureOut">
               <a:rPr lang="en-US" dirty="0"/>
               <a:pPr/>
-              <a:t>11/21/2019</a:t>
+              <a:t>11/22/19</a:t>
             </a:fld>
             <a:endParaRPr lang="en-US" dirty="0"/>
           </a:p>
@@ -11743,8 +11743,8 @@
         </p:blipFill>
         <p:spPr>
           <a:xfrm>
-            <a:off x="2592925" y="4787160"/>
-            <a:ext cx="8162880" cy="1878054"/>
+            <a:off x="1229089" y="2683277"/>
+            <a:ext cx="10129139" cy="2330436"/>
           </a:xfrm>
           <a:prstGeom prst="rect">
             <a:avLst/>

</xml_diff>